<commit_message>
Significantly Optimized Multithreaded BFS
</commit_message>
<xml_diff>
--- a/docs/cs4306-course-project-presentation.pptx
+++ b/docs/cs4306-course-project-presentation.pptx
@@ -22,6 +22,7 @@
     <p:sldId id="273" r:id="rId16"/>
     <p:sldId id="263" r:id="rId17"/>
     <p:sldId id="269" r:id="rId18"/>
+    <p:sldId id="275" r:id="rId19"/>
   </p:sldIdLst>
   <p:sldSz cx="12192000" cy="6858000"/>
   <p:notesSz cx="6858000" cy="9144000"/>
@@ -281,7 +282,7 @@
           <a:p>
             <a:fld id="{846CE7D5-CF57-46EF-B807-FDD0502418D4}" type="datetimeFigureOut">
               <a:rPr lang="en-US" smtClean="0"/>
-              <a:t>11/2/2023</a:t>
+              <a:t>11/3/2023</a:t>
             </a:fld>
             <a:endParaRPr lang="en-US"/>
           </a:p>
@@ -449,7 +450,7 @@
           <a:p>
             <a:fld id="{846CE7D5-CF57-46EF-B807-FDD0502418D4}" type="datetimeFigureOut">
               <a:rPr lang="en-US" smtClean="0"/>
-              <a:t>11/2/2023</a:t>
+              <a:t>11/3/2023</a:t>
             </a:fld>
             <a:endParaRPr lang="en-US"/>
           </a:p>
@@ -627,7 +628,7 @@
           <a:p>
             <a:fld id="{846CE7D5-CF57-46EF-B807-FDD0502418D4}" type="datetimeFigureOut">
               <a:rPr lang="en-US" smtClean="0"/>
-              <a:t>11/2/2023</a:t>
+              <a:t>11/3/2023</a:t>
             </a:fld>
             <a:endParaRPr lang="en-US"/>
           </a:p>
@@ -795,7 +796,7 @@
           <a:p>
             <a:fld id="{846CE7D5-CF57-46EF-B807-FDD0502418D4}" type="datetimeFigureOut">
               <a:rPr lang="en-US" smtClean="0"/>
-              <a:t>11/2/2023</a:t>
+              <a:t>11/3/2023</a:t>
             </a:fld>
             <a:endParaRPr lang="en-US"/>
           </a:p>
@@ -1040,7 +1041,7 @@
           <a:p>
             <a:fld id="{846CE7D5-CF57-46EF-B807-FDD0502418D4}" type="datetimeFigureOut">
               <a:rPr lang="en-US" smtClean="0"/>
-              <a:t>11/2/2023</a:t>
+              <a:t>11/3/2023</a:t>
             </a:fld>
             <a:endParaRPr lang="en-US"/>
           </a:p>
@@ -1269,7 +1270,7 @@
           <a:p>
             <a:fld id="{846CE7D5-CF57-46EF-B807-FDD0502418D4}" type="datetimeFigureOut">
               <a:rPr lang="en-US" smtClean="0"/>
-              <a:t>11/2/2023</a:t>
+              <a:t>11/3/2023</a:t>
             </a:fld>
             <a:endParaRPr lang="en-US"/>
           </a:p>
@@ -1633,7 +1634,7 @@
           <a:p>
             <a:fld id="{846CE7D5-CF57-46EF-B807-FDD0502418D4}" type="datetimeFigureOut">
               <a:rPr lang="en-US" smtClean="0"/>
-              <a:t>11/2/2023</a:t>
+              <a:t>11/3/2023</a:t>
             </a:fld>
             <a:endParaRPr lang="en-US"/>
           </a:p>
@@ -1750,7 +1751,7 @@
           <a:p>
             <a:fld id="{846CE7D5-CF57-46EF-B807-FDD0502418D4}" type="datetimeFigureOut">
               <a:rPr lang="en-US" smtClean="0"/>
-              <a:t>11/2/2023</a:t>
+              <a:t>11/3/2023</a:t>
             </a:fld>
             <a:endParaRPr lang="en-US"/>
           </a:p>
@@ -1845,7 +1846,7 @@
           <a:p>
             <a:fld id="{846CE7D5-CF57-46EF-B807-FDD0502418D4}" type="datetimeFigureOut">
               <a:rPr lang="en-US" smtClean="0"/>
-              <a:t>11/2/2023</a:t>
+              <a:t>11/3/2023</a:t>
             </a:fld>
             <a:endParaRPr lang="en-US"/>
           </a:p>
@@ -2120,7 +2121,7 @@
           <a:p>
             <a:fld id="{846CE7D5-CF57-46EF-B807-FDD0502418D4}" type="datetimeFigureOut">
               <a:rPr lang="en-US" smtClean="0"/>
-              <a:t>11/2/2023</a:t>
+              <a:t>11/3/2023</a:t>
             </a:fld>
             <a:endParaRPr lang="en-US"/>
           </a:p>
@@ -2375,7 +2376,7 @@
           <a:p>
             <a:fld id="{846CE7D5-CF57-46EF-B807-FDD0502418D4}" type="datetimeFigureOut">
               <a:rPr lang="en-US" smtClean="0"/>
-              <a:t>11/2/2023</a:t>
+              <a:t>11/3/2023</a:t>
             </a:fld>
             <a:endParaRPr lang="en-US"/>
           </a:p>
@@ -2586,7 +2587,7 @@
           <a:p>
             <a:fld id="{846CE7D5-CF57-46EF-B807-FDD0502418D4}" type="datetimeFigureOut">
               <a:rPr lang="en-US" smtClean="0"/>
-              <a:t>11/2/2023</a:t>
+              <a:t>11/3/2023</a:t>
             </a:fld>
             <a:endParaRPr lang="en-US"/>
           </a:p>
@@ -4363,13 +4364,13 @@
               <a:buNone/>
             </a:pPr>
             <a:r>
-              <a:rPr lang="en-US" sz="5100" b="1">
+              <a:rPr lang="en-US" sz="5100" b="1" dirty="0">
                 <a:ea typeface="+mn-lt"/>
                 <a:cs typeface="+mn-lt"/>
               </a:rPr>
               <a:t>Implementation Steps</a:t>
             </a:r>
-            <a:endParaRPr lang="en-US" sz="3800">
+            <a:endParaRPr lang="en-US" sz="3800" dirty="0">
               <a:cs typeface="Calibri" panose="020F0502020204030204"/>
             </a:endParaRPr>
           </a:p>
@@ -4378,14 +4379,14 @@
               <a:buNone/>
             </a:pPr>
             <a:r>
-              <a:rPr lang="en-US" sz="1500" b="1">
+              <a:rPr lang="en-US" sz="1500" b="1" dirty="0">
                 <a:ea typeface="+mn-lt"/>
                 <a:cs typeface="+mn-lt"/>
               </a:rPr>
               <a:t>Initialization</a:t>
             </a:r>
             <a:r>
-              <a:rPr lang="en-US" sz="1500">
+              <a:rPr lang="en-US" sz="1500" dirty="0">
                 <a:ea typeface="+mn-lt"/>
                 <a:cs typeface="+mn-lt"/>
               </a:rPr>
@@ -4394,21 +4395,21 @@
           </a:p>
           <a:p>
             <a:r>
-              <a:rPr lang="en-US" sz="1500">
+              <a:rPr lang="en-US" sz="1500" dirty="0">
                 <a:latin typeface="Arial"/>
                 <a:cs typeface="Arial"/>
               </a:rPr>
               <a:t>Start with the initial puzzle state and a </a:t>
             </a:r>
             <a:r>
-              <a:rPr lang="en-US" sz="1500" u="sng">
+              <a:rPr lang="en-US" sz="1500" u="sng" dirty="0">
                 <a:latin typeface="Arial"/>
                 <a:cs typeface="Arial"/>
               </a:rPr>
               <a:t>priority</a:t>
             </a:r>
             <a:r>
-              <a:rPr lang="en-US" sz="1500">
+              <a:rPr lang="en-US" sz="1500" dirty="0">
                 <a:latin typeface="Arial"/>
                 <a:cs typeface="Arial"/>
               </a:rPr>
@@ -4417,13 +4418,13 @@
           </a:p>
           <a:p>
             <a:r>
-              <a:rPr lang="en-US" sz="1500">
+              <a:rPr lang="en-US" sz="1500" dirty="0">
                 <a:ea typeface="+mn-lt"/>
                 <a:cs typeface="+mn-lt"/>
               </a:rPr>
               <a:t>Nodes are ordered by the sum of depth and heuristic value with lower having a higher priority.</a:t>
             </a:r>
-            <a:endParaRPr lang="en-US" sz="1500">
+            <a:endParaRPr lang="en-US" sz="1500" dirty="0">
               <a:latin typeface="Arial"/>
               <a:ea typeface="+mn-lt"/>
               <a:cs typeface="Arial"/>
@@ -4434,14 +4435,14 @@
               <a:buNone/>
             </a:pPr>
             <a:r>
-              <a:rPr lang="en-US" sz="1500" b="1">
+              <a:rPr lang="en-US" sz="1500" b="1" dirty="0">
                 <a:ea typeface="+mn-lt"/>
                 <a:cs typeface="+mn-lt"/>
               </a:rPr>
               <a:t>Exploration</a:t>
             </a:r>
             <a:r>
-              <a:rPr lang="en-US" sz="1500">
+              <a:rPr lang="en-US" sz="1500" dirty="0">
                 <a:ea typeface="+mn-lt"/>
                 <a:cs typeface="+mn-lt"/>
               </a:rPr>
@@ -4450,7 +4451,7 @@
           </a:p>
           <a:p>
             <a:r>
-              <a:rPr lang="en-US" sz="1500">
+              <a:rPr lang="en-US" sz="1500" dirty="0">
                 <a:latin typeface="Arial"/>
                 <a:cs typeface="Arial"/>
               </a:rPr>
@@ -4460,17 +4461,17 @@
           <a:p>
             <a:pPr lvl="1"/>
             <a:r>
-              <a:rPr lang="en-US" sz="1500">
+              <a:rPr lang="en-US" sz="1500" dirty="0">
                 <a:latin typeface="Arial"/>
                 <a:cs typeface="Arial"/>
               </a:rPr>
-              <a:t>Dequeue a node and store it in a list of visited nodes.</a:t>
+              <a:t>Dequeue a node and store it in a hashed set of visited nodes.</a:t>
             </a:r>
           </a:p>
           <a:p>
             <a:pPr lvl="1"/>
             <a:r>
-              <a:rPr lang="en-US" sz="1500">
+              <a:rPr lang="en-US" sz="1500" dirty="0">
                 <a:latin typeface="Arial"/>
                 <a:cs typeface="Arial"/>
               </a:rPr>
@@ -4480,7 +4481,7 @@
           <a:p>
             <a:pPr lvl="1"/>
             <a:r>
-              <a:rPr lang="en-US" sz="1500">
+              <a:rPr lang="en-US" sz="1500" dirty="0">
                 <a:latin typeface="Arial"/>
                 <a:cs typeface="Arial"/>
               </a:rPr>
@@ -4490,7 +4491,7 @@
           <a:p>
             <a:pPr lvl="1"/>
             <a:r>
-              <a:rPr lang="en-US" sz="1500">
+              <a:rPr lang="en-US" sz="1500" dirty="0">
                 <a:latin typeface="Arial"/>
                 <a:cs typeface="Arial"/>
               </a:rPr>
@@ -4500,7 +4501,7 @@
           <a:p>
             <a:pPr lvl="1"/>
             <a:r>
-              <a:rPr lang="en-US" sz="1500">
+              <a:rPr lang="en-US" sz="1500" dirty="0">
                 <a:latin typeface="Arial"/>
                 <a:cs typeface="Arial"/>
               </a:rPr>
@@ -4508,7 +4509,7 @@
             </a:r>
           </a:p>
           <a:p>
-            <a:endParaRPr lang="en-US">
+            <a:endParaRPr lang="en-US" dirty="0">
               <a:cs typeface="Calibri"/>
             </a:endParaRPr>
           </a:p>
@@ -5703,7 +5704,7 @@
       </p:grpSpPr>
       <p:sp useBgFill="1">
         <p:nvSpPr>
-          <p:cNvPr id="19" name="Rectangle 18">
+          <p:cNvPr id="26" name="Rectangle 25">
             <a:extLst>
               <a:ext uri="{FF2B5EF4-FFF2-40B4-BE49-F238E27FC236}">
                 <a16:creationId xmlns:a16="http://schemas.microsoft.com/office/drawing/2014/main" id="{A51A0227-072A-4F5F-928C-E2C3E5CCD10C}"/>
@@ -5801,10 +5802,10 @@
       </p:sp>
       <p:pic>
         <p:nvPicPr>
-          <p:cNvPr id="7" name="Picture 6" descr="A graph of a number of nodes&#10;&#10;Description automatically generated">
+          <p:cNvPr id="9" name="Picture 8" descr="A graph with different colored squares&#10;&#10;Description automatically generated">
             <a:extLst>
               <a:ext uri="{FF2B5EF4-FFF2-40B4-BE49-F238E27FC236}">
-                <a16:creationId xmlns:a16="http://schemas.microsoft.com/office/drawing/2014/main" id="{3A5875D7-0B7D-5096-E130-C32D33809825}"/>
+                <a16:creationId xmlns:a16="http://schemas.microsoft.com/office/drawing/2014/main" id="{7685CF0D-78A1-4865-1A33-897A6F798C4A}"/>
               </a:ext>
             </a:extLst>
           </p:cNvPr>
@@ -5814,7 +5815,13 @@
           <p:nvPr/>
         </p:nvPicPr>
         <p:blipFill>
-          <a:blip r:embed="rId2"/>
+          <a:blip r:embed="rId2">
+            <a:extLst>
+              <a:ext uri="{28A0092B-C50C-407E-A947-70E740481C1C}">
+                <a14:useLocalDpi xmlns:a14="http://schemas.microsoft.com/office/drawing/2010/main" val="0"/>
+              </a:ext>
+            </a:extLst>
+          </a:blip>
           <a:stretch>
             <a:fillRect/>
           </a:stretch>
@@ -5831,10 +5838,10 @@
       </p:pic>
       <p:pic>
         <p:nvPicPr>
-          <p:cNvPr id="5" name="Picture 4">
+          <p:cNvPr id="6" name="Picture 5" descr="A graph of a number of nodes&#10;&#10;Description automatically generated">
             <a:extLst>
               <a:ext uri="{FF2B5EF4-FFF2-40B4-BE49-F238E27FC236}">
-                <a16:creationId xmlns:a16="http://schemas.microsoft.com/office/drawing/2014/main" id="{07901ACC-8164-C3B6-EE0B-0E08DC85BD9A}"/>
+                <a16:creationId xmlns:a16="http://schemas.microsoft.com/office/drawing/2014/main" id="{95128061-103D-A884-5726-4E252F6F9950}"/>
               </a:ext>
             </a:extLst>
           </p:cNvPr>
@@ -5844,7 +5851,13 @@
           <p:nvPr/>
         </p:nvPicPr>
         <p:blipFill>
-          <a:blip r:embed="rId3"/>
+          <a:blip r:embed="rId3">
+            <a:extLst>
+              <a:ext uri="{28A0092B-C50C-407E-A947-70E740481C1C}">
+                <a14:useLocalDpi xmlns:a14="http://schemas.microsoft.com/office/drawing/2010/main" val="0"/>
+              </a:ext>
+            </a:extLst>
+          </a:blip>
           <a:stretch>
             <a:fillRect/>
           </a:stretch>
@@ -5861,7 +5874,7 @@
       </p:pic>
       <p:sp>
         <p:nvSpPr>
-          <p:cNvPr id="21" name="sketchy line">
+          <p:cNvPr id="28" name="sketchy line">
             <a:extLst>
               <a:ext uri="{FF2B5EF4-FFF2-40B4-BE49-F238E27FC236}">
                 <a16:creationId xmlns:a16="http://schemas.microsoft.com/office/drawing/2014/main" id="{35D99776-4B38-47DF-A302-11AD9AF87ACA}"/>
@@ -6100,13 +6113,13 @@
         </p:nvSpPr>
         <p:spPr>
           <a:xfrm>
-            <a:off x="5345205" y="4392180"/>
-            <a:ext cx="6214871" cy="2090244"/>
+            <a:off x="5333999" y="4440365"/>
+            <a:ext cx="6214871" cy="1722691"/>
           </a:xfrm>
         </p:spPr>
         <p:txBody>
           <a:bodyPr vert="horz" lIns="91440" tIns="45720" rIns="91440" bIns="45720" rtlCol="0" anchor="ctr">
-            <a:normAutofit lnSpcReduction="10000"/>
+            <a:normAutofit/>
           </a:bodyPr>
           <a:lstStyle/>
           <a:p>
@@ -6114,63 +6127,60 @@
               <a:buNone/>
             </a:pPr>
             <a:r>
-              <a:rPr lang="en-US" sz="1700">
+              <a:rPr lang="en-US" sz="1500" dirty="0">
                 <a:ea typeface="+mn-lt"/>
                 <a:cs typeface="+mn-lt"/>
               </a:rPr>
               <a:t>Multi-threaded BFS Efficiency:</a:t>
             </a:r>
-            <a:endParaRPr lang="en-US" sz="1700">
+            <a:endParaRPr lang="en-US" sz="1500" dirty="0">
               <a:cs typeface="Calibri" panose="020F0502020204030204"/>
             </a:endParaRPr>
           </a:p>
           <a:p>
             <a:r>
-              <a:rPr lang="en-US" sz="1700">
+              <a:rPr lang="en-US" sz="1500" dirty="0">
                 <a:ea typeface="+mn-lt"/>
                 <a:cs typeface="+mn-lt"/>
               </a:rPr>
-              <a:t>Multi-threaded BFS reduces runtime.</a:t>
-            </a:r>
-            <a:endParaRPr lang="en-US" sz="1700"/>
-          </a:p>
-          <a:p>
-            <a:r>
-              <a:rPr lang="en-US" sz="1700">
+              <a:t>Multi-threaded BFS reduces runtime substantially.</a:t>
+            </a:r>
+            <a:endParaRPr lang="en-US" sz="1500" dirty="0"/>
+          </a:p>
+          <a:p>
+            <a:r>
+              <a:rPr lang="en-US" sz="1500" dirty="0">
                 <a:ea typeface="+mn-lt"/>
                 <a:cs typeface="+mn-lt"/>
               </a:rPr>
               <a:t>It evenly distributes the workload across multiple processors.</a:t>
             </a:r>
-            <a:endParaRPr lang="en-US" sz="1700"/>
-          </a:p>
-          <a:p>
-            <a:r>
-              <a:rPr lang="en-US" sz="1700">
+            <a:endParaRPr lang="en-US" sz="1500" dirty="0"/>
+          </a:p>
+          <a:p>
+            <a:r>
+              <a:rPr lang="en-US" sz="1500" dirty="0">
                 <a:ea typeface="+mn-lt"/>
                 <a:cs typeface="+mn-lt"/>
               </a:rPr>
-              <a:t>Achieves the same number of nodes visited as BFS, maintaining accuracy.</a:t>
-            </a:r>
+              <a:t>Achieves the same number of nodes visited as BFS.</a:t>
+            </a:r>
+          </a:p>
+          <a:p>
+            <a:r>
+              <a:rPr lang="en-US" sz="1500" dirty="0">
+                <a:ea typeface="+mn-lt"/>
+                <a:cs typeface="+mn-lt"/>
+              </a:rPr>
+              <a:t>A* outperforms  BFS and Multithreaded BFS in Runtime and Nodes visited.</a:t>
+            </a:r>
+            <a:endParaRPr lang="en-US" sz="1500" dirty="0"/>
           </a:p>
           <a:p>
             <a:pPr marL="0" indent="0">
               <a:buNone/>
             </a:pPr>
-            <a:r>
-              <a:rPr lang="en-US" sz="1600">
-                <a:ea typeface="+mn-lt"/>
-                <a:cs typeface="+mn-lt"/>
-              </a:rPr>
-              <a:t>A* outperforms  BFS and Multithreaded BFS in Runtime and Nodes visited.</a:t>
-            </a:r>
-            <a:endParaRPr lang="en-US" sz="1600"/>
-          </a:p>
-          <a:p>
-            <a:pPr marL="0" indent="0">
-              <a:buNone/>
-            </a:pPr>
-            <a:endParaRPr lang="en-US" sz="1700">
+            <a:endParaRPr lang="en-US" sz="1500" dirty="0">
               <a:cs typeface="Calibri"/>
             </a:endParaRPr>
           </a:p>
@@ -6216,10 +6226,10 @@
       </p:grpSpPr>
       <p:sp useBgFill="1">
         <p:nvSpPr>
-          <p:cNvPr id="64" name="Rectangle 63">
+          <p:cNvPr id="71" name="Rectangle 70">
             <a:extLst>
               <a:ext uri="{FF2B5EF4-FFF2-40B4-BE49-F238E27FC236}">
-                <a16:creationId xmlns:a16="http://schemas.microsoft.com/office/drawing/2014/main" id="{5AC1364A-3E3D-4F0D-8776-78AF3A270DD6}"/>
+                <a16:creationId xmlns:a16="http://schemas.microsoft.com/office/drawing/2014/main" id="{A51A0227-072A-4F5F-928C-E2C3E5CCD10C}"/>
               </a:ext>
               <a:ext uri="{C183D7F6-B498-43B3-948B-1728B52AA6E4}">
                 <adec:decorative xmlns:adec="http://schemas.microsoft.com/office/drawing/2017/decorative" val="1"/>
@@ -6292,12 +6302,12 @@
         </p:nvSpPr>
         <p:spPr>
           <a:xfrm>
-            <a:off x="4797501" y="329184"/>
-            <a:ext cx="6755626" cy="1783080"/>
+            <a:off x="630936" y="4440365"/>
+            <a:ext cx="4245864" cy="1722691"/>
           </a:xfrm>
         </p:spPr>
         <p:txBody>
-          <a:bodyPr vert="horz" lIns="91440" tIns="45720" rIns="91440" bIns="45720" rtlCol="0" anchor="b">
+          <a:bodyPr vert="horz" lIns="91440" tIns="45720" rIns="91440" bIns="45720" rtlCol="0" anchor="ctr">
             <a:normAutofit/>
           </a:bodyPr>
           <a:lstStyle/>
@@ -6311,10 +6321,46 @@
       </p:sp>
       <p:pic>
         <p:nvPicPr>
-          <p:cNvPr id="8" name="Content Placeholder 7">
+          <p:cNvPr id="11" name="Picture 10" descr="A graph of a graph&#10;&#10;Description automatically generated">
             <a:extLst>
               <a:ext uri="{FF2B5EF4-FFF2-40B4-BE49-F238E27FC236}">
-                <a16:creationId xmlns:a16="http://schemas.microsoft.com/office/drawing/2014/main" id="{271EFD9D-9F82-DDEC-A5A0-8B83CF508B4D}"/>
+                <a16:creationId xmlns:a16="http://schemas.microsoft.com/office/drawing/2014/main" id="{E9DDA50C-6C23-A95E-4DE0-F762D5A5AE4D}"/>
+              </a:ext>
+            </a:extLst>
+          </p:cNvPr>
+          <p:cNvPicPr>
+            <a:picLocks noChangeAspect="1"/>
+          </p:cNvPicPr>
+          <p:nvPr/>
+        </p:nvPicPr>
+        <p:blipFill>
+          <a:blip r:embed="rId2">
+            <a:extLst>
+              <a:ext uri="{28A0092B-C50C-407E-A947-70E740481C1C}">
+                <a14:useLocalDpi xmlns:a14="http://schemas.microsoft.com/office/drawing/2010/main" val="0"/>
+              </a:ext>
+            </a:extLst>
+          </a:blip>
+          <a:stretch>
+            <a:fillRect/>
+          </a:stretch>
+        </p:blipFill>
+        <p:spPr>
+          <a:xfrm>
+            <a:off x="580855" y="320040"/>
+            <a:ext cx="5236041" cy="3927031"/>
+          </a:xfrm>
+          <a:prstGeom prst="rect">
+            <a:avLst/>
+          </a:prstGeom>
+        </p:spPr>
+      </p:pic>
+      <p:pic>
+        <p:nvPicPr>
+          <p:cNvPr id="9" name="Content Placeholder 8" descr="A graph with red and green lines&#10;&#10;Description automatically generated">
+            <a:extLst>
+              <a:ext uri="{FF2B5EF4-FFF2-40B4-BE49-F238E27FC236}">
+                <a16:creationId xmlns:a16="http://schemas.microsoft.com/office/drawing/2014/main" id="{6291B3E5-D2DF-C47E-4D88-150738D2515B}"/>
               </a:ext>
             </a:extLst>
           </p:cNvPr>
@@ -6326,15 +6372,21 @@
           </p:nvPr>
         </p:nvPicPr>
         <p:blipFill>
-          <a:blip r:embed="rId2"/>
+          <a:blip r:embed="rId3">
+            <a:extLst>
+              <a:ext uri="{28A0092B-C50C-407E-A947-70E740481C1C}">
+                <a14:useLocalDpi xmlns:a14="http://schemas.microsoft.com/office/drawing/2010/main" val="0"/>
+              </a:ext>
+            </a:extLst>
+          </a:blip>
           <a:stretch>
             <a:fillRect/>
           </a:stretch>
         </p:blipFill>
         <p:spPr>
           <a:xfrm>
-            <a:off x="320040" y="112261"/>
-            <a:ext cx="4014216" cy="3010661"/>
+            <a:off x="6372055" y="320040"/>
+            <a:ext cx="5236041" cy="3927031"/>
           </a:xfrm>
           <a:prstGeom prst="rect">
             <a:avLst/>
@@ -6343,10 +6395,10 @@
       </p:pic>
       <p:sp>
         <p:nvSpPr>
-          <p:cNvPr id="66" name="sketchy line">
+          <p:cNvPr id="73" name="sketchy line">
             <a:extLst>
               <a:ext uri="{FF2B5EF4-FFF2-40B4-BE49-F238E27FC236}">
-                <a16:creationId xmlns:a16="http://schemas.microsoft.com/office/drawing/2014/main" id="{3FCFB1DE-0B7E-48CC-BA90-B2AB0889F9D6}"/>
+                <a16:creationId xmlns:a16="http://schemas.microsoft.com/office/drawing/2014/main" id="{35D99776-4B38-47DF-A302-11AD9AF87ACA}"/>
               </a:ext>
               <a:ext uri="{C183D7F6-B498-43B3-948B-1728B52AA6E4}">
                 <adec:decorative xmlns:adec="http://schemas.microsoft.com/office/drawing/2017/decorative" val="1"/>
@@ -6365,47 +6417,31 @@
           </p:nvPr>
         </p:nvSpPr>
         <p:spPr>
-          <a:xfrm>
-            <a:off x="4797494" y="2395728"/>
-            <a:ext cx="4243589" cy="18288"/>
+          <a:xfrm rot="5400000">
+            <a:off x="4337304" y="5292566"/>
+            <a:ext cx="1554480" cy="18288"/>
           </a:xfrm>
           <a:custGeom>
             <a:avLst/>
             <a:gdLst>
-              <a:gd name="connsiteX0" fmla="*/ 0 w 4243589"/>
+              <a:gd name="connsiteX0" fmla="*/ 0 w 1554480"/>
               <a:gd name="connsiteY0" fmla="*/ 0 h 18288"/>
-              <a:gd name="connsiteX1" fmla="*/ 478919 w 4243589"/>
+              <a:gd name="connsiteX1" fmla="*/ 549250 w 1554480"/>
               <a:gd name="connsiteY1" fmla="*/ 0 h 18288"/>
-              <a:gd name="connsiteX2" fmla="*/ 957839 w 4243589"/>
+              <a:gd name="connsiteX2" fmla="*/ 1082954 w 1554480"/>
               <a:gd name="connsiteY2" fmla="*/ 0 h 18288"/>
-              <a:gd name="connsiteX3" fmla="*/ 1521630 w 4243589"/>
+              <a:gd name="connsiteX3" fmla="*/ 1554480 w 1554480"/>
               <a:gd name="connsiteY3" fmla="*/ 0 h 18288"/>
-              <a:gd name="connsiteX4" fmla="*/ 2212729 w 4243589"/>
-              <a:gd name="connsiteY4" fmla="*/ 0 h 18288"/>
-              <a:gd name="connsiteX5" fmla="*/ 2734084 w 4243589"/>
-              <a:gd name="connsiteY5" fmla="*/ 0 h 18288"/>
-              <a:gd name="connsiteX6" fmla="*/ 3255439 w 4243589"/>
-              <a:gd name="connsiteY6" fmla="*/ 0 h 18288"/>
-              <a:gd name="connsiteX7" fmla="*/ 4243589 w 4243589"/>
-              <a:gd name="connsiteY7" fmla="*/ 0 h 18288"/>
-              <a:gd name="connsiteX8" fmla="*/ 4243589 w 4243589"/>
-              <a:gd name="connsiteY8" fmla="*/ 18288 h 18288"/>
-              <a:gd name="connsiteX9" fmla="*/ 3594926 w 4243589"/>
-              <a:gd name="connsiteY9" fmla="*/ 18288 h 18288"/>
-              <a:gd name="connsiteX10" fmla="*/ 3073571 w 4243589"/>
-              <a:gd name="connsiteY10" fmla="*/ 18288 h 18288"/>
-              <a:gd name="connsiteX11" fmla="*/ 2552216 w 4243589"/>
-              <a:gd name="connsiteY11" fmla="*/ 18288 h 18288"/>
-              <a:gd name="connsiteX12" fmla="*/ 1903553 w 4243589"/>
-              <a:gd name="connsiteY12" fmla="*/ 18288 h 18288"/>
-              <a:gd name="connsiteX13" fmla="*/ 1212454 w 4243589"/>
-              <a:gd name="connsiteY13" fmla="*/ 18288 h 18288"/>
-              <a:gd name="connsiteX14" fmla="*/ 733535 w 4243589"/>
-              <a:gd name="connsiteY14" fmla="*/ 18288 h 18288"/>
-              <a:gd name="connsiteX15" fmla="*/ 0 w 4243589"/>
-              <a:gd name="connsiteY15" fmla="*/ 18288 h 18288"/>
-              <a:gd name="connsiteX16" fmla="*/ 0 w 4243589"/>
-              <a:gd name="connsiteY16" fmla="*/ 0 h 18288"/>
+              <a:gd name="connsiteX4" fmla="*/ 1554480 w 1554480"/>
+              <a:gd name="connsiteY4" fmla="*/ 18288 h 18288"/>
+              <a:gd name="connsiteX5" fmla="*/ 1067410 w 1554480"/>
+              <a:gd name="connsiteY5" fmla="*/ 18288 h 18288"/>
+              <a:gd name="connsiteX6" fmla="*/ 549250 w 1554480"/>
+              <a:gd name="connsiteY6" fmla="*/ 18288 h 18288"/>
+              <a:gd name="connsiteX7" fmla="*/ 0 w 1554480"/>
+              <a:gd name="connsiteY7" fmla="*/ 18288 h 18288"/>
+              <a:gd name="connsiteX8" fmla="*/ 0 w 1554480"/>
+              <a:gd name="connsiteY8" fmla="*/ 0 h 18288"/>
             </a:gdLst>
             <a:ahLst/>
             <a:cxnLst>
@@ -6436,201 +6472,97 @@
               <a:cxn ang="0">
                 <a:pos x="connsiteX8" y="connsiteY8"/>
               </a:cxn>
-              <a:cxn ang="0">
-                <a:pos x="connsiteX9" y="connsiteY9"/>
-              </a:cxn>
-              <a:cxn ang="0">
-                <a:pos x="connsiteX10" y="connsiteY10"/>
-              </a:cxn>
-              <a:cxn ang="0">
-                <a:pos x="connsiteX11" y="connsiteY11"/>
-              </a:cxn>
-              <a:cxn ang="0">
-                <a:pos x="connsiteX12" y="connsiteY12"/>
-              </a:cxn>
-              <a:cxn ang="0">
-                <a:pos x="connsiteX13" y="connsiteY13"/>
-              </a:cxn>
-              <a:cxn ang="0">
-                <a:pos x="connsiteX14" y="connsiteY14"/>
-              </a:cxn>
-              <a:cxn ang="0">
-                <a:pos x="connsiteX15" y="connsiteY15"/>
-              </a:cxn>
-              <a:cxn ang="0">
-                <a:pos x="connsiteX16" y="connsiteY16"/>
-              </a:cxn>
             </a:cxnLst>
             <a:rect l="l" t="t" r="r" b="b"/>
             <a:pathLst>
-              <a:path w="4243589" h="18288" fill="none" extrusionOk="0">
+              <a:path w="1554480" h="18288" fill="none" extrusionOk="0">
                 <a:moveTo>
                   <a:pt x="0" y="0"/>
                 </a:moveTo>
                 <a:cubicBezTo>
-                  <a:pt x="213395" y="-21006"/>
-                  <a:pt x="307421" y="-18116"/>
-                  <a:pt x="478919" y="0"/>
-                </a:cubicBezTo>
-                <a:cubicBezTo>
-                  <a:pt x="650417" y="18116"/>
-                  <a:pt x="831092" y="-21237"/>
-                  <a:pt x="957839" y="0"/>
-                </a:cubicBezTo>
-                <a:cubicBezTo>
-                  <a:pt x="1084586" y="21237"/>
-                  <a:pt x="1301682" y="25124"/>
-                  <a:pt x="1521630" y="0"/>
-                </a:cubicBezTo>
-                <a:cubicBezTo>
-                  <a:pt x="1741578" y="-25124"/>
-                  <a:pt x="1970269" y="-29139"/>
-                  <a:pt x="2212729" y="0"/>
-                </a:cubicBezTo>
-                <a:cubicBezTo>
-                  <a:pt x="2455189" y="29139"/>
-                  <a:pt x="2558847" y="-4796"/>
-                  <a:pt x="2734084" y="0"/>
-                </a:cubicBezTo>
-                <a:cubicBezTo>
-                  <a:pt x="2909321" y="4796"/>
-                  <a:pt x="3097217" y="-13409"/>
-                  <a:pt x="3255439" y="0"/>
-                </a:cubicBezTo>
-                <a:cubicBezTo>
-                  <a:pt x="3413662" y="13409"/>
-                  <a:pt x="3979999" y="-10121"/>
-                  <a:pt x="4243589" y="0"/>
-                </a:cubicBezTo>
-                <a:cubicBezTo>
-                  <a:pt x="4244484" y="8974"/>
-                  <a:pt x="4243043" y="9359"/>
-                  <a:pt x="4243589" y="18288"/>
-                </a:cubicBezTo>
-                <a:cubicBezTo>
-                  <a:pt x="4058777" y="31246"/>
-                  <a:pt x="3910348" y="3158"/>
-                  <a:pt x="3594926" y="18288"/>
-                </a:cubicBezTo>
-                <a:cubicBezTo>
-                  <a:pt x="3279504" y="33418"/>
-                  <a:pt x="3319955" y="-3977"/>
-                  <a:pt x="3073571" y="18288"/>
-                </a:cubicBezTo>
-                <a:cubicBezTo>
-                  <a:pt x="2827187" y="40553"/>
-                  <a:pt x="2767387" y="1863"/>
-                  <a:pt x="2552216" y="18288"/>
-                </a:cubicBezTo>
-                <a:cubicBezTo>
-                  <a:pt x="2337046" y="34713"/>
-                  <a:pt x="2181871" y="19527"/>
-                  <a:pt x="1903553" y="18288"/>
-                </a:cubicBezTo>
-                <a:cubicBezTo>
-                  <a:pt x="1625235" y="17049"/>
-                  <a:pt x="1557672" y="24174"/>
-                  <a:pt x="1212454" y="18288"/>
-                </a:cubicBezTo>
-                <a:cubicBezTo>
-                  <a:pt x="867236" y="12402"/>
-                  <a:pt x="874382" y="15627"/>
-                  <a:pt x="733535" y="18288"/>
-                </a:cubicBezTo>
-                <a:cubicBezTo>
-                  <a:pt x="592688" y="20949"/>
-                  <a:pt x="183477" y="14753"/>
+                  <a:pt x="114141" y="-19864"/>
+                  <a:pt x="345055" y="-1657"/>
+                  <a:pt x="549250" y="0"/>
+                </a:cubicBezTo>
+                <a:cubicBezTo>
+                  <a:pt x="753445" y="1657"/>
+                  <a:pt x="862292" y="-5674"/>
+                  <a:pt x="1082954" y="0"/>
+                </a:cubicBezTo>
+                <a:cubicBezTo>
+                  <a:pt x="1303616" y="5674"/>
+                  <a:pt x="1363530" y="4537"/>
+                  <a:pt x="1554480" y="0"/>
+                </a:cubicBezTo>
+                <a:cubicBezTo>
+                  <a:pt x="1554963" y="7176"/>
+                  <a:pt x="1553909" y="13682"/>
+                  <a:pt x="1554480" y="18288"/>
+                </a:cubicBezTo>
+                <a:cubicBezTo>
+                  <a:pt x="1338847" y="6127"/>
+                  <a:pt x="1215066" y="37851"/>
+                  <a:pt x="1067410" y="18288"/>
+                </a:cubicBezTo>
+                <a:cubicBezTo>
+                  <a:pt x="919754" y="-1275"/>
+                  <a:pt x="800465" y="3080"/>
+                  <a:pt x="549250" y="18288"/>
+                </a:cubicBezTo>
+                <a:cubicBezTo>
+                  <a:pt x="298035" y="33496"/>
+                  <a:pt x="158868" y="22769"/>
                   <a:pt x="0" y="18288"/>
                 </a:cubicBezTo>
                 <a:cubicBezTo>
-                  <a:pt x="-229" y="14222"/>
-                  <a:pt x="509" y="5816"/>
+                  <a:pt x="-655" y="13237"/>
+                  <a:pt x="709" y="4645"/>
                   <a:pt x="0" y="0"/>
                 </a:cubicBezTo>
                 <a:close/>
               </a:path>
-              <a:path w="4243589" h="18288" stroke="0" extrusionOk="0">
+              <a:path w="1554480" h="18288" stroke="0" extrusionOk="0">
                 <a:moveTo>
                   <a:pt x="0" y="0"/>
                 </a:moveTo>
                 <a:cubicBezTo>
-                  <a:pt x="143690" y="16630"/>
-                  <a:pt x="266667" y="14847"/>
-                  <a:pt x="521355" y="0"/>
-                </a:cubicBezTo>
-                <a:cubicBezTo>
-                  <a:pt x="776043" y="-14847"/>
-                  <a:pt x="814491" y="-17363"/>
-                  <a:pt x="1000275" y="0"/>
-                </a:cubicBezTo>
-                <a:cubicBezTo>
-                  <a:pt x="1186059" y="17363"/>
-                  <a:pt x="1352504" y="-23507"/>
-                  <a:pt x="1521630" y="0"/>
-                </a:cubicBezTo>
-                <a:cubicBezTo>
-                  <a:pt x="1690756" y="23507"/>
-                  <a:pt x="1889525" y="5871"/>
-                  <a:pt x="2127857" y="0"/>
-                </a:cubicBezTo>
-                <a:cubicBezTo>
-                  <a:pt x="2366189" y="-5871"/>
-                  <a:pt x="2620628" y="-27997"/>
-                  <a:pt x="2776520" y="0"/>
-                </a:cubicBezTo>
-                <a:cubicBezTo>
-                  <a:pt x="2932412" y="27997"/>
-                  <a:pt x="3131683" y="-25073"/>
-                  <a:pt x="3467618" y="0"/>
-                </a:cubicBezTo>
-                <a:cubicBezTo>
-                  <a:pt x="3803553" y="25073"/>
-                  <a:pt x="4017371" y="3071"/>
-                  <a:pt x="4243589" y="0"/>
-                </a:cubicBezTo>
-                <a:cubicBezTo>
-                  <a:pt x="4243134" y="6162"/>
-                  <a:pt x="4243492" y="11775"/>
-                  <a:pt x="4243589" y="18288"/>
-                </a:cubicBezTo>
-                <a:cubicBezTo>
-                  <a:pt x="4017834" y="-5779"/>
-                  <a:pt x="3834586" y="13376"/>
-                  <a:pt x="3594926" y="18288"/>
-                </a:cubicBezTo>
-                <a:cubicBezTo>
-                  <a:pt x="3355266" y="23200"/>
-                  <a:pt x="3204179" y="2869"/>
-                  <a:pt x="2903827" y="18288"/>
-                </a:cubicBezTo>
-                <a:cubicBezTo>
-                  <a:pt x="2603475" y="33707"/>
-                  <a:pt x="2526187" y="46187"/>
-                  <a:pt x="2212729" y="18288"/>
-                </a:cubicBezTo>
-                <a:cubicBezTo>
-                  <a:pt x="1899271" y="-9611"/>
-                  <a:pt x="1966289" y="29692"/>
-                  <a:pt x="1733809" y="18288"/>
-                </a:cubicBezTo>
-                <a:cubicBezTo>
-                  <a:pt x="1501329" y="6884"/>
-                  <a:pt x="1343612" y="12492"/>
-                  <a:pt x="1085146" y="18288"/>
-                </a:cubicBezTo>
-                <a:cubicBezTo>
-                  <a:pt x="826680" y="24084"/>
-                  <a:pt x="778184" y="35607"/>
-                  <a:pt x="521355" y="18288"/>
-                </a:cubicBezTo>
-                <a:cubicBezTo>
-                  <a:pt x="264526" y="969"/>
-                  <a:pt x="120277" y="4268"/>
+                  <a:pt x="249941" y="-58"/>
+                  <a:pt x="367334" y="23448"/>
+                  <a:pt x="502615" y="0"/>
+                </a:cubicBezTo>
+                <a:cubicBezTo>
+                  <a:pt x="637897" y="-23448"/>
+                  <a:pt x="813653" y="-20418"/>
+                  <a:pt x="974141" y="0"/>
+                </a:cubicBezTo>
+                <a:cubicBezTo>
+                  <a:pt x="1134629" y="20418"/>
+                  <a:pt x="1268772" y="6288"/>
+                  <a:pt x="1554480" y="0"/>
+                </a:cubicBezTo>
+                <a:cubicBezTo>
+                  <a:pt x="1554917" y="7222"/>
+                  <a:pt x="1555359" y="13299"/>
+                  <a:pt x="1554480" y="18288"/>
+                </a:cubicBezTo>
+                <a:cubicBezTo>
+                  <a:pt x="1336087" y="12172"/>
+                  <a:pt x="1310024" y="19759"/>
+                  <a:pt x="1067410" y="18288"/>
+                </a:cubicBezTo>
+                <a:cubicBezTo>
+                  <a:pt x="824796" y="16818"/>
+                  <a:pt x="787902" y="34647"/>
+                  <a:pt x="518160" y="18288"/>
+                </a:cubicBezTo>
+                <a:cubicBezTo>
+                  <a:pt x="248418" y="1930"/>
+                  <a:pt x="133160" y="9205"/>
                   <a:pt x="0" y="18288"/>
                 </a:cubicBezTo>
                 <a:cubicBezTo>
-                  <a:pt x="766" y="10800"/>
-                  <a:pt x="-457" y="8180"/>
+                  <a:pt x="-643" y="9451"/>
+                  <a:pt x="-340" y="7114"/>
                   <a:pt x="0" y="0"/>
                 </a:cubicBezTo>
                 <a:close/>
@@ -6647,7 +6579,7 @@
             <a:round/>
             <a:extLst>
               <a:ext uri="{C807C97D-BFC1-408E-A445-0C87EB9F89A2}">
-                <ask:lineSketchStyleProps xmlns:ask="http://schemas.microsoft.com/office/drawing/2018/sketchyshapes" sd="2727557108">
+                <ask:lineSketchStyleProps xmlns:ask="http://schemas.microsoft.com/office/drawing/2018/sketchyshapes" sd="1219033472">
                   <a:prstGeom prst="rect">
                     <a:avLst/>
                   </a:prstGeom>
@@ -6684,36 +6616,6 @@
           </a:p>
         </p:txBody>
       </p:sp>
-      <p:pic>
-        <p:nvPicPr>
-          <p:cNvPr id="5" name="Picture 4">
-            <a:extLst>
-              <a:ext uri="{FF2B5EF4-FFF2-40B4-BE49-F238E27FC236}">
-                <a16:creationId xmlns:a16="http://schemas.microsoft.com/office/drawing/2014/main" id="{44426D3C-E7F2-2068-788A-C59BA3F5C2BE}"/>
-              </a:ext>
-            </a:extLst>
-          </p:cNvPr>
-          <p:cNvPicPr>
-            <a:picLocks noChangeAspect="1"/>
-          </p:cNvPicPr>
-          <p:nvPr/>
-        </p:nvPicPr>
-        <p:blipFill>
-          <a:blip r:embed="rId3"/>
-          <a:stretch>
-            <a:fillRect/>
-          </a:stretch>
-        </p:blipFill>
-        <p:spPr>
-          <a:xfrm>
-            <a:off x="212833" y="3236318"/>
-            <a:ext cx="4389637" cy="3303434"/>
-          </a:xfrm>
-          <a:prstGeom prst="rect">
-            <a:avLst/>
-          </a:prstGeom>
-        </p:spPr>
-      </p:pic>
       <p:sp>
         <p:nvSpPr>
           <p:cNvPr id="4" name="TextBox 3">
@@ -6728,15 +6630,15 @@
         </p:nvSpPr>
         <p:spPr>
           <a:xfrm>
-            <a:off x="4797494" y="2706624"/>
-            <a:ext cx="6755626" cy="3483864"/>
+            <a:off x="5333999" y="4440365"/>
+            <a:ext cx="6214871" cy="1722691"/>
           </a:xfrm>
           <a:prstGeom prst="rect">
             <a:avLst/>
           </a:prstGeom>
         </p:spPr>
         <p:txBody>
-          <a:bodyPr rot="0" spcFirstLastPara="0" vertOverflow="overflow" horzOverflow="overflow" vert="horz" lIns="91440" tIns="45720" rIns="91440" bIns="45720" numCol="1" spcCol="0" rtlCol="0" fromWordArt="0" anchor="t" anchorCtr="0" forceAA="0" compatLnSpc="1">
+          <a:bodyPr rot="0" spcFirstLastPara="0" vertOverflow="overflow" horzOverflow="overflow" vert="horz" lIns="91440" tIns="45720" rIns="91440" bIns="45720" numCol="1" spcCol="0" rtlCol="0" fromWordArt="0" anchor="ctr" anchorCtr="0" forceAA="0" compatLnSpc="1">
             <a:prstTxWarp prst="textNoShape">
               <a:avLst/>
             </a:prstTxWarp>
@@ -6755,15 +6657,12 @@
               <a:buChar char="•"/>
             </a:pPr>
             <a:r>
-              <a:rPr lang="en-US" sz="2200"/>
+              <a:rPr lang="en-US" sz="1200" dirty="0"/>
               <a:t>BFS and Multithreaded BFS visit the same number of nodes while A*'s use of a heuristics requires far less nodes to be visited.</a:t>
             </a:r>
-            <a:endParaRPr lang="en-US" sz="2200">
-              <a:cs typeface="Calibri"/>
-            </a:endParaRPr>
-          </a:p>
-          <a:p>
-            <a:pPr marL="285750" indent="-285750">
+          </a:p>
+          <a:p>
+            <a:pPr marL="285750" indent="-228600">
               <a:lnSpc>
                 <a:spcPct val="90000"/>
               </a:lnSpc>
@@ -6774,15 +6673,12 @@
               <a:buChar char="•"/>
             </a:pPr>
             <a:r>
-              <a:rPr lang="en-US" sz="2200">
-                <a:ea typeface="+mn-lt"/>
-                <a:cs typeface="+mn-lt"/>
-              </a:rPr>
+              <a:rPr lang="en-US" sz="1200" dirty="0"/>
               <a:t>A* outperforms these other algorithms through its significantly faster runtime as the heuristic allows A* to skip the majority of nodes.</a:t>
             </a:r>
           </a:p>
           <a:p>
-            <a:pPr marL="285750" indent="-285750">
+            <a:pPr marL="285750" indent="-228600">
               <a:lnSpc>
                 <a:spcPct val="90000"/>
               </a:lnSpc>
@@ -6793,24 +6689,15 @@
               <a:buChar char="•"/>
             </a:pPr>
             <a:r>
-              <a:rPr lang="en-US" sz="2200">
-                <a:ea typeface="Calibri"/>
-                <a:cs typeface="Calibri" panose="020F0502020204030204"/>
-              </a:rPr>
+              <a:rPr lang="en-US" sz="1200" dirty="0"/>
               <a:t>We can see that as the depth increases (moves to goal), the runtime increases exponentially for BFS but not A* since A* skips most nodes at each depth. This demonstrates the O(</a:t>
             </a:r>
             <a:r>
-              <a:rPr lang="en-US" sz="2200" err="1">
-                <a:ea typeface="Calibri"/>
-                <a:cs typeface="Calibri" panose="020F0502020204030204"/>
-              </a:rPr>
+              <a:rPr lang="en-US" sz="1200" dirty="0" err="1"/>
               <a:t>b^d</a:t>
             </a:r>
             <a:r>
-              <a:rPr lang="en-US" sz="2200">
-                <a:ea typeface="Calibri"/>
-                <a:cs typeface="Calibri" panose="020F0502020204030204"/>
-              </a:rPr>
+              <a:rPr lang="en-US" sz="1200" dirty="0"/>
               <a:t>) time complexity of BFS.</a:t>
             </a:r>
           </a:p>
@@ -6825,24 +6712,20 @@
               <a:buFont typeface="Arial" panose="020B0604020202020204" pitchFamily="34" charset="0"/>
               <a:buChar char="•"/>
             </a:pPr>
-            <a:endParaRPr lang="en-US" sz="2200">
-              <a:ea typeface="Calibri"/>
-              <a:cs typeface="Calibri" panose="020F0502020204030204"/>
-            </a:endParaRPr>
-          </a:p>
-          <a:p>
-            <a:pPr marL="114300">
+            <a:endParaRPr lang="en-US" sz="1200" dirty="0"/>
+          </a:p>
+          <a:p>
+            <a:pPr marL="114300" indent="-228600">
               <a:lnSpc>
                 <a:spcPct val="90000"/>
               </a:lnSpc>
               <a:spcAft>
                 <a:spcPts val="600"/>
               </a:spcAft>
+              <a:buFont typeface="Arial" panose="020B0604020202020204" pitchFamily="34" charset="0"/>
+              <a:buChar char="•"/>
             </a:pPr>
-            <a:endParaRPr lang="en-US" sz="2200">
-              <a:ea typeface="Calibri"/>
-              <a:cs typeface="Calibri" panose="020F0502020204030204"/>
-            </a:endParaRPr>
+            <a:endParaRPr lang="en-US" sz="1200" dirty="0"/>
           </a:p>
         </p:txBody>
       </p:sp>
@@ -6886,7 +6769,7 @@
       </p:grpSpPr>
       <p:sp useBgFill="1">
         <p:nvSpPr>
-          <p:cNvPr id="40" name="Rectangle 39">
+          <p:cNvPr id="46" name="Rectangle 45">
             <a:extLst>
               <a:ext uri="{FF2B5EF4-FFF2-40B4-BE49-F238E27FC236}">
                 <a16:creationId xmlns:a16="http://schemas.microsoft.com/office/drawing/2014/main" id="{743AA782-23D1-4521-8CAD-47662984AA08}"/>
@@ -6973,7 +6856,7 @@
           <a:lstStyle/>
           <a:p>
             <a:r>
-              <a:rPr lang="en-US" sz="5000">
+              <a:rPr lang="en-US" sz="5400">
                 <a:ea typeface="Calibri Light"/>
                 <a:cs typeface="Calibri Light"/>
               </a:rPr>
@@ -6984,10 +6867,10 @@
       </p:sp>
       <p:sp>
         <p:nvSpPr>
-          <p:cNvPr id="41" name="sketch line">
+          <p:cNvPr id="48" name="sketch line">
             <a:extLst>
               <a:ext uri="{FF2B5EF4-FFF2-40B4-BE49-F238E27FC236}">
-                <a16:creationId xmlns:a16="http://schemas.microsoft.com/office/drawing/2014/main" id="{650D18FE-0824-4A46-B22C-A86B52E5780A}"/>
+                <a16:creationId xmlns:a16="http://schemas.microsoft.com/office/drawing/2014/main" id="{71877DBC-BB60-40F0-AC93-2ACDBAAE60CE}"/>
               </a:ext>
               <a:ext uri="{C183D7F6-B498-43B3-948B-1728B52AA6E4}">
                 <adec:decorative xmlns:adec="http://schemas.microsoft.com/office/drawing/2017/decorative" val="1"/>
@@ -7279,54 +7162,46 @@
         </p:spPr>
         <p:txBody>
           <a:bodyPr anchor="t">
-            <a:normAutofit fontScale="92500"/>
+            <a:normAutofit/>
           </a:bodyPr>
           <a:lstStyle/>
           <a:p>
             <a:r>
-              <a:rPr lang="en-US" sz="2000" dirty="0">
+              <a:rPr lang="en-US" sz="1900">
                 <a:cs typeface="Calibri"/>
               </a:rPr>
               <a:t>The X-axis can be thought of as the depth of the tree required to reach the goal state. Y-axis is the number of states explored during the search.</a:t>
             </a:r>
-            <a:endParaRPr lang="en-US" sz="2000" dirty="0">
+            <a:endParaRPr lang="en-US" sz="1900">
               <a:ea typeface="Calibri"/>
               <a:cs typeface="Calibri"/>
             </a:endParaRPr>
           </a:p>
           <a:p>
             <a:r>
-              <a:rPr lang="en-US" sz="2000" dirty="0">
+              <a:rPr lang="en-US" sz="1900">
                 <a:ea typeface="+mn-lt"/>
                 <a:cs typeface="+mn-lt"/>
               </a:rPr>
-              <a:t>The graph visually demonstrate the space complexity of O(</a:t>
-            </a:r>
-            <a:r>
-              <a:rPr lang="en-US" sz="2000" dirty="0" err="1">
-                <a:ea typeface="+mn-lt"/>
-                <a:cs typeface="+mn-lt"/>
-              </a:rPr>
-              <a:t>b^d</a:t>
-            </a:r>
-            <a:r>
-              <a:rPr lang="en-US" sz="2000" dirty="0">
-                <a:ea typeface="+mn-lt"/>
-                <a:cs typeface="+mn-lt"/>
-              </a:rPr>
-              <a:t>), with A* showcasing a more efficient search process compared to BFS and multi-thread BFS, especially for deeper levels (higher "moves to the goal"). </a:t>
-            </a:r>
-          </a:p>
-          <a:p>
-            <a:r>
-              <a:rPr lang="en-US" sz="2000">
+              <a:t>The graph visually demonstrate the space complexity of O(b^d), with A* showcasing a more efficient search process compared to BFS and multi-thread BFS, especially for deeper levels (higher "moves to the goal"). </a:t>
+            </a:r>
+          </a:p>
+          <a:p>
+            <a:r>
+              <a:rPr lang="en-US" sz="1900">
                 <a:latin typeface="Calibri" panose="020F0502020204030204"/>
                 <a:ea typeface="Calibri"/>
                 <a:cs typeface="Calibri"/>
               </a:rPr>
               <a:t>While A* has an identical space complexity to BFS, in practice it uses less space since the heuristic converges on the goal.</a:t>
             </a:r>
-            <a:endParaRPr lang="en-US" sz="2000" dirty="0">
+          </a:p>
+          <a:p>
+            <a:pPr>
+              <a:buFont typeface="Arial" panose="020B0604020202020204" pitchFamily="34" charset="0"/>
+              <a:buChar char="•"/>
+            </a:pPr>
+            <a:endParaRPr lang="en-US" sz="1900">
               <a:latin typeface="Calibri" panose="020F0502020204030204"/>
               <a:ea typeface="Calibri"/>
               <a:cs typeface="Calibri"/>
@@ -7334,21 +7209,10 @@
           </a:p>
           <a:p>
             <a:pPr>
-              <a:buFont typeface="Arial" panose="020B0604020202020204" pitchFamily="34" charset="0"/>
-              <a:buChar char="•"/>
-            </a:pPr>
-            <a:endParaRPr lang="en-US" sz="2000">
-              <a:latin typeface="Calibri" panose="020F0502020204030204"/>
-              <a:ea typeface="Calibri"/>
-              <a:cs typeface="Calibri"/>
-            </a:endParaRPr>
-          </a:p>
-          <a:p>
-            <a:pPr>
               <a:buFont typeface="Arial,Sans-Serif" panose="020B0604020202020204" pitchFamily="34" charset="0"/>
               <a:buChar char="•"/>
             </a:pPr>
-            <a:endParaRPr lang="en-US" sz="2000">
+            <a:endParaRPr lang="en-US" sz="1900">
               <a:latin typeface="Arial"/>
               <a:ea typeface="Calibri"/>
               <a:cs typeface="Arial"/>
@@ -7358,14 +7222,14 @@
             <a:pPr marL="0" indent="0">
               <a:buNone/>
             </a:pPr>
-            <a:endParaRPr lang="en-US" sz="2000">
+            <a:endParaRPr lang="en-US" sz="1900">
               <a:latin typeface="Arial"/>
               <a:ea typeface="Calibri"/>
               <a:cs typeface="Arial"/>
             </a:endParaRPr>
           </a:p>
           <a:p>
-            <a:endParaRPr lang="en-US" sz="2200">
+            <a:endParaRPr lang="en-US" sz="1900">
               <a:ea typeface="Calibri"/>
               <a:cs typeface="Calibri"/>
             </a:endParaRPr>
@@ -7374,10 +7238,10 @@
       </p:sp>
       <p:pic>
         <p:nvPicPr>
-          <p:cNvPr id="5" name="Content Placeholder 4">
+          <p:cNvPr id="4" name="Picture 3" descr="A graph of a graph&#10;&#10;Description automatically generated with medium confidence">
             <a:extLst>
               <a:ext uri="{FF2B5EF4-FFF2-40B4-BE49-F238E27FC236}">
-                <a16:creationId xmlns:a16="http://schemas.microsoft.com/office/drawing/2014/main" id="{859CC967-5374-F06E-4E0F-7A20E302A38A}"/>
+                <a16:creationId xmlns:a16="http://schemas.microsoft.com/office/drawing/2014/main" id="{3D97A40C-97EA-4DBA-9874-15FE894DBE3A}"/>
               </a:ext>
             </a:extLst>
           </p:cNvPr>
@@ -7387,15 +7251,21 @@
           <p:nvPr/>
         </p:nvPicPr>
         <p:blipFill>
-          <a:blip r:embed="rId2"/>
+          <a:blip r:embed="rId2">
+            <a:extLst>
+              <a:ext uri="{28A0092B-C50C-407E-A947-70E740481C1C}">
+                <a14:useLocalDpi xmlns:a14="http://schemas.microsoft.com/office/drawing/2010/main" val="0"/>
+              </a:ext>
+            </a:extLst>
+          </a:blip>
           <a:stretch>
             <a:fillRect/>
           </a:stretch>
         </p:blipFill>
         <p:spPr>
           <a:xfrm>
-            <a:off x="5516342" y="1124152"/>
-            <a:ext cx="6534732" cy="4901048"/>
+            <a:off x="5751416" y="1380744"/>
+            <a:ext cx="6138992" cy="4604243"/>
           </a:xfrm>
           <a:prstGeom prst="rect">
             <a:avLst/>
@@ -7537,36 +7407,6 @@
           </a:p>
         </p:txBody>
       </p:sp>
-      <p:pic>
-        <p:nvPicPr>
-          <p:cNvPr id="7" name="Content Placeholder 2" descr="A graph of different colored squares&#10;&#10;Description automatically generated">
-            <a:extLst>
-              <a:ext uri="{FF2B5EF4-FFF2-40B4-BE49-F238E27FC236}">
-                <a16:creationId xmlns:a16="http://schemas.microsoft.com/office/drawing/2014/main" id="{541D32B2-0000-7889-BAE9-6E9CE3EBB360}"/>
-              </a:ext>
-            </a:extLst>
-          </p:cNvPr>
-          <p:cNvPicPr>
-            <a:picLocks noChangeAspect="1"/>
-          </p:cNvPicPr>
-          <p:nvPr/>
-        </p:nvPicPr>
-        <p:blipFill>
-          <a:blip r:embed="rId2"/>
-          <a:stretch>
-            <a:fillRect/>
-          </a:stretch>
-        </p:blipFill>
-        <p:spPr>
-          <a:xfrm>
-            <a:off x="630936" y="1381887"/>
-            <a:ext cx="5458968" cy="4094225"/>
-          </a:xfrm>
-          <a:prstGeom prst="rect">
-            <a:avLst/>
-          </a:prstGeom>
-        </p:spPr>
-      </p:pic>
       <p:sp>
         <p:nvSpPr>
           <p:cNvPr id="14" name="sketch line">
@@ -7964,6 +7804,42 @@
           </a:p>
         </p:txBody>
       </p:sp>
+      <p:pic>
+        <p:nvPicPr>
+          <p:cNvPr id="5" name="Picture 4" descr="A graph of different colored squares&#10;&#10;Description automatically generated">
+            <a:extLst>
+              <a:ext uri="{FF2B5EF4-FFF2-40B4-BE49-F238E27FC236}">
+                <a16:creationId xmlns:a16="http://schemas.microsoft.com/office/drawing/2014/main" id="{7DB5B3CA-D669-355A-2DF8-79B7CAB59C12}"/>
+              </a:ext>
+            </a:extLst>
+          </p:cNvPr>
+          <p:cNvPicPr>
+            <a:picLocks noChangeAspect="1"/>
+          </p:cNvPicPr>
+          <p:nvPr/>
+        </p:nvPicPr>
+        <p:blipFill>
+          <a:blip r:embed="rId2">
+            <a:extLst>
+              <a:ext uri="{28A0092B-C50C-407E-A947-70E740481C1C}">
+                <a14:useLocalDpi xmlns:a14="http://schemas.microsoft.com/office/drawing/2010/main" val="0"/>
+              </a:ext>
+            </a:extLst>
+          </a:blip>
+          <a:stretch>
+            <a:fillRect/>
+          </a:stretch>
+        </p:blipFill>
+        <p:spPr>
+          <a:xfrm>
+            <a:off x="443478" y="1234435"/>
+            <a:ext cx="5852172" cy="4389129"/>
+          </a:xfrm>
+          <a:prstGeom prst="rect">
+            <a:avLst/>
+          </a:prstGeom>
+        </p:spPr>
+      </p:pic>
     </p:spTree>
     <p:extLst>
       <p:ext uri="{BB962C8B-B14F-4D97-AF65-F5344CB8AC3E}">
@@ -8377,99 +8253,67 @@
         <p:spPr>
           <a:xfrm>
             <a:off x="1115568" y="2481943"/>
-            <a:ext cx="10168128" cy="4279810"/>
+            <a:ext cx="10168128" cy="3827417"/>
           </a:xfrm>
         </p:spPr>
         <p:txBody>
           <a:bodyPr vert="horz" lIns="91440" tIns="45720" rIns="91440" bIns="45720" rtlCol="0" anchor="t">
-            <a:normAutofit lnSpcReduction="10000"/>
+            <a:normAutofit/>
           </a:bodyPr>
           <a:lstStyle/>
           <a:p>
             <a:r>
-              <a:rPr lang="en-US" sz="2200" b="1">
+              <a:rPr lang="en-US" sz="2200" b="1" dirty="0">
                 <a:ea typeface="+mn-lt"/>
                 <a:cs typeface="+mn-lt"/>
               </a:rPr>
               <a:t>A* for Speed</a:t>
             </a:r>
             <a:r>
-              <a:rPr lang="en-US" sz="2200">
+              <a:rPr lang="en-US" sz="2200" dirty="0">
                 <a:ea typeface="+mn-lt"/>
                 <a:cs typeface="+mn-lt"/>
               </a:rPr>
               <a:t>: A* excels when your priority is finding a quick solution to the 8-puzzle problem.</a:t>
             </a:r>
-            <a:endParaRPr lang="en-US" sz="2200">
+            <a:endParaRPr lang="en-US" sz="2200" dirty="0">
               <a:ea typeface="Calibri"/>
               <a:cs typeface="Calibri"/>
             </a:endParaRPr>
           </a:p>
           <a:p>
             <a:r>
-              <a:rPr lang="en-US" sz="2200" b="1">
+              <a:rPr lang="en-US" sz="2200" b="1" dirty="0">
                 <a:ea typeface="+mn-lt"/>
                 <a:cs typeface="+mn-lt"/>
               </a:rPr>
               <a:t>BFS for Optimal Moves</a:t>
             </a:r>
             <a:r>
-              <a:rPr lang="en-US" sz="2200">
+              <a:rPr lang="en-US" sz="2200" dirty="0">
                 <a:ea typeface="+mn-lt"/>
                 <a:cs typeface="+mn-lt"/>
               </a:rPr>
               <a:t>: If minimizing the number of moves is your goal, BFS is superior to A*.</a:t>
             </a:r>
-            <a:endParaRPr lang="en-US" sz="2200"/>
-          </a:p>
-          <a:p>
-            <a:r>
-              <a:rPr lang="en-US" sz="2200" b="1">
+            <a:endParaRPr lang="en-US" sz="2200" dirty="0"/>
+          </a:p>
+          <a:p>
+            <a:r>
+              <a:rPr lang="en-US" sz="2200" b="1" dirty="0">
                 <a:ea typeface="+mn-lt"/>
                 <a:cs typeface="+mn-lt"/>
               </a:rPr>
               <a:t>Multi-Threaded BFS</a:t>
             </a:r>
             <a:r>
-              <a:rPr lang="en-US" sz="2200">
+              <a:rPr lang="en-US" sz="2200" dirty="0">
                 <a:ea typeface="+mn-lt"/>
                 <a:cs typeface="+mn-lt"/>
               </a:rPr>
-              <a:t>: For both optimal moves and beating BFS in runtime, multi-threaded BFS is the optimal choice. The runtime benefits seen compared to BFS could potentially be improved upon to a substantial degree.</a:t>
-            </a:r>
-          </a:p>
-          <a:p>
-            <a:pPr lvl="1"/>
-            <a:r>
-              <a:rPr lang="en-US" sz="1800">
-                <a:ea typeface="Calibri"/>
-                <a:cs typeface="Calibri"/>
-              </a:rPr>
-              <a:t>One option is to use a data structure for the nodes visited that does not need to be locked.</a:t>
-            </a:r>
-          </a:p>
-          <a:p>
-            <a:pPr lvl="1"/>
-            <a:r>
-              <a:rPr lang="en-US" sz="1800">
-                <a:ea typeface="Calibri"/>
-                <a:cs typeface="Calibri"/>
-              </a:rPr>
-              <a:t>Another option is to have separate nodes visited lists for each thread, but this could cause overlap and increase memory usage.</a:t>
-            </a:r>
-          </a:p>
-          <a:p>
-            <a:pPr lvl="1"/>
-            <a:r>
-              <a:rPr lang="en-US" sz="1800">
-                <a:ea typeface="Calibri"/>
-                <a:cs typeface="Calibri"/>
-              </a:rPr>
-              <a:t>A third option is to use the path back to the goal to find duplicate states as this circumnavigates the nodes visited list. However, this introduces an O(d) time complexity for each node visited compared to the O(1) average time complexity.</a:t>
-            </a:r>
-          </a:p>
-          <a:p>
-            <a:endParaRPr lang="en-US" sz="2200">
+              <a:t>: For both optimal moves and beating BFS in runtime, multi-threaded BFS is the optimal choice.</a:t>
+            </a:r>
+            <a:endParaRPr lang="en-US" sz="2200" dirty="0">
               <a:ea typeface="Calibri"/>
               <a:cs typeface="Calibri"/>
             </a:endParaRPr>
@@ -8489,9 +8333,17 @@
 </p:sld>
 </file>
 
-<file path=ppt/slides/slide2.xml><?xml version="1.0" encoding="utf-8"?>
+<file path=ppt/slides/slide18.xml><?xml version="1.0" encoding="utf-8"?>
 <p:sld xmlns:a="http://schemas.openxmlformats.org/drawingml/2006/main" xmlns:r="http://schemas.openxmlformats.org/officeDocument/2006/relationships" xmlns:p="http://schemas.openxmlformats.org/presentationml/2006/main">
   <p:cSld>
+    <p:bg>
+      <p:bgPr>
+        <a:solidFill>
+          <a:schemeClr val="bg1"/>
+        </a:solidFill>
+        <a:effectLst/>
+      </p:bgPr>
+    </p:bg>
     <p:spTree>
       <p:nvGrpSpPr>
         <p:cNvPr id="1" name=""/>
@@ -8506,6 +8358,1017 @@
           <a:chExt cx="0" cy="0"/>
         </a:xfrm>
       </p:grpSpPr>
+      <p:sp useBgFill="1">
+        <p:nvSpPr>
+          <p:cNvPr id="8" name="Rectangle 7">
+            <a:extLst>
+              <a:ext uri="{FF2B5EF4-FFF2-40B4-BE49-F238E27FC236}">
+                <a16:creationId xmlns:a16="http://schemas.microsoft.com/office/drawing/2014/main" id="{100EDD19-6802-4EC3-95CE-CFFAB042CFD6}"/>
+              </a:ext>
+              <a:ext uri="{C183D7F6-B498-43B3-948B-1728B52AA6E4}">
+                <adec:decorative xmlns:adec="http://schemas.microsoft.com/office/drawing/2017/decorative" val="1"/>
+              </a:ext>
+            </a:extLst>
+          </p:cNvPr>
+          <p:cNvSpPr>
+            <a:spLocks noGrp="1" noRot="1" noChangeAspect="1" noMove="1" noResize="1" noEditPoints="1" noAdjustHandles="1" noChangeArrowheads="1" noChangeShapeType="1" noTextEdit="1"/>
+          </p:cNvSpPr>
+          <p:nvPr>
+            <p:extLst>
+              <p:ext uri="{386F3935-93C4-4BCD-93E2-E3B085C9AB24}">
+                <p16:designElem xmlns:p16="http://schemas.microsoft.com/office/powerpoint/2015/main" val="1"/>
+              </p:ext>
+            </p:extLst>
+          </p:nvPr>
+        </p:nvSpPr>
+        <p:spPr>
+          <a:xfrm>
+            <a:off x="0" y="0"/>
+            <a:ext cx="12188952" cy="6858000"/>
+          </a:xfrm>
+          <a:prstGeom prst="rect">
+            <a:avLst/>
+          </a:prstGeom>
+          <a:ln>
+            <a:noFill/>
+          </a:ln>
+        </p:spPr>
+        <p:style>
+          <a:lnRef idx="2">
+            <a:schemeClr val="accent1">
+              <a:shade val="50000"/>
+            </a:schemeClr>
+          </a:lnRef>
+          <a:fillRef idx="1">
+            <a:schemeClr val="accent1"/>
+          </a:fillRef>
+          <a:effectRef idx="0">
+            <a:schemeClr val="accent1"/>
+          </a:effectRef>
+          <a:fontRef idx="minor">
+            <a:schemeClr val="lt1"/>
+          </a:fontRef>
+        </p:style>
+        <p:txBody>
+          <a:bodyPr rtlCol="0" anchor="ctr"/>
+          <a:lstStyle/>
+          <a:p>
+            <a:pPr algn="ctr"/>
+            <a:endParaRPr lang="en-US"/>
+          </a:p>
+        </p:txBody>
+      </p:sp>
+      <p:sp>
+        <p:nvSpPr>
+          <p:cNvPr id="2" name="Title 1">
+            <a:extLst>
+              <a:ext uri="{FF2B5EF4-FFF2-40B4-BE49-F238E27FC236}">
+                <a16:creationId xmlns:a16="http://schemas.microsoft.com/office/drawing/2014/main" id="{3A556193-E27A-06F8-2615-0D6881CF6B9D}"/>
+              </a:ext>
+            </a:extLst>
+          </p:cNvPr>
+          <p:cNvSpPr>
+            <a:spLocks noGrp="1"/>
+          </p:cNvSpPr>
+          <p:nvPr>
+            <p:ph type="title"/>
+          </p:nvPr>
+        </p:nvSpPr>
+        <p:spPr>
+          <a:xfrm>
+            <a:off x="838200" y="365125"/>
+            <a:ext cx="10515600" cy="1325563"/>
+          </a:xfrm>
+        </p:spPr>
+        <p:txBody>
+          <a:bodyPr>
+            <a:normAutofit/>
+          </a:bodyPr>
+          <a:lstStyle/>
+          <a:p>
+            <a:r>
+              <a:rPr lang="en-US" sz="5400"/>
+              <a:t>References</a:t>
+            </a:r>
+          </a:p>
+        </p:txBody>
+      </p:sp>
+      <p:sp>
+        <p:nvSpPr>
+          <p:cNvPr id="10" name="sketch line">
+            <a:extLst>
+              <a:ext uri="{FF2B5EF4-FFF2-40B4-BE49-F238E27FC236}">
+                <a16:creationId xmlns:a16="http://schemas.microsoft.com/office/drawing/2014/main" id="{DB17E863-922E-4C26-BD64-E8FD41D28661}"/>
+              </a:ext>
+              <a:ext uri="{C183D7F6-B498-43B3-948B-1728B52AA6E4}">
+                <adec:decorative xmlns:adec="http://schemas.microsoft.com/office/drawing/2017/decorative" val="1"/>
+              </a:ext>
+            </a:extLst>
+          </p:cNvPr>
+          <p:cNvSpPr>
+            <a:spLocks noGrp="1" noRot="1" noChangeAspect="1" noMove="1" noResize="1" noEditPoints="1" noAdjustHandles="1" noChangeArrowheads="1" noChangeShapeType="1" noTextEdit="1"/>
+          </p:cNvSpPr>
+          <p:nvPr>
+            <p:extLst>
+              <p:ext uri="{386F3935-93C4-4BCD-93E2-E3B085C9AB24}">
+                <p16:designElem xmlns:p16="http://schemas.microsoft.com/office/powerpoint/2015/main" val="1"/>
+              </p:ext>
+            </p:extLst>
+          </p:nvPr>
+        </p:nvSpPr>
+        <p:spPr>
+          <a:xfrm>
+            <a:off x="669036" y="1677373"/>
+            <a:ext cx="10853928" cy="18288"/>
+          </a:xfrm>
+          <a:custGeom>
+            <a:avLst/>
+            <a:gdLst>
+              <a:gd name="connsiteX0" fmla="*/ 0 w 10853928"/>
+              <a:gd name="connsiteY0" fmla="*/ 0 h 18288"/>
+              <a:gd name="connsiteX1" fmla="*/ 461292 w 10853928"/>
+              <a:gd name="connsiteY1" fmla="*/ 0 h 18288"/>
+              <a:gd name="connsiteX2" fmla="*/ 1139662 w 10853928"/>
+              <a:gd name="connsiteY2" fmla="*/ 0 h 18288"/>
+              <a:gd name="connsiteX3" fmla="*/ 1926572 w 10853928"/>
+              <a:gd name="connsiteY3" fmla="*/ 0 h 18288"/>
+              <a:gd name="connsiteX4" fmla="*/ 2279325 w 10853928"/>
+              <a:gd name="connsiteY4" fmla="*/ 0 h 18288"/>
+              <a:gd name="connsiteX5" fmla="*/ 2632078 w 10853928"/>
+              <a:gd name="connsiteY5" fmla="*/ 0 h 18288"/>
+              <a:gd name="connsiteX6" fmla="*/ 3527527 w 10853928"/>
+              <a:gd name="connsiteY6" fmla="*/ 0 h 18288"/>
+              <a:gd name="connsiteX7" fmla="*/ 4205897 w 10853928"/>
+              <a:gd name="connsiteY7" fmla="*/ 0 h 18288"/>
+              <a:gd name="connsiteX8" fmla="*/ 4558650 w 10853928"/>
+              <a:gd name="connsiteY8" fmla="*/ 0 h 18288"/>
+              <a:gd name="connsiteX9" fmla="*/ 5237020 w 10853928"/>
+              <a:gd name="connsiteY9" fmla="*/ 0 h 18288"/>
+              <a:gd name="connsiteX10" fmla="*/ 6132469 w 10853928"/>
+              <a:gd name="connsiteY10" fmla="*/ 0 h 18288"/>
+              <a:gd name="connsiteX11" fmla="*/ 6702301 w 10853928"/>
+              <a:gd name="connsiteY11" fmla="*/ 0 h 18288"/>
+              <a:gd name="connsiteX12" fmla="*/ 7272132 w 10853928"/>
+              <a:gd name="connsiteY12" fmla="*/ 0 h 18288"/>
+              <a:gd name="connsiteX13" fmla="*/ 7950502 w 10853928"/>
+              <a:gd name="connsiteY13" fmla="*/ 0 h 18288"/>
+              <a:gd name="connsiteX14" fmla="*/ 8737412 w 10853928"/>
+              <a:gd name="connsiteY14" fmla="*/ 0 h 18288"/>
+              <a:gd name="connsiteX15" fmla="*/ 9524322 w 10853928"/>
+              <a:gd name="connsiteY15" fmla="*/ 0 h 18288"/>
+              <a:gd name="connsiteX16" fmla="*/ 10853928 w 10853928"/>
+              <a:gd name="connsiteY16" fmla="*/ 0 h 18288"/>
+              <a:gd name="connsiteX17" fmla="*/ 10853928 w 10853928"/>
+              <a:gd name="connsiteY17" fmla="*/ 18288 h 18288"/>
+              <a:gd name="connsiteX18" fmla="*/ 10392636 w 10853928"/>
+              <a:gd name="connsiteY18" fmla="*/ 18288 h 18288"/>
+              <a:gd name="connsiteX19" fmla="*/ 9497187 w 10853928"/>
+              <a:gd name="connsiteY19" fmla="*/ 18288 h 18288"/>
+              <a:gd name="connsiteX20" fmla="*/ 8818817 w 10853928"/>
+              <a:gd name="connsiteY20" fmla="*/ 18288 h 18288"/>
+              <a:gd name="connsiteX21" fmla="*/ 8466064 w 10853928"/>
+              <a:gd name="connsiteY21" fmla="*/ 18288 h 18288"/>
+              <a:gd name="connsiteX22" fmla="*/ 7787693 w 10853928"/>
+              <a:gd name="connsiteY22" fmla="*/ 18288 h 18288"/>
+              <a:gd name="connsiteX23" fmla="*/ 7217862 w 10853928"/>
+              <a:gd name="connsiteY23" fmla="*/ 18288 h 18288"/>
+              <a:gd name="connsiteX24" fmla="*/ 6648031 w 10853928"/>
+              <a:gd name="connsiteY24" fmla="*/ 18288 h 18288"/>
+              <a:gd name="connsiteX25" fmla="*/ 6078200 w 10853928"/>
+              <a:gd name="connsiteY25" fmla="*/ 18288 h 18288"/>
+              <a:gd name="connsiteX26" fmla="*/ 5508368 w 10853928"/>
+              <a:gd name="connsiteY26" fmla="*/ 18288 h 18288"/>
+              <a:gd name="connsiteX27" fmla="*/ 4721459 w 10853928"/>
+              <a:gd name="connsiteY27" fmla="*/ 18288 h 18288"/>
+              <a:gd name="connsiteX28" fmla="*/ 4043088 w 10853928"/>
+              <a:gd name="connsiteY28" fmla="*/ 18288 h 18288"/>
+              <a:gd name="connsiteX29" fmla="*/ 3690336 w 10853928"/>
+              <a:gd name="connsiteY29" fmla="*/ 18288 h 18288"/>
+              <a:gd name="connsiteX30" fmla="*/ 3120504 w 10853928"/>
+              <a:gd name="connsiteY30" fmla="*/ 18288 h 18288"/>
+              <a:gd name="connsiteX31" fmla="*/ 2333595 w 10853928"/>
+              <a:gd name="connsiteY31" fmla="*/ 18288 h 18288"/>
+              <a:gd name="connsiteX32" fmla="*/ 1872303 w 10853928"/>
+              <a:gd name="connsiteY32" fmla="*/ 18288 h 18288"/>
+              <a:gd name="connsiteX33" fmla="*/ 976854 w 10853928"/>
+              <a:gd name="connsiteY33" fmla="*/ 18288 h 18288"/>
+              <a:gd name="connsiteX34" fmla="*/ 0 w 10853928"/>
+              <a:gd name="connsiteY34" fmla="*/ 18288 h 18288"/>
+              <a:gd name="connsiteX35" fmla="*/ 0 w 10853928"/>
+              <a:gd name="connsiteY35" fmla="*/ 0 h 18288"/>
+            </a:gdLst>
+            <a:ahLst/>
+            <a:cxnLst>
+              <a:cxn ang="0">
+                <a:pos x="connsiteX0" y="connsiteY0"/>
+              </a:cxn>
+              <a:cxn ang="0">
+                <a:pos x="connsiteX1" y="connsiteY1"/>
+              </a:cxn>
+              <a:cxn ang="0">
+                <a:pos x="connsiteX2" y="connsiteY2"/>
+              </a:cxn>
+              <a:cxn ang="0">
+                <a:pos x="connsiteX3" y="connsiteY3"/>
+              </a:cxn>
+              <a:cxn ang="0">
+                <a:pos x="connsiteX4" y="connsiteY4"/>
+              </a:cxn>
+              <a:cxn ang="0">
+                <a:pos x="connsiteX5" y="connsiteY5"/>
+              </a:cxn>
+              <a:cxn ang="0">
+                <a:pos x="connsiteX6" y="connsiteY6"/>
+              </a:cxn>
+              <a:cxn ang="0">
+                <a:pos x="connsiteX7" y="connsiteY7"/>
+              </a:cxn>
+              <a:cxn ang="0">
+                <a:pos x="connsiteX8" y="connsiteY8"/>
+              </a:cxn>
+              <a:cxn ang="0">
+                <a:pos x="connsiteX9" y="connsiteY9"/>
+              </a:cxn>
+              <a:cxn ang="0">
+                <a:pos x="connsiteX10" y="connsiteY10"/>
+              </a:cxn>
+              <a:cxn ang="0">
+                <a:pos x="connsiteX11" y="connsiteY11"/>
+              </a:cxn>
+              <a:cxn ang="0">
+                <a:pos x="connsiteX12" y="connsiteY12"/>
+              </a:cxn>
+              <a:cxn ang="0">
+                <a:pos x="connsiteX13" y="connsiteY13"/>
+              </a:cxn>
+              <a:cxn ang="0">
+                <a:pos x="connsiteX14" y="connsiteY14"/>
+              </a:cxn>
+              <a:cxn ang="0">
+                <a:pos x="connsiteX15" y="connsiteY15"/>
+              </a:cxn>
+              <a:cxn ang="0">
+                <a:pos x="connsiteX16" y="connsiteY16"/>
+              </a:cxn>
+              <a:cxn ang="0">
+                <a:pos x="connsiteX17" y="connsiteY17"/>
+              </a:cxn>
+              <a:cxn ang="0">
+                <a:pos x="connsiteX18" y="connsiteY18"/>
+              </a:cxn>
+              <a:cxn ang="0">
+                <a:pos x="connsiteX19" y="connsiteY19"/>
+              </a:cxn>
+              <a:cxn ang="0">
+                <a:pos x="connsiteX20" y="connsiteY20"/>
+              </a:cxn>
+              <a:cxn ang="0">
+                <a:pos x="connsiteX21" y="connsiteY21"/>
+              </a:cxn>
+              <a:cxn ang="0">
+                <a:pos x="connsiteX22" y="connsiteY22"/>
+              </a:cxn>
+              <a:cxn ang="0">
+                <a:pos x="connsiteX23" y="connsiteY23"/>
+              </a:cxn>
+              <a:cxn ang="0">
+                <a:pos x="connsiteX24" y="connsiteY24"/>
+              </a:cxn>
+              <a:cxn ang="0">
+                <a:pos x="connsiteX25" y="connsiteY25"/>
+              </a:cxn>
+              <a:cxn ang="0">
+                <a:pos x="connsiteX26" y="connsiteY26"/>
+              </a:cxn>
+              <a:cxn ang="0">
+                <a:pos x="connsiteX27" y="connsiteY27"/>
+              </a:cxn>
+              <a:cxn ang="0">
+                <a:pos x="connsiteX28" y="connsiteY28"/>
+              </a:cxn>
+              <a:cxn ang="0">
+                <a:pos x="connsiteX29" y="connsiteY29"/>
+              </a:cxn>
+              <a:cxn ang="0">
+                <a:pos x="connsiteX30" y="connsiteY30"/>
+              </a:cxn>
+              <a:cxn ang="0">
+                <a:pos x="connsiteX31" y="connsiteY31"/>
+              </a:cxn>
+              <a:cxn ang="0">
+                <a:pos x="connsiteX32" y="connsiteY32"/>
+              </a:cxn>
+              <a:cxn ang="0">
+                <a:pos x="connsiteX33" y="connsiteY33"/>
+              </a:cxn>
+              <a:cxn ang="0">
+                <a:pos x="connsiteX34" y="connsiteY34"/>
+              </a:cxn>
+              <a:cxn ang="0">
+                <a:pos x="connsiteX35" y="connsiteY35"/>
+              </a:cxn>
+            </a:cxnLst>
+            <a:rect l="l" t="t" r="r" b="b"/>
+            <a:pathLst>
+              <a:path w="10853928" h="18288" fill="none" extrusionOk="0">
+                <a:moveTo>
+                  <a:pt x="0" y="0"/>
+                </a:moveTo>
+                <a:cubicBezTo>
+                  <a:pt x="146993" y="-19076"/>
+                  <a:pt x="347684" y="-4790"/>
+                  <a:pt x="461292" y="0"/>
+                </a:cubicBezTo>
+                <a:cubicBezTo>
+                  <a:pt x="574900" y="4790"/>
+                  <a:pt x="808367" y="19821"/>
+                  <a:pt x="1139662" y="0"/>
+                </a:cubicBezTo>
+                <a:cubicBezTo>
+                  <a:pt x="1470957" y="-19821"/>
+                  <a:pt x="1627405" y="5721"/>
+                  <a:pt x="1926572" y="0"/>
+                </a:cubicBezTo>
+                <a:cubicBezTo>
+                  <a:pt x="2225739" y="-5721"/>
+                  <a:pt x="2137730" y="-3235"/>
+                  <a:pt x="2279325" y="0"/>
+                </a:cubicBezTo>
+                <a:cubicBezTo>
+                  <a:pt x="2420920" y="3235"/>
+                  <a:pt x="2456518" y="9685"/>
+                  <a:pt x="2632078" y="0"/>
+                </a:cubicBezTo>
+                <a:cubicBezTo>
+                  <a:pt x="2807638" y="-9685"/>
+                  <a:pt x="3211516" y="-43007"/>
+                  <a:pt x="3527527" y="0"/>
+                </a:cubicBezTo>
+                <a:cubicBezTo>
+                  <a:pt x="3843538" y="43007"/>
+                  <a:pt x="4058833" y="22042"/>
+                  <a:pt x="4205897" y="0"/>
+                </a:cubicBezTo>
+                <a:cubicBezTo>
+                  <a:pt x="4352961" y="-22042"/>
+                  <a:pt x="4474805" y="-11846"/>
+                  <a:pt x="4558650" y="0"/>
+                </a:cubicBezTo>
+                <a:cubicBezTo>
+                  <a:pt x="4642495" y="11846"/>
+                  <a:pt x="5041928" y="-6069"/>
+                  <a:pt x="5237020" y="0"/>
+                </a:cubicBezTo>
+                <a:cubicBezTo>
+                  <a:pt x="5432112" y="6069"/>
+                  <a:pt x="5943266" y="-17479"/>
+                  <a:pt x="6132469" y="0"/>
+                </a:cubicBezTo>
+                <a:cubicBezTo>
+                  <a:pt x="6321672" y="17479"/>
+                  <a:pt x="6483872" y="26234"/>
+                  <a:pt x="6702301" y="0"/>
+                </a:cubicBezTo>
+                <a:cubicBezTo>
+                  <a:pt x="6920730" y="-26234"/>
+                  <a:pt x="6991194" y="-15156"/>
+                  <a:pt x="7272132" y="0"/>
+                </a:cubicBezTo>
+                <a:cubicBezTo>
+                  <a:pt x="7553070" y="15156"/>
+                  <a:pt x="7684444" y="-32961"/>
+                  <a:pt x="7950502" y="0"/>
+                </a:cubicBezTo>
+                <a:cubicBezTo>
+                  <a:pt x="8216560" y="32961"/>
+                  <a:pt x="8493290" y="-10491"/>
+                  <a:pt x="8737412" y="0"/>
+                </a:cubicBezTo>
+                <a:cubicBezTo>
+                  <a:pt x="8981534" y="10491"/>
+                  <a:pt x="9191586" y="-13899"/>
+                  <a:pt x="9524322" y="0"/>
+                </a:cubicBezTo>
+                <a:cubicBezTo>
+                  <a:pt x="9857058" y="13899"/>
+                  <a:pt x="10297509" y="7485"/>
+                  <a:pt x="10853928" y="0"/>
+                </a:cubicBezTo>
+                <a:cubicBezTo>
+                  <a:pt x="10854574" y="4451"/>
+                  <a:pt x="10854418" y="9226"/>
+                  <a:pt x="10853928" y="18288"/>
+                </a:cubicBezTo>
+                <a:cubicBezTo>
+                  <a:pt x="10691638" y="28522"/>
+                  <a:pt x="10574319" y="29578"/>
+                  <a:pt x="10392636" y="18288"/>
+                </a:cubicBezTo>
+                <a:cubicBezTo>
+                  <a:pt x="10210953" y="6998"/>
+                  <a:pt x="9836277" y="-16742"/>
+                  <a:pt x="9497187" y="18288"/>
+                </a:cubicBezTo>
+                <a:cubicBezTo>
+                  <a:pt x="9158097" y="53318"/>
+                  <a:pt x="9119479" y="30714"/>
+                  <a:pt x="8818817" y="18288"/>
+                </a:cubicBezTo>
+                <a:cubicBezTo>
+                  <a:pt x="8518155" y="5863"/>
+                  <a:pt x="8640037" y="6483"/>
+                  <a:pt x="8466064" y="18288"/>
+                </a:cubicBezTo>
+                <a:cubicBezTo>
+                  <a:pt x="8292091" y="30093"/>
+                  <a:pt x="7997656" y="18914"/>
+                  <a:pt x="7787693" y="18288"/>
+                </a:cubicBezTo>
+                <a:cubicBezTo>
+                  <a:pt x="7577730" y="17662"/>
+                  <a:pt x="7412468" y="21416"/>
+                  <a:pt x="7217862" y="18288"/>
+                </a:cubicBezTo>
+                <a:cubicBezTo>
+                  <a:pt x="7023256" y="15160"/>
+                  <a:pt x="6898018" y="14824"/>
+                  <a:pt x="6648031" y="18288"/>
+                </a:cubicBezTo>
+                <a:cubicBezTo>
+                  <a:pt x="6398044" y="21752"/>
+                  <a:pt x="6254402" y="38625"/>
+                  <a:pt x="6078200" y="18288"/>
+                </a:cubicBezTo>
+                <a:cubicBezTo>
+                  <a:pt x="5901998" y="-2049"/>
+                  <a:pt x="5622886" y="3213"/>
+                  <a:pt x="5508368" y="18288"/>
+                </a:cubicBezTo>
+                <a:cubicBezTo>
+                  <a:pt x="5393850" y="33363"/>
+                  <a:pt x="5036260" y="26830"/>
+                  <a:pt x="4721459" y="18288"/>
+                </a:cubicBezTo>
+                <a:cubicBezTo>
+                  <a:pt x="4406658" y="9746"/>
+                  <a:pt x="4239221" y="41551"/>
+                  <a:pt x="4043088" y="18288"/>
+                </a:cubicBezTo>
+                <a:cubicBezTo>
+                  <a:pt x="3846955" y="-4975"/>
+                  <a:pt x="3818802" y="34658"/>
+                  <a:pt x="3690336" y="18288"/>
+                </a:cubicBezTo>
+                <a:cubicBezTo>
+                  <a:pt x="3561870" y="1918"/>
+                  <a:pt x="3265491" y="42194"/>
+                  <a:pt x="3120504" y="18288"/>
+                </a:cubicBezTo>
+                <a:cubicBezTo>
+                  <a:pt x="2975517" y="-5618"/>
+                  <a:pt x="2720254" y="36673"/>
+                  <a:pt x="2333595" y="18288"/>
+                </a:cubicBezTo>
+                <a:cubicBezTo>
+                  <a:pt x="1946936" y="-97"/>
+                  <a:pt x="2097241" y="5776"/>
+                  <a:pt x="1872303" y="18288"/>
+                </a:cubicBezTo>
+                <a:cubicBezTo>
+                  <a:pt x="1647365" y="30800"/>
+                  <a:pt x="1282708" y="45380"/>
+                  <a:pt x="976854" y="18288"/>
+                </a:cubicBezTo>
+                <a:cubicBezTo>
+                  <a:pt x="671000" y="-8804"/>
+                  <a:pt x="408401" y="-12775"/>
+                  <a:pt x="0" y="18288"/>
+                </a:cubicBezTo>
+                <a:cubicBezTo>
+                  <a:pt x="-213" y="9468"/>
+                  <a:pt x="187" y="4459"/>
+                  <a:pt x="0" y="0"/>
+                </a:cubicBezTo>
+                <a:close/>
+              </a:path>
+              <a:path w="10853928" h="18288" stroke="0" extrusionOk="0">
+                <a:moveTo>
+                  <a:pt x="0" y="0"/>
+                </a:moveTo>
+                <a:cubicBezTo>
+                  <a:pt x="267322" y="15284"/>
+                  <a:pt x="415388" y="-21048"/>
+                  <a:pt x="569831" y="0"/>
+                </a:cubicBezTo>
+                <a:cubicBezTo>
+                  <a:pt x="724274" y="21048"/>
+                  <a:pt x="769333" y="-2353"/>
+                  <a:pt x="922584" y="0"/>
+                </a:cubicBezTo>
+                <a:cubicBezTo>
+                  <a:pt x="1075835" y="2353"/>
+                  <a:pt x="1399490" y="-145"/>
+                  <a:pt x="1818033" y="0"/>
+                </a:cubicBezTo>
+                <a:cubicBezTo>
+                  <a:pt x="2236576" y="145"/>
+                  <a:pt x="2145330" y="5482"/>
+                  <a:pt x="2387864" y="0"/>
+                </a:cubicBezTo>
+                <a:cubicBezTo>
+                  <a:pt x="2630398" y="-5482"/>
+                  <a:pt x="2793207" y="18487"/>
+                  <a:pt x="2957695" y="0"/>
+                </a:cubicBezTo>
+                <a:cubicBezTo>
+                  <a:pt x="3122183" y="-18487"/>
+                  <a:pt x="3579141" y="19003"/>
+                  <a:pt x="3853144" y="0"/>
+                </a:cubicBezTo>
+                <a:cubicBezTo>
+                  <a:pt x="4127147" y="-19003"/>
+                  <a:pt x="4209857" y="12211"/>
+                  <a:pt x="4314436" y="0"/>
+                </a:cubicBezTo>
+                <a:cubicBezTo>
+                  <a:pt x="4419015" y="-12211"/>
+                  <a:pt x="4762459" y="-17220"/>
+                  <a:pt x="5209885" y="0"/>
+                </a:cubicBezTo>
+                <a:cubicBezTo>
+                  <a:pt x="5657311" y="17220"/>
+                  <a:pt x="5692663" y="-3290"/>
+                  <a:pt x="6105335" y="0"/>
+                </a:cubicBezTo>
+                <a:cubicBezTo>
+                  <a:pt x="6518007" y="3290"/>
+                  <a:pt x="6455516" y="-5124"/>
+                  <a:pt x="6783705" y="0"/>
+                </a:cubicBezTo>
+                <a:cubicBezTo>
+                  <a:pt x="7111894" y="5124"/>
+                  <a:pt x="7441941" y="-17829"/>
+                  <a:pt x="7679154" y="0"/>
+                </a:cubicBezTo>
+                <a:cubicBezTo>
+                  <a:pt x="7916367" y="17829"/>
+                  <a:pt x="8102967" y="-24363"/>
+                  <a:pt x="8248985" y="0"/>
+                </a:cubicBezTo>
+                <a:cubicBezTo>
+                  <a:pt x="8395003" y="24363"/>
+                  <a:pt x="8552393" y="25505"/>
+                  <a:pt x="8818817" y="0"/>
+                </a:cubicBezTo>
+                <a:cubicBezTo>
+                  <a:pt x="9085241" y="-25505"/>
+                  <a:pt x="9411308" y="38000"/>
+                  <a:pt x="9605726" y="0"/>
+                </a:cubicBezTo>
+                <a:cubicBezTo>
+                  <a:pt x="9800144" y="-38000"/>
+                  <a:pt x="10006468" y="-25741"/>
+                  <a:pt x="10175558" y="0"/>
+                </a:cubicBezTo>
+                <a:cubicBezTo>
+                  <a:pt x="10344648" y="25741"/>
+                  <a:pt x="10696282" y="695"/>
+                  <a:pt x="10853928" y="0"/>
+                </a:cubicBezTo>
+                <a:cubicBezTo>
+                  <a:pt x="10853521" y="8690"/>
+                  <a:pt x="10853774" y="14141"/>
+                  <a:pt x="10853928" y="18288"/>
+                </a:cubicBezTo>
+                <a:cubicBezTo>
+                  <a:pt x="10608124" y="24255"/>
+                  <a:pt x="10343415" y="22307"/>
+                  <a:pt x="10067018" y="18288"/>
+                </a:cubicBezTo>
+                <a:cubicBezTo>
+                  <a:pt x="9790621" y="14270"/>
+                  <a:pt x="9843266" y="3564"/>
+                  <a:pt x="9714266" y="18288"/>
+                </a:cubicBezTo>
+                <a:cubicBezTo>
+                  <a:pt x="9585266" y="33012"/>
+                  <a:pt x="9379484" y="1875"/>
+                  <a:pt x="9252974" y="18288"/>
+                </a:cubicBezTo>
+                <a:cubicBezTo>
+                  <a:pt x="9126464" y="34701"/>
+                  <a:pt x="8580678" y="-4904"/>
+                  <a:pt x="8357525" y="18288"/>
+                </a:cubicBezTo>
+                <a:cubicBezTo>
+                  <a:pt x="8134372" y="41480"/>
+                  <a:pt x="7903199" y="26458"/>
+                  <a:pt x="7679154" y="18288"/>
+                </a:cubicBezTo>
+                <a:cubicBezTo>
+                  <a:pt x="7455109" y="10118"/>
+                  <a:pt x="7435944" y="27109"/>
+                  <a:pt x="7217862" y="18288"/>
+                </a:cubicBezTo>
+                <a:cubicBezTo>
+                  <a:pt x="6999780" y="9467"/>
+                  <a:pt x="6680409" y="18985"/>
+                  <a:pt x="6539492" y="18288"/>
+                </a:cubicBezTo>
+                <a:cubicBezTo>
+                  <a:pt x="6398575" y="17592"/>
+                  <a:pt x="6312077" y="33018"/>
+                  <a:pt x="6186739" y="18288"/>
+                </a:cubicBezTo>
+                <a:cubicBezTo>
+                  <a:pt x="6061401" y="3558"/>
+                  <a:pt x="5947033" y="12075"/>
+                  <a:pt x="5833986" y="18288"/>
+                </a:cubicBezTo>
+                <a:cubicBezTo>
+                  <a:pt x="5720939" y="24501"/>
+                  <a:pt x="5482226" y="8586"/>
+                  <a:pt x="5155616" y="18288"/>
+                </a:cubicBezTo>
+                <a:cubicBezTo>
+                  <a:pt x="4829006" y="27991"/>
+                  <a:pt x="4841274" y="29316"/>
+                  <a:pt x="4694324" y="18288"/>
+                </a:cubicBezTo>
+                <a:cubicBezTo>
+                  <a:pt x="4547374" y="7260"/>
+                  <a:pt x="4077675" y="7013"/>
+                  <a:pt x="3907414" y="18288"/>
+                </a:cubicBezTo>
+                <a:cubicBezTo>
+                  <a:pt x="3737153" y="29564"/>
+                  <a:pt x="3538393" y="21630"/>
+                  <a:pt x="3446122" y="18288"/>
+                </a:cubicBezTo>
+                <a:cubicBezTo>
+                  <a:pt x="3353851" y="14946"/>
+                  <a:pt x="2990320" y="-8091"/>
+                  <a:pt x="2659212" y="18288"/>
+                </a:cubicBezTo>
+                <a:cubicBezTo>
+                  <a:pt x="2328104" y="44667"/>
+                  <a:pt x="2427653" y="9607"/>
+                  <a:pt x="2306460" y="18288"/>
+                </a:cubicBezTo>
+                <a:cubicBezTo>
+                  <a:pt x="2185267" y="26969"/>
+                  <a:pt x="1719763" y="3717"/>
+                  <a:pt x="1519550" y="18288"/>
+                </a:cubicBezTo>
+                <a:cubicBezTo>
+                  <a:pt x="1319337" y="32860"/>
+                  <a:pt x="1167371" y="17040"/>
+                  <a:pt x="1058258" y="18288"/>
+                </a:cubicBezTo>
+                <a:cubicBezTo>
+                  <a:pt x="949145" y="19536"/>
+                  <a:pt x="780234" y="31447"/>
+                  <a:pt x="705505" y="18288"/>
+                </a:cubicBezTo>
+                <a:cubicBezTo>
+                  <a:pt x="630776" y="5129"/>
+                  <a:pt x="215796" y="30056"/>
+                  <a:pt x="0" y="18288"/>
+                </a:cubicBezTo>
+                <a:cubicBezTo>
+                  <a:pt x="-53" y="11301"/>
+                  <a:pt x="-649" y="7756"/>
+                  <a:pt x="0" y="0"/>
+                </a:cubicBezTo>
+                <a:close/>
+              </a:path>
+            </a:pathLst>
+          </a:custGeom>
+          <a:solidFill>
+            <a:schemeClr val="accent2"/>
+          </a:solidFill>
+          <a:ln w="41275" cap="rnd">
+            <a:solidFill>
+              <a:schemeClr val="accent2"/>
+            </a:solidFill>
+            <a:round/>
+            <a:extLst>
+              <a:ext uri="{C807C97D-BFC1-408E-A445-0C87EB9F89A2}">
+                <ask:lineSketchStyleProps xmlns:ask="http://schemas.microsoft.com/office/drawing/2018/sketchyshapes" sd="1219033472">
+                  <a:prstGeom prst="rect">
+                    <a:avLst/>
+                  </a:prstGeom>
+                  <ask:type>
+                    <ask:lineSketchFreehand/>
+                  </ask:type>
+                </ask:lineSketchStyleProps>
+              </a:ext>
+            </a:extLst>
+          </a:ln>
+        </p:spPr>
+        <p:style>
+          <a:lnRef idx="2">
+            <a:schemeClr val="accent1">
+              <a:shade val="50000"/>
+            </a:schemeClr>
+          </a:lnRef>
+          <a:fillRef idx="1">
+            <a:schemeClr val="accent1"/>
+          </a:fillRef>
+          <a:effectRef idx="0">
+            <a:schemeClr val="accent1"/>
+          </a:effectRef>
+          <a:fontRef idx="minor">
+            <a:schemeClr val="lt1"/>
+          </a:fontRef>
+        </p:style>
+        <p:txBody>
+          <a:bodyPr rtlCol="0" anchor="ctr"/>
+          <a:lstStyle/>
+          <a:p>
+            <a:pPr algn="ctr"/>
+            <a:endParaRPr lang="en-US"/>
+          </a:p>
+        </p:txBody>
+      </p:sp>
+      <p:sp>
+        <p:nvSpPr>
+          <p:cNvPr id="3" name="Content Placeholder 2">
+            <a:extLst>
+              <a:ext uri="{FF2B5EF4-FFF2-40B4-BE49-F238E27FC236}">
+                <a16:creationId xmlns:a16="http://schemas.microsoft.com/office/drawing/2014/main" id="{17FEFE57-ADF3-EB80-7DD6-AE4CDC36B415}"/>
+              </a:ext>
+            </a:extLst>
+          </p:cNvPr>
+          <p:cNvSpPr>
+            <a:spLocks noGrp="1"/>
+          </p:cNvSpPr>
+          <p:nvPr>
+            <p:ph idx="1"/>
+          </p:nvPr>
+        </p:nvSpPr>
+        <p:spPr>
+          <a:xfrm>
+            <a:off x="838200" y="1929384"/>
+            <a:ext cx="10515600" cy="4251960"/>
+          </a:xfrm>
+        </p:spPr>
+        <p:txBody>
+          <a:bodyPr>
+            <a:normAutofit/>
+          </a:bodyPr>
+          <a:lstStyle/>
+          <a:p>
+            <a:r>
+              <a:rPr lang="en-US" sz="2200" dirty="0">
+                <a:hlinkClick r:id="rId2"/>
+              </a:rPr>
+              <a:t>*literature slide stuff</a:t>
+            </a:r>
+          </a:p>
+          <a:p>
+            <a:r>
+              <a:rPr lang="en-US" sz="2200" dirty="0" err="1">
+                <a:hlinkClick r:id="rId2"/>
+              </a:rPr>
+              <a:t>oneapi-src</a:t>
+            </a:r>
+            <a:r>
+              <a:rPr lang="en-US" sz="2200" dirty="0">
+                <a:hlinkClick r:id="rId2"/>
+              </a:rPr>
+              <a:t>/</a:t>
+            </a:r>
+            <a:r>
+              <a:rPr lang="en-US" sz="2200" dirty="0" err="1">
+                <a:hlinkClick r:id="rId2"/>
+              </a:rPr>
+              <a:t>oneTBB</a:t>
+            </a:r>
+            <a:r>
+              <a:rPr lang="en-US" sz="2200" dirty="0">
+                <a:hlinkClick r:id="rId2"/>
+              </a:rPr>
+              <a:t>: </a:t>
+            </a:r>
+            <a:r>
+              <a:rPr lang="en-US" sz="2200" dirty="0" err="1">
+                <a:hlinkClick r:id="rId2"/>
+              </a:rPr>
+              <a:t>oneAPI</a:t>
+            </a:r>
+            <a:r>
+              <a:rPr lang="en-US" sz="2200" dirty="0">
+                <a:hlinkClick r:id="rId2"/>
+              </a:rPr>
+              <a:t> Threading Building Blocks (</a:t>
+            </a:r>
+            <a:r>
+              <a:rPr lang="en-US" sz="2200" dirty="0" err="1">
+                <a:hlinkClick r:id="rId2"/>
+              </a:rPr>
+              <a:t>oneTBB</a:t>
+            </a:r>
+            <a:r>
+              <a:rPr lang="en-US" sz="2200" dirty="0">
+                <a:hlinkClick r:id="rId2"/>
+              </a:rPr>
+              <a:t>) (github.com)</a:t>
+            </a:r>
+            <a:endParaRPr lang="en-US" sz="2200" dirty="0"/>
+          </a:p>
+        </p:txBody>
+      </p:sp>
+    </p:spTree>
+    <p:extLst>
+      <p:ext uri="{BB962C8B-B14F-4D97-AF65-F5344CB8AC3E}">
+        <p14:creationId xmlns:p14="http://schemas.microsoft.com/office/powerpoint/2010/main" val="3257037674"/>
+      </p:ext>
+    </p:extLst>
+  </p:cSld>
+  <p:clrMapOvr>
+    <a:masterClrMapping/>
+  </p:clrMapOvr>
+  <p:timing>
+    <p:tnLst>
+      <p:par>
+        <p:cTn id="1" dur="indefinite" restart="never" nodeType="tmRoot">
+          <p:childTnLst>
+            <p:seq concurrent="1" nextAc="seek">
+              <p:cTn id="2" dur="indefinite" nodeType="mainSeq">
+                <p:childTnLst>
+                  <p:par>
+                    <p:cTn id="3" fill="hold">
+                      <p:stCondLst>
+                        <p:cond delay="indefinite"/>
+                        <p:cond evt="onBegin" delay="0">
+                          <p:tn val="2"/>
+                        </p:cond>
+                      </p:stCondLst>
+                      <p:childTnLst>
+                        <p:par>
+                          <p:cTn id="4" fill="hold">
+                            <p:stCondLst>
+                              <p:cond delay="0"/>
+                            </p:stCondLst>
+                            <p:childTnLst>
+                              <p:par>
+                                <p:cTn id="5" presetID="10" presetClass="entr" presetSubtype="0" fill="hold" grpId="0" nodeType="withEffect">
+                                  <p:stCondLst>
+                                    <p:cond delay="500"/>
+                                  </p:stCondLst>
+                                  <p:iterate type="wd">
+                                    <p:tmPct val="15000"/>
+                                  </p:iterate>
+                                  <p:childTnLst>
+                                    <p:set>
+                                      <p:cBhvr>
+                                        <p:cTn id="6" dur="1" fill="hold">
+                                          <p:stCondLst>
+                                            <p:cond delay="0"/>
+                                          </p:stCondLst>
+                                        </p:cTn>
+                                        <p:tgtEl>
+                                          <p:spTgt spid="2"/>
+                                        </p:tgtEl>
+                                        <p:attrNameLst>
+                                          <p:attrName>style.visibility</p:attrName>
+                                        </p:attrNameLst>
+                                      </p:cBhvr>
+                                      <p:to>
+                                        <p:strVal val="visible"/>
+                                      </p:to>
+                                    </p:set>
+                                    <p:animEffect transition="in" filter="fade">
+                                      <p:cBhvr>
+                                        <p:cTn id="7" dur="1000"/>
+                                        <p:tgtEl>
+                                          <p:spTgt spid="2"/>
+                                        </p:tgtEl>
+                                      </p:cBhvr>
+                                    </p:animEffect>
+                                  </p:childTnLst>
+                                </p:cTn>
+                              </p:par>
+                            </p:childTnLst>
+                          </p:cTn>
+                        </p:par>
+                      </p:childTnLst>
+                    </p:cTn>
+                  </p:par>
+                </p:childTnLst>
+              </p:cTn>
+              <p:prevCondLst>
+                <p:cond evt="onPrev" delay="0">
+                  <p:tgtEl>
+                    <p:sldTgt/>
+                  </p:tgtEl>
+                </p:cond>
+              </p:prevCondLst>
+              <p:nextCondLst>
+                <p:cond evt="onNext" delay="0">
+                  <p:tgtEl>
+                    <p:sldTgt/>
+                  </p:tgtEl>
+                </p:cond>
+              </p:nextCondLst>
+            </p:seq>
+          </p:childTnLst>
+        </p:cTn>
+      </p:par>
+    </p:tnLst>
+    <p:bldLst>
+      <p:bldP spid="2" grpId="0"/>
+    </p:bldLst>
+  </p:timing>
+</p:sld>
+</file>
+
+<file path=ppt/slides/slide2.xml><?xml version="1.0" encoding="utf-8"?>
+<p:sld xmlns:a="http://schemas.openxmlformats.org/drawingml/2006/main" xmlns:r="http://schemas.openxmlformats.org/officeDocument/2006/relationships" xmlns:p="http://schemas.openxmlformats.org/presentationml/2006/main">
+  <p:cSld>
+    <p:bg>
+      <p:bgPr>
+        <a:solidFill>
+          <a:schemeClr val="bg1"/>
+        </a:solidFill>
+        <a:effectLst/>
+      </p:bgPr>
+    </p:bg>
+    <p:spTree>
+      <p:nvGrpSpPr>
+        <p:cNvPr id="1" name=""/>
+        <p:cNvGrpSpPr/>
+        <p:nvPr/>
+      </p:nvGrpSpPr>
+      <p:grpSpPr>
+        <a:xfrm>
+          <a:off x="0" y="0"/>
+          <a:ext cx="0" cy="0"/>
+          <a:chOff x="0" y="0"/>
+          <a:chExt cx="0" cy="0"/>
+        </a:xfrm>
+      </p:grpSpPr>
+      <p:sp useBgFill="1">
+        <p:nvSpPr>
+          <p:cNvPr id="8" name="Rectangle 7">
+            <a:extLst>
+              <a:ext uri="{FF2B5EF4-FFF2-40B4-BE49-F238E27FC236}">
+                <a16:creationId xmlns:a16="http://schemas.microsoft.com/office/drawing/2014/main" id="{100EDD19-6802-4EC3-95CE-CFFAB042CFD6}"/>
+              </a:ext>
+              <a:ext uri="{C183D7F6-B498-43B3-948B-1728B52AA6E4}">
+                <adec:decorative xmlns:adec="http://schemas.microsoft.com/office/drawing/2017/decorative" val="1"/>
+              </a:ext>
+            </a:extLst>
+          </p:cNvPr>
+          <p:cNvSpPr>
+            <a:spLocks noGrp="1" noRot="1" noChangeAspect="1" noMove="1" noResize="1" noEditPoints="1" noAdjustHandles="1" noChangeArrowheads="1" noChangeShapeType="1" noTextEdit="1"/>
+          </p:cNvSpPr>
+          <p:nvPr>
+            <p:extLst>
+              <p:ext uri="{386F3935-93C4-4BCD-93E2-E3B085C9AB24}">
+                <p16:designElem xmlns:p16="http://schemas.microsoft.com/office/powerpoint/2015/main" val="1"/>
+              </p:ext>
+            </p:extLst>
+          </p:nvPr>
+        </p:nvSpPr>
+        <p:spPr>
+          <a:xfrm>
+            <a:off x="0" y="0"/>
+            <a:ext cx="12188952" cy="6858000"/>
+          </a:xfrm>
+          <a:prstGeom prst="rect">
+            <a:avLst/>
+          </a:prstGeom>
+          <a:ln>
+            <a:noFill/>
+          </a:ln>
+        </p:spPr>
+        <p:style>
+          <a:lnRef idx="2">
+            <a:schemeClr val="accent1">
+              <a:shade val="50000"/>
+            </a:schemeClr>
+          </a:lnRef>
+          <a:fillRef idx="1">
+            <a:schemeClr val="accent1"/>
+          </a:fillRef>
+          <a:effectRef idx="0">
+            <a:schemeClr val="accent1"/>
+          </a:effectRef>
+          <a:fontRef idx="minor">
+            <a:schemeClr val="lt1"/>
+          </a:fontRef>
+        </p:style>
+        <p:txBody>
+          <a:bodyPr rtlCol="0" anchor="ctr"/>
+          <a:lstStyle/>
+          <a:p>
+            <a:pPr algn="ctr"/>
+            <a:endParaRPr lang="en-US"/>
+          </a:p>
+        </p:txBody>
+      </p:sp>
       <p:sp>
         <p:nvSpPr>
           <p:cNvPr id="2" name="Title 1">
@@ -8524,21 +9387,661 @@
         </p:nvSpPr>
         <p:spPr>
           <a:xfrm>
-            <a:off x="772348" y="205199"/>
+            <a:off x="838200" y="365125"/>
             <a:ext cx="10515600" cy="1325563"/>
           </a:xfrm>
         </p:spPr>
         <p:txBody>
-          <a:bodyPr/>
+          <a:bodyPr>
+            <a:normAutofit/>
+          </a:bodyPr>
           <a:lstStyle/>
           <a:p>
             <a:r>
-              <a:rPr lang="en-US">
+              <a:rPr lang="en-US" sz="5400" dirty="0">
                 <a:ea typeface="Calibri Light"/>
                 <a:cs typeface="Calibri Light"/>
               </a:rPr>
               <a:t>Topic Overview</a:t>
             </a:r>
+            <a:endParaRPr lang="en-US" sz="5400" dirty="0"/>
+          </a:p>
+        </p:txBody>
+      </p:sp>
+      <p:sp>
+        <p:nvSpPr>
+          <p:cNvPr id="10" name="sketch line">
+            <a:extLst>
+              <a:ext uri="{FF2B5EF4-FFF2-40B4-BE49-F238E27FC236}">
+                <a16:creationId xmlns:a16="http://schemas.microsoft.com/office/drawing/2014/main" id="{DB17E863-922E-4C26-BD64-E8FD41D28661}"/>
+              </a:ext>
+              <a:ext uri="{C183D7F6-B498-43B3-948B-1728B52AA6E4}">
+                <adec:decorative xmlns:adec="http://schemas.microsoft.com/office/drawing/2017/decorative" val="1"/>
+              </a:ext>
+            </a:extLst>
+          </p:cNvPr>
+          <p:cNvSpPr>
+            <a:spLocks noGrp="1" noRot="1" noChangeAspect="1" noMove="1" noResize="1" noEditPoints="1" noAdjustHandles="1" noChangeArrowheads="1" noChangeShapeType="1" noTextEdit="1"/>
+          </p:cNvSpPr>
+          <p:nvPr>
+            <p:extLst>
+              <p:ext uri="{386F3935-93C4-4BCD-93E2-E3B085C9AB24}">
+                <p16:designElem xmlns:p16="http://schemas.microsoft.com/office/powerpoint/2015/main" val="1"/>
+              </p:ext>
+            </p:extLst>
+          </p:nvPr>
+        </p:nvSpPr>
+        <p:spPr>
+          <a:xfrm>
+            <a:off x="669036" y="1677373"/>
+            <a:ext cx="10853928" cy="18288"/>
+          </a:xfrm>
+          <a:custGeom>
+            <a:avLst/>
+            <a:gdLst>
+              <a:gd name="connsiteX0" fmla="*/ 0 w 10853928"/>
+              <a:gd name="connsiteY0" fmla="*/ 0 h 18288"/>
+              <a:gd name="connsiteX1" fmla="*/ 461292 w 10853928"/>
+              <a:gd name="connsiteY1" fmla="*/ 0 h 18288"/>
+              <a:gd name="connsiteX2" fmla="*/ 1139662 w 10853928"/>
+              <a:gd name="connsiteY2" fmla="*/ 0 h 18288"/>
+              <a:gd name="connsiteX3" fmla="*/ 1926572 w 10853928"/>
+              <a:gd name="connsiteY3" fmla="*/ 0 h 18288"/>
+              <a:gd name="connsiteX4" fmla="*/ 2279325 w 10853928"/>
+              <a:gd name="connsiteY4" fmla="*/ 0 h 18288"/>
+              <a:gd name="connsiteX5" fmla="*/ 2632078 w 10853928"/>
+              <a:gd name="connsiteY5" fmla="*/ 0 h 18288"/>
+              <a:gd name="connsiteX6" fmla="*/ 3527527 w 10853928"/>
+              <a:gd name="connsiteY6" fmla="*/ 0 h 18288"/>
+              <a:gd name="connsiteX7" fmla="*/ 4205897 w 10853928"/>
+              <a:gd name="connsiteY7" fmla="*/ 0 h 18288"/>
+              <a:gd name="connsiteX8" fmla="*/ 4558650 w 10853928"/>
+              <a:gd name="connsiteY8" fmla="*/ 0 h 18288"/>
+              <a:gd name="connsiteX9" fmla="*/ 5237020 w 10853928"/>
+              <a:gd name="connsiteY9" fmla="*/ 0 h 18288"/>
+              <a:gd name="connsiteX10" fmla="*/ 6132469 w 10853928"/>
+              <a:gd name="connsiteY10" fmla="*/ 0 h 18288"/>
+              <a:gd name="connsiteX11" fmla="*/ 6702301 w 10853928"/>
+              <a:gd name="connsiteY11" fmla="*/ 0 h 18288"/>
+              <a:gd name="connsiteX12" fmla="*/ 7272132 w 10853928"/>
+              <a:gd name="connsiteY12" fmla="*/ 0 h 18288"/>
+              <a:gd name="connsiteX13" fmla="*/ 7950502 w 10853928"/>
+              <a:gd name="connsiteY13" fmla="*/ 0 h 18288"/>
+              <a:gd name="connsiteX14" fmla="*/ 8737412 w 10853928"/>
+              <a:gd name="connsiteY14" fmla="*/ 0 h 18288"/>
+              <a:gd name="connsiteX15" fmla="*/ 9524322 w 10853928"/>
+              <a:gd name="connsiteY15" fmla="*/ 0 h 18288"/>
+              <a:gd name="connsiteX16" fmla="*/ 10853928 w 10853928"/>
+              <a:gd name="connsiteY16" fmla="*/ 0 h 18288"/>
+              <a:gd name="connsiteX17" fmla="*/ 10853928 w 10853928"/>
+              <a:gd name="connsiteY17" fmla="*/ 18288 h 18288"/>
+              <a:gd name="connsiteX18" fmla="*/ 10392636 w 10853928"/>
+              <a:gd name="connsiteY18" fmla="*/ 18288 h 18288"/>
+              <a:gd name="connsiteX19" fmla="*/ 9497187 w 10853928"/>
+              <a:gd name="connsiteY19" fmla="*/ 18288 h 18288"/>
+              <a:gd name="connsiteX20" fmla="*/ 8818817 w 10853928"/>
+              <a:gd name="connsiteY20" fmla="*/ 18288 h 18288"/>
+              <a:gd name="connsiteX21" fmla="*/ 8466064 w 10853928"/>
+              <a:gd name="connsiteY21" fmla="*/ 18288 h 18288"/>
+              <a:gd name="connsiteX22" fmla="*/ 7787693 w 10853928"/>
+              <a:gd name="connsiteY22" fmla="*/ 18288 h 18288"/>
+              <a:gd name="connsiteX23" fmla="*/ 7217862 w 10853928"/>
+              <a:gd name="connsiteY23" fmla="*/ 18288 h 18288"/>
+              <a:gd name="connsiteX24" fmla="*/ 6648031 w 10853928"/>
+              <a:gd name="connsiteY24" fmla="*/ 18288 h 18288"/>
+              <a:gd name="connsiteX25" fmla="*/ 6078200 w 10853928"/>
+              <a:gd name="connsiteY25" fmla="*/ 18288 h 18288"/>
+              <a:gd name="connsiteX26" fmla="*/ 5508368 w 10853928"/>
+              <a:gd name="connsiteY26" fmla="*/ 18288 h 18288"/>
+              <a:gd name="connsiteX27" fmla="*/ 4721459 w 10853928"/>
+              <a:gd name="connsiteY27" fmla="*/ 18288 h 18288"/>
+              <a:gd name="connsiteX28" fmla="*/ 4043088 w 10853928"/>
+              <a:gd name="connsiteY28" fmla="*/ 18288 h 18288"/>
+              <a:gd name="connsiteX29" fmla="*/ 3690336 w 10853928"/>
+              <a:gd name="connsiteY29" fmla="*/ 18288 h 18288"/>
+              <a:gd name="connsiteX30" fmla="*/ 3120504 w 10853928"/>
+              <a:gd name="connsiteY30" fmla="*/ 18288 h 18288"/>
+              <a:gd name="connsiteX31" fmla="*/ 2333595 w 10853928"/>
+              <a:gd name="connsiteY31" fmla="*/ 18288 h 18288"/>
+              <a:gd name="connsiteX32" fmla="*/ 1872303 w 10853928"/>
+              <a:gd name="connsiteY32" fmla="*/ 18288 h 18288"/>
+              <a:gd name="connsiteX33" fmla="*/ 976854 w 10853928"/>
+              <a:gd name="connsiteY33" fmla="*/ 18288 h 18288"/>
+              <a:gd name="connsiteX34" fmla="*/ 0 w 10853928"/>
+              <a:gd name="connsiteY34" fmla="*/ 18288 h 18288"/>
+              <a:gd name="connsiteX35" fmla="*/ 0 w 10853928"/>
+              <a:gd name="connsiteY35" fmla="*/ 0 h 18288"/>
+            </a:gdLst>
+            <a:ahLst/>
+            <a:cxnLst>
+              <a:cxn ang="0">
+                <a:pos x="connsiteX0" y="connsiteY0"/>
+              </a:cxn>
+              <a:cxn ang="0">
+                <a:pos x="connsiteX1" y="connsiteY1"/>
+              </a:cxn>
+              <a:cxn ang="0">
+                <a:pos x="connsiteX2" y="connsiteY2"/>
+              </a:cxn>
+              <a:cxn ang="0">
+                <a:pos x="connsiteX3" y="connsiteY3"/>
+              </a:cxn>
+              <a:cxn ang="0">
+                <a:pos x="connsiteX4" y="connsiteY4"/>
+              </a:cxn>
+              <a:cxn ang="0">
+                <a:pos x="connsiteX5" y="connsiteY5"/>
+              </a:cxn>
+              <a:cxn ang="0">
+                <a:pos x="connsiteX6" y="connsiteY6"/>
+              </a:cxn>
+              <a:cxn ang="0">
+                <a:pos x="connsiteX7" y="connsiteY7"/>
+              </a:cxn>
+              <a:cxn ang="0">
+                <a:pos x="connsiteX8" y="connsiteY8"/>
+              </a:cxn>
+              <a:cxn ang="0">
+                <a:pos x="connsiteX9" y="connsiteY9"/>
+              </a:cxn>
+              <a:cxn ang="0">
+                <a:pos x="connsiteX10" y="connsiteY10"/>
+              </a:cxn>
+              <a:cxn ang="0">
+                <a:pos x="connsiteX11" y="connsiteY11"/>
+              </a:cxn>
+              <a:cxn ang="0">
+                <a:pos x="connsiteX12" y="connsiteY12"/>
+              </a:cxn>
+              <a:cxn ang="0">
+                <a:pos x="connsiteX13" y="connsiteY13"/>
+              </a:cxn>
+              <a:cxn ang="0">
+                <a:pos x="connsiteX14" y="connsiteY14"/>
+              </a:cxn>
+              <a:cxn ang="0">
+                <a:pos x="connsiteX15" y="connsiteY15"/>
+              </a:cxn>
+              <a:cxn ang="0">
+                <a:pos x="connsiteX16" y="connsiteY16"/>
+              </a:cxn>
+              <a:cxn ang="0">
+                <a:pos x="connsiteX17" y="connsiteY17"/>
+              </a:cxn>
+              <a:cxn ang="0">
+                <a:pos x="connsiteX18" y="connsiteY18"/>
+              </a:cxn>
+              <a:cxn ang="0">
+                <a:pos x="connsiteX19" y="connsiteY19"/>
+              </a:cxn>
+              <a:cxn ang="0">
+                <a:pos x="connsiteX20" y="connsiteY20"/>
+              </a:cxn>
+              <a:cxn ang="0">
+                <a:pos x="connsiteX21" y="connsiteY21"/>
+              </a:cxn>
+              <a:cxn ang="0">
+                <a:pos x="connsiteX22" y="connsiteY22"/>
+              </a:cxn>
+              <a:cxn ang="0">
+                <a:pos x="connsiteX23" y="connsiteY23"/>
+              </a:cxn>
+              <a:cxn ang="0">
+                <a:pos x="connsiteX24" y="connsiteY24"/>
+              </a:cxn>
+              <a:cxn ang="0">
+                <a:pos x="connsiteX25" y="connsiteY25"/>
+              </a:cxn>
+              <a:cxn ang="0">
+                <a:pos x="connsiteX26" y="connsiteY26"/>
+              </a:cxn>
+              <a:cxn ang="0">
+                <a:pos x="connsiteX27" y="connsiteY27"/>
+              </a:cxn>
+              <a:cxn ang="0">
+                <a:pos x="connsiteX28" y="connsiteY28"/>
+              </a:cxn>
+              <a:cxn ang="0">
+                <a:pos x="connsiteX29" y="connsiteY29"/>
+              </a:cxn>
+              <a:cxn ang="0">
+                <a:pos x="connsiteX30" y="connsiteY30"/>
+              </a:cxn>
+              <a:cxn ang="0">
+                <a:pos x="connsiteX31" y="connsiteY31"/>
+              </a:cxn>
+              <a:cxn ang="0">
+                <a:pos x="connsiteX32" y="connsiteY32"/>
+              </a:cxn>
+              <a:cxn ang="0">
+                <a:pos x="connsiteX33" y="connsiteY33"/>
+              </a:cxn>
+              <a:cxn ang="0">
+                <a:pos x="connsiteX34" y="connsiteY34"/>
+              </a:cxn>
+              <a:cxn ang="0">
+                <a:pos x="connsiteX35" y="connsiteY35"/>
+              </a:cxn>
+            </a:cxnLst>
+            <a:rect l="l" t="t" r="r" b="b"/>
+            <a:pathLst>
+              <a:path w="10853928" h="18288" fill="none" extrusionOk="0">
+                <a:moveTo>
+                  <a:pt x="0" y="0"/>
+                </a:moveTo>
+                <a:cubicBezTo>
+                  <a:pt x="146993" y="-19076"/>
+                  <a:pt x="347684" y="-4790"/>
+                  <a:pt x="461292" y="0"/>
+                </a:cubicBezTo>
+                <a:cubicBezTo>
+                  <a:pt x="574900" y="4790"/>
+                  <a:pt x="808367" y="19821"/>
+                  <a:pt x="1139662" y="0"/>
+                </a:cubicBezTo>
+                <a:cubicBezTo>
+                  <a:pt x="1470957" y="-19821"/>
+                  <a:pt x="1627405" y="5721"/>
+                  <a:pt x="1926572" y="0"/>
+                </a:cubicBezTo>
+                <a:cubicBezTo>
+                  <a:pt x="2225739" y="-5721"/>
+                  <a:pt x="2137730" y="-3235"/>
+                  <a:pt x="2279325" y="0"/>
+                </a:cubicBezTo>
+                <a:cubicBezTo>
+                  <a:pt x="2420920" y="3235"/>
+                  <a:pt x="2456518" y="9685"/>
+                  <a:pt x="2632078" y="0"/>
+                </a:cubicBezTo>
+                <a:cubicBezTo>
+                  <a:pt x="2807638" y="-9685"/>
+                  <a:pt x="3211516" y="-43007"/>
+                  <a:pt x="3527527" y="0"/>
+                </a:cubicBezTo>
+                <a:cubicBezTo>
+                  <a:pt x="3843538" y="43007"/>
+                  <a:pt x="4058833" y="22042"/>
+                  <a:pt x="4205897" y="0"/>
+                </a:cubicBezTo>
+                <a:cubicBezTo>
+                  <a:pt x="4352961" y="-22042"/>
+                  <a:pt x="4474805" y="-11846"/>
+                  <a:pt x="4558650" y="0"/>
+                </a:cubicBezTo>
+                <a:cubicBezTo>
+                  <a:pt x="4642495" y="11846"/>
+                  <a:pt x="5041928" y="-6069"/>
+                  <a:pt x="5237020" y="0"/>
+                </a:cubicBezTo>
+                <a:cubicBezTo>
+                  <a:pt x="5432112" y="6069"/>
+                  <a:pt x="5943266" y="-17479"/>
+                  <a:pt x="6132469" y="0"/>
+                </a:cubicBezTo>
+                <a:cubicBezTo>
+                  <a:pt x="6321672" y="17479"/>
+                  <a:pt x="6483872" y="26234"/>
+                  <a:pt x="6702301" y="0"/>
+                </a:cubicBezTo>
+                <a:cubicBezTo>
+                  <a:pt x="6920730" y="-26234"/>
+                  <a:pt x="6991194" y="-15156"/>
+                  <a:pt x="7272132" y="0"/>
+                </a:cubicBezTo>
+                <a:cubicBezTo>
+                  <a:pt x="7553070" y="15156"/>
+                  <a:pt x="7684444" y="-32961"/>
+                  <a:pt x="7950502" y="0"/>
+                </a:cubicBezTo>
+                <a:cubicBezTo>
+                  <a:pt x="8216560" y="32961"/>
+                  <a:pt x="8493290" y="-10491"/>
+                  <a:pt x="8737412" y="0"/>
+                </a:cubicBezTo>
+                <a:cubicBezTo>
+                  <a:pt x="8981534" y="10491"/>
+                  <a:pt x="9191586" y="-13899"/>
+                  <a:pt x="9524322" y="0"/>
+                </a:cubicBezTo>
+                <a:cubicBezTo>
+                  <a:pt x="9857058" y="13899"/>
+                  <a:pt x="10297509" y="7485"/>
+                  <a:pt x="10853928" y="0"/>
+                </a:cubicBezTo>
+                <a:cubicBezTo>
+                  <a:pt x="10854574" y="4451"/>
+                  <a:pt x="10854418" y="9226"/>
+                  <a:pt x="10853928" y="18288"/>
+                </a:cubicBezTo>
+                <a:cubicBezTo>
+                  <a:pt x="10691638" y="28522"/>
+                  <a:pt x="10574319" y="29578"/>
+                  <a:pt x="10392636" y="18288"/>
+                </a:cubicBezTo>
+                <a:cubicBezTo>
+                  <a:pt x="10210953" y="6998"/>
+                  <a:pt x="9836277" y="-16742"/>
+                  <a:pt x="9497187" y="18288"/>
+                </a:cubicBezTo>
+                <a:cubicBezTo>
+                  <a:pt x="9158097" y="53318"/>
+                  <a:pt x="9119479" y="30714"/>
+                  <a:pt x="8818817" y="18288"/>
+                </a:cubicBezTo>
+                <a:cubicBezTo>
+                  <a:pt x="8518155" y="5863"/>
+                  <a:pt x="8640037" y="6483"/>
+                  <a:pt x="8466064" y="18288"/>
+                </a:cubicBezTo>
+                <a:cubicBezTo>
+                  <a:pt x="8292091" y="30093"/>
+                  <a:pt x="7997656" y="18914"/>
+                  <a:pt x="7787693" y="18288"/>
+                </a:cubicBezTo>
+                <a:cubicBezTo>
+                  <a:pt x="7577730" y="17662"/>
+                  <a:pt x="7412468" y="21416"/>
+                  <a:pt x="7217862" y="18288"/>
+                </a:cubicBezTo>
+                <a:cubicBezTo>
+                  <a:pt x="7023256" y="15160"/>
+                  <a:pt x="6898018" y="14824"/>
+                  <a:pt x="6648031" y="18288"/>
+                </a:cubicBezTo>
+                <a:cubicBezTo>
+                  <a:pt x="6398044" y="21752"/>
+                  <a:pt x="6254402" y="38625"/>
+                  <a:pt x="6078200" y="18288"/>
+                </a:cubicBezTo>
+                <a:cubicBezTo>
+                  <a:pt x="5901998" y="-2049"/>
+                  <a:pt x="5622886" y="3213"/>
+                  <a:pt x="5508368" y="18288"/>
+                </a:cubicBezTo>
+                <a:cubicBezTo>
+                  <a:pt x="5393850" y="33363"/>
+                  <a:pt x="5036260" y="26830"/>
+                  <a:pt x="4721459" y="18288"/>
+                </a:cubicBezTo>
+                <a:cubicBezTo>
+                  <a:pt x="4406658" y="9746"/>
+                  <a:pt x="4239221" y="41551"/>
+                  <a:pt x="4043088" y="18288"/>
+                </a:cubicBezTo>
+                <a:cubicBezTo>
+                  <a:pt x="3846955" y="-4975"/>
+                  <a:pt x="3818802" y="34658"/>
+                  <a:pt x="3690336" y="18288"/>
+                </a:cubicBezTo>
+                <a:cubicBezTo>
+                  <a:pt x="3561870" y="1918"/>
+                  <a:pt x="3265491" y="42194"/>
+                  <a:pt x="3120504" y="18288"/>
+                </a:cubicBezTo>
+                <a:cubicBezTo>
+                  <a:pt x="2975517" y="-5618"/>
+                  <a:pt x="2720254" y="36673"/>
+                  <a:pt x="2333595" y="18288"/>
+                </a:cubicBezTo>
+                <a:cubicBezTo>
+                  <a:pt x="1946936" y="-97"/>
+                  <a:pt x="2097241" y="5776"/>
+                  <a:pt x="1872303" y="18288"/>
+                </a:cubicBezTo>
+                <a:cubicBezTo>
+                  <a:pt x="1647365" y="30800"/>
+                  <a:pt x="1282708" y="45380"/>
+                  <a:pt x="976854" y="18288"/>
+                </a:cubicBezTo>
+                <a:cubicBezTo>
+                  <a:pt x="671000" y="-8804"/>
+                  <a:pt x="408401" y="-12775"/>
+                  <a:pt x="0" y="18288"/>
+                </a:cubicBezTo>
+                <a:cubicBezTo>
+                  <a:pt x="-213" y="9468"/>
+                  <a:pt x="187" y="4459"/>
+                  <a:pt x="0" y="0"/>
+                </a:cubicBezTo>
+                <a:close/>
+              </a:path>
+              <a:path w="10853928" h="18288" stroke="0" extrusionOk="0">
+                <a:moveTo>
+                  <a:pt x="0" y="0"/>
+                </a:moveTo>
+                <a:cubicBezTo>
+                  <a:pt x="267322" y="15284"/>
+                  <a:pt x="415388" y="-21048"/>
+                  <a:pt x="569831" y="0"/>
+                </a:cubicBezTo>
+                <a:cubicBezTo>
+                  <a:pt x="724274" y="21048"/>
+                  <a:pt x="769333" y="-2353"/>
+                  <a:pt x="922584" y="0"/>
+                </a:cubicBezTo>
+                <a:cubicBezTo>
+                  <a:pt x="1075835" y="2353"/>
+                  <a:pt x="1399490" y="-145"/>
+                  <a:pt x="1818033" y="0"/>
+                </a:cubicBezTo>
+                <a:cubicBezTo>
+                  <a:pt x="2236576" y="145"/>
+                  <a:pt x="2145330" y="5482"/>
+                  <a:pt x="2387864" y="0"/>
+                </a:cubicBezTo>
+                <a:cubicBezTo>
+                  <a:pt x="2630398" y="-5482"/>
+                  <a:pt x="2793207" y="18487"/>
+                  <a:pt x="2957695" y="0"/>
+                </a:cubicBezTo>
+                <a:cubicBezTo>
+                  <a:pt x="3122183" y="-18487"/>
+                  <a:pt x="3579141" y="19003"/>
+                  <a:pt x="3853144" y="0"/>
+                </a:cubicBezTo>
+                <a:cubicBezTo>
+                  <a:pt x="4127147" y="-19003"/>
+                  <a:pt x="4209857" y="12211"/>
+                  <a:pt x="4314436" y="0"/>
+                </a:cubicBezTo>
+                <a:cubicBezTo>
+                  <a:pt x="4419015" y="-12211"/>
+                  <a:pt x="4762459" y="-17220"/>
+                  <a:pt x="5209885" y="0"/>
+                </a:cubicBezTo>
+                <a:cubicBezTo>
+                  <a:pt x="5657311" y="17220"/>
+                  <a:pt x="5692663" y="-3290"/>
+                  <a:pt x="6105335" y="0"/>
+                </a:cubicBezTo>
+                <a:cubicBezTo>
+                  <a:pt x="6518007" y="3290"/>
+                  <a:pt x="6455516" y="-5124"/>
+                  <a:pt x="6783705" y="0"/>
+                </a:cubicBezTo>
+                <a:cubicBezTo>
+                  <a:pt x="7111894" y="5124"/>
+                  <a:pt x="7441941" y="-17829"/>
+                  <a:pt x="7679154" y="0"/>
+                </a:cubicBezTo>
+                <a:cubicBezTo>
+                  <a:pt x="7916367" y="17829"/>
+                  <a:pt x="8102967" y="-24363"/>
+                  <a:pt x="8248985" y="0"/>
+                </a:cubicBezTo>
+                <a:cubicBezTo>
+                  <a:pt x="8395003" y="24363"/>
+                  <a:pt x="8552393" y="25505"/>
+                  <a:pt x="8818817" y="0"/>
+                </a:cubicBezTo>
+                <a:cubicBezTo>
+                  <a:pt x="9085241" y="-25505"/>
+                  <a:pt x="9411308" y="38000"/>
+                  <a:pt x="9605726" y="0"/>
+                </a:cubicBezTo>
+                <a:cubicBezTo>
+                  <a:pt x="9800144" y="-38000"/>
+                  <a:pt x="10006468" y="-25741"/>
+                  <a:pt x="10175558" y="0"/>
+                </a:cubicBezTo>
+                <a:cubicBezTo>
+                  <a:pt x="10344648" y="25741"/>
+                  <a:pt x="10696282" y="695"/>
+                  <a:pt x="10853928" y="0"/>
+                </a:cubicBezTo>
+                <a:cubicBezTo>
+                  <a:pt x="10853521" y="8690"/>
+                  <a:pt x="10853774" y="14141"/>
+                  <a:pt x="10853928" y="18288"/>
+                </a:cubicBezTo>
+                <a:cubicBezTo>
+                  <a:pt x="10608124" y="24255"/>
+                  <a:pt x="10343415" y="22307"/>
+                  <a:pt x="10067018" y="18288"/>
+                </a:cubicBezTo>
+                <a:cubicBezTo>
+                  <a:pt x="9790621" y="14270"/>
+                  <a:pt x="9843266" y="3564"/>
+                  <a:pt x="9714266" y="18288"/>
+                </a:cubicBezTo>
+                <a:cubicBezTo>
+                  <a:pt x="9585266" y="33012"/>
+                  <a:pt x="9379484" y="1875"/>
+                  <a:pt x="9252974" y="18288"/>
+                </a:cubicBezTo>
+                <a:cubicBezTo>
+                  <a:pt x="9126464" y="34701"/>
+                  <a:pt x="8580678" y="-4904"/>
+                  <a:pt x="8357525" y="18288"/>
+                </a:cubicBezTo>
+                <a:cubicBezTo>
+                  <a:pt x="8134372" y="41480"/>
+                  <a:pt x="7903199" y="26458"/>
+                  <a:pt x="7679154" y="18288"/>
+                </a:cubicBezTo>
+                <a:cubicBezTo>
+                  <a:pt x="7455109" y="10118"/>
+                  <a:pt x="7435944" y="27109"/>
+                  <a:pt x="7217862" y="18288"/>
+                </a:cubicBezTo>
+                <a:cubicBezTo>
+                  <a:pt x="6999780" y="9467"/>
+                  <a:pt x="6680409" y="18985"/>
+                  <a:pt x="6539492" y="18288"/>
+                </a:cubicBezTo>
+                <a:cubicBezTo>
+                  <a:pt x="6398575" y="17592"/>
+                  <a:pt x="6312077" y="33018"/>
+                  <a:pt x="6186739" y="18288"/>
+                </a:cubicBezTo>
+                <a:cubicBezTo>
+                  <a:pt x="6061401" y="3558"/>
+                  <a:pt x="5947033" y="12075"/>
+                  <a:pt x="5833986" y="18288"/>
+                </a:cubicBezTo>
+                <a:cubicBezTo>
+                  <a:pt x="5720939" y="24501"/>
+                  <a:pt x="5482226" y="8586"/>
+                  <a:pt x="5155616" y="18288"/>
+                </a:cubicBezTo>
+                <a:cubicBezTo>
+                  <a:pt x="4829006" y="27991"/>
+                  <a:pt x="4841274" y="29316"/>
+                  <a:pt x="4694324" y="18288"/>
+                </a:cubicBezTo>
+                <a:cubicBezTo>
+                  <a:pt x="4547374" y="7260"/>
+                  <a:pt x="4077675" y="7013"/>
+                  <a:pt x="3907414" y="18288"/>
+                </a:cubicBezTo>
+                <a:cubicBezTo>
+                  <a:pt x="3737153" y="29564"/>
+                  <a:pt x="3538393" y="21630"/>
+                  <a:pt x="3446122" y="18288"/>
+                </a:cubicBezTo>
+                <a:cubicBezTo>
+                  <a:pt x="3353851" y="14946"/>
+                  <a:pt x="2990320" y="-8091"/>
+                  <a:pt x="2659212" y="18288"/>
+                </a:cubicBezTo>
+                <a:cubicBezTo>
+                  <a:pt x="2328104" y="44667"/>
+                  <a:pt x="2427653" y="9607"/>
+                  <a:pt x="2306460" y="18288"/>
+                </a:cubicBezTo>
+                <a:cubicBezTo>
+                  <a:pt x="2185267" y="26969"/>
+                  <a:pt x="1719763" y="3717"/>
+                  <a:pt x="1519550" y="18288"/>
+                </a:cubicBezTo>
+                <a:cubicBezTo>
+                  <a:pt x="1319337" y="32860"/>
+                  <a:pt x="1167371" y="17040"/>
+                  <a:pt x="1058258" y="18288"/>
+                </a:cubicBezTo>
+                <a:cubicBezTo>
+                  <a:pt x="949145" y="19536"/>
+                  <a:pt x="780234" y="31447"/>
+                  <a:pt x="705505" y="18288"/>
+                </a:cubicBezTo>
+                <a:cubicBezTo>
+                  <a:pt x="630776" y="5129"/>
+                  <a:pt x="215796" y="30056"/>
+                  <a:pt x="0" y="18288"/>
+                </a:cubicBezTo>
+                <a:cubicBezTo>
+                  <a:pt x="-53" y="11301"/>
+                  <a:pt x="-649" y="7756"/>
+                  <a:pt x="0" y="0"/>
+                </a:cubicBezTo>
+                <a:close/>
+              </a:path>
+            </a:pathLst>
+          </a:custGeom>
+          <a:solidFill>
+            <a:schemeClr val="accent2"/>
+          </a:solidFill>
+          <a:ln w="41275" cap="rnd">
+            <a:solidFill>
+              <a:schemeClr val="accent2"/>
+            </a:solidFill>
+            <a:round/>
+            <a:extLst>
+              <a:ext uri="{C807C97D-BFC1-408E-A445-0C87EB9F89A2}">
+                <ask:lineSketchStyleProps xmlns:ask="http://schemas.microsoft.com/office/drawing/2018/sketchyshapes" sd="1219033472">
+                  <a:prstGeom prst="rect">
+                    <a:avLst/>
+                  </a:prstGeom>
+                  <ask:type>
+                    <ask:lineSketchFreehand/>
+                  </ask:type>
+                </ask:lineSketchStyleProps>
+              </a:ext>
+            </a:extLst>
+          </a:ln>
+        </p:spPr>
+        <p:style>
+          <a:lnRef idx="2">
+            <a:schemeClr val="accent1">
+              <a:shade val="50000"/>
+            </a:schemeClr>
+          </a:lnRef>
+          <a:fillRef idx="1">
+            <a:schemeClr val="accent1"/>
+          </a:fillRef>
+          <a:effectRef idx="0">
+            <a:schemeClr val="accent1"/>
+          </a:effectRef>
+          <a:fontRef idx="minor">
+            <a:schemeClr val="lt1"/>
+          </a:fontRef>
+        </p:style>
+        <p:txBody>
+          <a:bodyPr rtlCol="0" anchor="ctr"/>
+          <a:lstStyle/>
+          <a:p>
+            <a:pPr algn="ctr"/>
             <a:endParaRPr lang="en-US"/>
           </a:p>
         </p:txBody>
@@ -8559,25 +10062,30 @@
             <p:ph idx="1"/>
           </p:nvPr>
         </p:nvSpPr>
-        <p:spPr/>
+        <p:spPr>
+          <a:xfrm>
+            <a:off x="838200" y="1929384"/>
+            <a:ext cx="10515600" cy="4251960"/>
+          </a:xfrm>
+        </p:spPr>
         <p:txBody>
-          <a:bodyPr vert="horz" lIns="91440" tIns="45720" rIns="91440" bIns="45720" rtlCol="0" anchor="t">
+          <a:bodyPr vert="horz" lIns="91440" tIns="45720" rIns="91440" bIns="45720" rtlCol="0">
             <a:normAutofit/>
           </a:bodyPr>
           <a:lstStyle/>
           <a:p>
             <a:pPr marL="457200" indent="-457200"/>
             <a:r>
-              <a:rPr lang="en-US">
+              <a:rPr lang="en-US" sz="2200" dirty="0">
                 <a:ea typeface="Calibri"/>
                 <a:cs typeface="Calibri"/>
               </a:rPr>
               <a:t>In this project, we investigate the potential performance enhancements gained through parallelizing search algorithms by dividing the search process in comparison to enhancing a search algorithm with addition of heuristics. </a:t>
             </a:r>
-            <a:endParaRPr lang="en-US"/>
-          </a:p>
-          <a:p>
-            <a:endParaRPr lang="en-US">
+            <a:endParaRPr lang="en-US" sz="2200" dirty="0"/>
+          </a:p>
+          <a:p>
+            <a:endParaRPr lang="en-US" sz="2200" dirty="0">
               <a:ea typeface="Calibri"/>
               <a:cs typeface="Calibri"/>
             </a:endParaRPr>
@@ -8600,6 +10108,14 @@
 <file path=ppt/slides/slide3.xml><?xml version="1.0" encoding="utf-8"?>
 <p:sld xmlns:a="http://schemas.openxmlformats.org/drawingml/2006/main" xmlns:r="http://schemas.openxmlformats.org/officeDocument/2006/relationships" xmlns:p="http://schemas.openxmlformats.org/presentationml/2006/main">
   <p:cSld>
+    <p:bg>
+      <p:bgPr>
+        <a:solidFill>
+          <a:schemeClr val="bg1"/>
+        </a:solidFill>
+        <a:effectLst/>
+      </p:bgPr>
+    </p:bg>
     <p:spTree>
       <p:nvGrpSpPr>
         <p:cNvPr id="1" name=""/>
@@ -8614,6 +10130,66 @@
           <a:chExt cx="0" cy="0"/>
         </a:xfrm>
       </p:grpSpPr>
+      <p:sp useBgFill="1">
+        <p:nvSpPr>
+          <p:cNvPr id="8" name="Rectangle 7">
+            <a:extLst>
+              <a:ext uri="{FF2B5EF4-FFF2-40B4-BE49-F238E27FC236}">
+                <a16:creationId xmlns:a16="http://schemas.microsoft.com/office/drawing/2014/main" id="{100EDD19-6802-4EC3-95CE-CFFAB042CFD6}"/>
+              </a:ext>
+              <a:ext uri="{C183D7F6-B498-43B3-948B-1728B52AA6E4}">
+                <adec:decorative xmlns:adec="http://schemas.microsoft.com/office/drawing/2017/decorative" val="1"/>
+              </a:ext>
+            </a:extLst>
+          </p:cNvPr>
+          <p:cNvSpPr>
+            <a:spLocks noGrp="1" noRot="1" noChangeAspect="1" noMove="1" noResize="1" noEditPoints="1" noAdjustHandles="1" noChangeArrowheads="1" noChangeShapeType="1" noTextEdit="1"/>
+          </p:cNvSpPr>
+          <p:nvPr>
+            <p:extLst>
+              <p:ext uri="{386F3935-93C4-4BCD-93E2-E3B085C9AB24}">
+                <p16:designElem xmlns:p16="http://schemas.microsoft.com/office/powerpoint/2015/main" val="1"/>
+              </p:ext>
+            </p:extLst>
+          </p:nvPr>
+        </p:nvSpPr>
+        <p:spPr>
+          <a:xfrm>
+            <a:off x="0" y="0"/>
+            <a:ext cx="12188952" cy="6858000"/>
+          </a:xfrm>
+          <a:prstGeom prst="rect">
+            <a:avLst/>
+          </a:prstGeom>
+          <a:ln>
+            <a:noFill/>
+          </a:ln>
+        </p:spPr>
+        <p:style>
+          <a:lnRef idx="2">
+            <a:schemeClr val="accent1">
+              <a:shade val="50000"/>
+            </a:schemeClr>
+          </a:lnRef>
+          <a:fillRef idx="1">
+            <a:schemeClr val="accent1"/>
+          </a:fillRef>
+          <a:effectRef idx="0">
+            <a:schemeClr val="accent1"/>
+          </a:effectRef>
+          <a:fontRef idx="minor">
+            <a:schemeClr val="lt1"/>
+          </a:fontRef>
+        </p:style>
+        <p:txBody>
+          <a:bodyPr rtlCol="0" anchor="ctr"/>
+          <a:lstStyle/>
+          <a:p>
+            <a:pPr algn="ctr"/>
+            <a:endParaRPr lang="en-US"/>
+          </a:p>
+        </p:txBody>
+      </p:sp>
       <p:sp>
         <p:nvSpPr>
           <p:cNvPr id="2" name="Title 1">
@@ -8632,21 +10208,661 @@
         </p:nvSpPr>
         <p:spPr>
           <a:xfrm>
-            <a:off x="4365978" y="205199"/>
-            <a:ext cx="2923823" cy="1344377"/>
+            <a:off x="838200" y="365125"/>
+            <a:ext cx="10515600" cy="1325563"/>
           </a:xfrm>
         </p:spPr>
         <p:txBody>
-          <a:bodyPr/>
+          <a:bodyPr>
+            <a:normAutofit/>
+          </a:bodyPr>
           <a:lstStyle/>
           <a:p>
             <a:r>
-              <a:rPr lang="en-US">
+              <a:rPr lang="en-US" sz="5400">
                 <a:ea typeface="Calibri Light"/>
                 <a:cs typeface="Calibri Light"/>
               </a:rPr>
               <a:t>Motivation</a:t>
             </a:r>
+            <a:endParaRPr lang="en-US" sz="5400"/>
+          </a:p>
+        </p:txBody>
+      </p:sp>
+      <p:sp>
+        <p:nvSpPr>
+          <p:cNvPr id="10" name="sketch line">
+            <a:extLst>
+              <a:ext uri="{FF2B5EF4-FFF2-40B4-BE49-F238E27FC236}">
+                <a16:creationId xmlns:a16="http://schemas.microsoft.com/office/drawing/2014/main" id="{DB17E863-922E-4C26-BD64-E8FD41D28661}"/>
+              </a:ext>
+              <a:ext uri="{C183D7F6-B498-43B3-948B-1728B52AA6E4}">
+                <adec:decorative xmlns:adec="http://schemas.microsoft.com/office/drawing/2017/decorative" val="1"/>
+              </a:ext>
+            </a:extLst>
+          </p:cNvPr>
+          <p:cNvSpPr>
+            <a:spLocks noGrp="1" noRot="1" noChangeAspect="1" noMove="1" noResize="1" noEditPoints="1" noAdjustHandles="1" noChangeArrowheads="1" noChangeShapeType="1" noTextEdit="1"/>
+          </p:cNvSpPr>
+          <p:nvPr>
+            <p:extLst>
+              <p:ext uri="{386F3935-93C4-4BCD-93E2-E3B085C9AB24}">
+                <p16:designElem xmlns:p16="http://schemas.microsoft.com/office/powerpoint/2015/main" val="1"/>
+              </p:ext>
+            </p:extLst>
+          </p:nvPr>
+        </p:nvSpPr>
+        <p:spPr>
+          <a:xfrm>
+            <a:off x="669036" y="1677373"/>
+            <a:ext cx="10853928" cy="18288"/>
+          </a:xfrm>
+          <a:custGeom>
+            <a:avLst/>
+            <a:gdLst>
+              <a:gd name="connsiteX0" fmla="*/ 0 w 10853928"/>
+              <a:gd name="connsiteY0" fmla="*/ 0 h 18288"/>
+              <a:gd name="connsiteX1" fmla="*/ 461292 w 10853928"/>
+              <a:gd name="connsiteY1" fmla="*/ 0 h 18288"/>
+              <a:gd name="connsiteX2" fmla="*/ 1139662 w 10853928"/>
+              <a:gd name="connsiteY2" fmla="*/ 0 h 18288"/>
+              <a:gd name="connsiteX3" fmla="*/ 1926572 w 10853928"/>
+              <a:gd name="connsiteY3" fmla="*/ 0 h 18288"/>
+              <a:gd name="connsiteX4" fmla="*/ 2279325 w 10853928"/>
+              <a:gd name="connsiteY4" fmla="*/ 0 h 18288"/>
+              <a:gd name="connsiteX5" fmla="*/ 2632078 w 10853928"/>
+              <a:gd name="connsiteY5" fmla="*/ 0 h 18288"/>
+              <a:gd name="connsiteX6" fmla="*/ 3527527 w 10853928"/>
+              <a:gd name="connsiteY6" fmla="*/ 0 h 18288"/>
+              <a:gd name="connsiteX7" fmla="*/ 4205897 w 10853928"/>
+              <a:gd name="connsiteY7" fmla="*/ 0 h 18288"/>
+              <a:gd name="connsiteX8" fmla="*/ 4558650 w 10853928"/>
+              <a:gd name="connsiteY8" fmla="*/ 0 h 18288"/>
+              <a:gd name="connsiteX9" fmla="*/ 5237020 w 10853928"/>
+              <a:gd name="connsiteY9" fmla="*/ 0 h 18288"/>
+              <a:gd name="connsiteX10" fmla="*/ 6132469 w 10853928"/>
+              <a:gd name="connsiteY10" fmla="*/ 0 h 18288"/>
+              <a:gd name="connsiteX11" fmla="*/ 6702301 w 10853928"/>
+              <a:gd name="connsiteY11" fmla="*/ 0 h 18288"/>
+              <a:gd name="connsiteX12" fmla="*/ 7272132 w 10853928"/>
+              <a:gd name="connsiteY12" fmla="*/ 0 h 18288"/>
+              <a:gd name="connsiteX13" fmla="*/ 7950502 w 10853928"/>
+              <a:gd name="connsiteY13" fmla="*/ 0 h 18288"/>
+              <a:gd name="connsiteX14" fmla="*/ 8737412 w 10853928"/>
+              <a:gd name="connsiteY14" fmla="*/ 0 h 18288"/>
+              <a:gd name="connsiteX15" fmla="*/ 9524322 w 10853928"/>
+              <a:gd name="connsiteY15" fmla="*/ 0 h 18288"/>
+              <a:gd name="connsiteX16" fmla="*/ 10853928 w 10853928"/>
+              <a:gd name="connsiteY16" fmla="*/ 0 h 18288"/>
+              <a:gd name="connsiteX17" fmla="*/ 10853928 w 10853928"/>
+              <a:gd name="connsiteY17" fmla="*/ 18288 h 18288"/>
+              <a:gd name="connsiteX18" fmla="*/ 10392636 w 10853928"/>
+              <a:gd name="connsiteY18" fmla="*/ 18288 h 18288"/>
+              <a:gd name="connsiteX19" fmla="*/ 9497187 w 10853928"/>
+              <a:gd name="connsiteY19" fmla="*/ 18288 h 18288"/>
+              <a:gd name="connsiteX20" fmla="*/ 8818817 w 10853928"/>
+              <a:gd name="connsiteY20" fmla="*/ 18288 h 18288"/>
+              <a:gd name="connsiteX21" fmla="*/ 8466064 w 10853928"/>
+              <a:gd name="connsiteY21" fmla="*/ 18288 h 18288"/>
+              <a:gd name="connsiteX22" fmla="*/ 7787693 w 10853928"/>
+              <a:gd name="connsiteY22" fmla="*/ 18288 h 18288"/>
+              <a:gd name="connsiteX23" fmla="*/ 7217862 w 10853928"/>
+              <a:gd name="connsiteY23" fmla="*/ 18288 h 18288"/>
+              <a:gd name="connsiteX24" fmla="*/ 6648031 w 10853928"/>
+              <a:gd name="connsiteY24" fmla="*/ 18288 h 18288"/>
+              <a:gd name="connsiteX25" fmla="*/ 6078200 w 10853928"/>
+              <a:gd name="connsiteY25" fmla="*/ 18288 h 18288"/>
+              <a:gd name="connsiteX26" fmla="*/ 5508368 w 10853928"/>
+              <a:gd name="connsiteY26" fmla="*/ 18288 h 18288"/>
+              <a:gd name="connsiteX27" fmla="*/ 4721459 w 10853928"/>
+              <a:gd name="connsiteY27" fmla="*/ 18288 h 18288"/>
+              <a:gd name="connsiteX28" fmla="*/ 4043088 w 10853928"/>
+              <a:gd name="connsiteY28" fmla="*/ 18288 h 18288"/>
+              <a:gd name="connsiteX29" fmla="*/ 3690336 w 10853928"/>
+              <a:gd name="connsiteY29" fmla="*/ 18288 h 18288"/>
+              <a:gd name="connsiteX30" fmla="*/ 3120504 w 10853928"/>
+              <a:gd name="connsiteY30" fmla="*/ 18288 h 18288"/>
+              <a:gd name="connsiteX31" fmla="*/ 2333595 w 10853928"/>
+              <a:gd name="connsiteY31" fmla="*/ 18288 h 18288"/>
+              <a:gd name="connsiteX32" fmla="*/ 1872303 w 10853928"/>
+              <a:gd name="connsiteY32" fmla="*/ 18288 h 18288"/>
+              <a:gd name="connsiteX33" fmla="*/ 976854 w 10853928"/>
+              <a:gd name="connsiteY33" fmla="*/ 18288 h 18288"/>
+              <a:gd name="connsiteX34" fmla="*/ 0 w 10853928"/>
+              <a:gd name="connsiteY34" fmla="*/ 18288 h 18288"/>
+              <a:gd name="connsiteX35" fmla="*/ 0 w 10853928"/>
+              <a:gd name="connsiteY35" fmla="*/ 0 h 18288"/>
+            </a:gdLst>
+            <a:ahLst/>
+            <a:cxnLst>
+              <a:cxn ang="0">
+                <a:pos x="connsiteX0" y="connsiteY0"/>
+              </a:cxn>
+              <a:cxn ang="0">
+                <a:pos x="connsiteX1" y="connsiteY1"/>
+              </a:cxn>
+              <a:cxn ang="0">
+                <a:pos x="connsiteX2" y="connsiteY2"/>
+              </a:cxn>
+              <a:cxn ang="0">
+                <a:pos x="connsiteX3" y="connsiteY3"/>
+              </a:cxn>
+              <a:cxn ang="0">
+                <a:pos x="connsiteX4" y="connsiteY4"/>
+              </a:cxn>
+              <a:cxn ang="0">
+                <a:pos x="connsiteX5" y="connsiteY5"/>
+              </a:cxn>
+              <a:cxn ang="0">
+                <a:pos x="connsiteX6" y="connsiteY6"/>
+              </a:cxn>
+              <a:cxn ang="0">
+                <a:pos x="connsiteX7" y="connsiteY7"/>
+              </a:cxn>
+              <a:cxn ang="0">
+                <a:pos x="connsiteX8" y="connsiteY8"/>
+              </a:cxn>
+              <a:cxn ang="0">
+                <a:pos x="connsiteX9" y="connsiteY9"/>
+              </a:cxn>
+              <a:cxn ang="0">
+                <a:pos x="connsiteX10" y="connsiteY10"/>
+              </a:cxn>
+              <a:cxn ang="0">
+                <a:pos x="connsiteX11" y="connsiteY11"/>
+              </a:cxn>
+              <a:cxn ang="0">
+                <a:pos x="connsiteX12" y="connsiteY12"/>
+              </a:cxn>
+              <a:cxn ang="0">
+                <a:pos x="connsiteX13" y="connsiteY13"/>
+              </a:cxn>
+              <a:cxn ang="0">
+                <a:pos x="connsiteX14" y="connsiteY14"/>
+              </a:cxn>
+              <a:cxn ang="0">
+                <a:pos x="connsiteX15" y="connsiteY15"/>
+              </a:cxn>
+              <a:cxn ang="0">
+                <a:pos x="connsiteX16" y="connsiteY16"/>
+              </a:cxn>
+              <a:cxn ang="0">
+                <a:pos x="connsiteX17" y="connsiteY17"/>
+              </a:cxn>
+              <a:cxn ang="0">
+                <a:pos x="connsiteX18" y="connsiteY18"/>
+              </a:cxn>
+              <a:cxn ang="0">
+                <a:pos x="connsiteX19" y="connsiteY19"/>
+              </a:cxn>
+              <a:cxn ang="0">
+                <a:pos x="connsiteX20" y="connsiteY20"/>
+              </a:cxn>
+              <a:cxn ang="0">
+                <a:pos x="connsiteX21" y="connsiteY21"/>
+              </a:cxn>
+              <a:cxn ang="0">
+                <a:pos x="connsiteX22" y="connsiteY22"/>
+              </a:cxn>
+              <a:cxn ang="0">
+                <a:pos x="connsiteX23" y="connsiteY23"/>
+              </a:cxn>
+              <a:cxn ang="0">
+                <a:pos x="connsiteX24" y="connsiteY24"/>
+              </a:cxn>
+              <a:cxn ang="0">
+                <a:pos x="connsiteX25" y="connsiteY25"/>
+              </a:cxn>
+              <a:cxn ang="0">
+                <a:pos x="connsiteX26" y="connsiteY26"/>
+              </a:cxn>
+              <a:cxn ang="0">
+                <a:pos x="connsiteX27" y="connsiteY27"/>
+              </a:cxn>
+              <a:cxn ang="0">
+                <a:pos x="connsiteX28" y="connsiteY28"/>
+              </a:cxn>
+              <a:cxn ang="0">
+                <a:pos x="connsiteX29" y="connsiteY29"/>
+              </a:cxn>
+              <a:cxn ang="0">
+                <a:pos x="connsiteX30" y="connsiteY30"/>
+              </a:cxn>
+              <a:cxn ang="0">
+                <a:pos x="connsiteX31" y="connsiteY31"/>
+              </a:cxn>
+              <a:cxn ang="0">
+                <a:pos x="connsiteX32" y="connsiteY32"/>
+              </a:cxn>
+              <a:cxn ang="0">
+                <a:pos x="connsiteX33" y="connsiteY33"/>
+              </a:cxn>
+              <a:cxn ang="0">
+                <a:pos x="connsiteX34" y="connsiteY34"/>
+              </a:cxn>
+              <a:cxn ang="0">
+                <a:pos x="connsiteX35" y="connsiteY35"/>
+              </a:cxn>
+            </a:cxnLst>
+            <a:rect l="l" t="t" r="r" b="b"/>
+            <a:pathLst>
+              <a:path w="10853928" h="18288" fill="none" extrusionOk="0">
+                <a:moveTo>
+                  <a:pt x="0" y="0"/>
+                </a:moveTo>
+                <a:cubicBezTo>
+                  <a:pt x="146993" y="-19076"/>
+                  <a:pt x="347684" y="-4790"/>
+                  <a:pt x="461292" y="0"/>
+                </a:cubicBezTo>
+                <a:cubicBezTo>
+                  <a:pt x="574900" y="4790"/>
+                  <a:pt x="808367" y="19821"/>
+                  <a:pt x="1139662" y="0"/>
+                </a:cubicBezTo>
+                <a:cubicBezTo>
+                  <a:pt x="1470957" y="-19821"/>
+                  <a:pt x="1627405" y="5721"/>
+                  <a:pt x="1926572" y="0"/>
+                </a:cubicBezTo>
+                <a:cubicBezTo>
+                  <a:pt x="2225739" y="-5721"/>
+                  <a:pt x="2137730" y="-3235"/>
+                  <a:pt x="2279325" y="0"/>
+                </a:cubicBezTo>
+                <a:cubicBezTo>
+                  <a:pt x="2420920" y="3235"/>
+                  <a:pt x="2456518" y="9685"/>
+                  <a:pt x="2632078" y="0"/>
+                </a:cubicBezTo>
+                <a:cubicBezTo>
+                  <a:pt x="2807638" y="-9685"/>
+                  <a:pt x="3211516" y="-43007"/>
+                  <a:pt x="3527527" y="0"/>
+                </a:cubicBezTo>
+                <a:cubicBezTo>
+                  <a:pt x="3843538" y="43007"/>
+                  <a:pt x="4058833" y="22042"/>
+                  <a:pt x="4205897" y="0"/>
+                </a:cubicBezTo>
+                <a:cubicBezTo>
+                  <a:pt x="4352961" y="-22042"/>
+                  <a:pt x="4474805" y="-11846"/>
+                  <a:pt x="4558650" y="0"/>
+                </a:cubicBezTo>
+                <a:cubicBezTo>
+                  <a:pt x="4642495" y="11846"/>
+                  <a:pt x="5041928" y="-6069"/>
+                  <a:pt x="5237020" y="0"/>
+                </a:cubicBezTo>
+                <a:cubicBezTo>
+                  <a:pt x="5432112" y="6069"/>
+                  <a:pt x="5943266" y="-17479"/>
+                  <a:pt x="6132469" y="0"/>
+                </a:cubicBezTo>
+                <a:cubicBezTo>
+                  <a:pt x="6321672" y="17479"/>
+                  <a:pt x="6483872" y="26234"/>
+                  <a:pt x="6702301" y="0"/>
+                </a:cubicBezTo>
+                <a:cubicBezTo>
+                  <a:pt x="6920730" y="-26234"/>
+                  <a:pt x="6991194" y="-15156"/>
+                  <a:pt x="7272132" y="0"/>
+                </a:cubicBezTo>
+                <a:cubicBezTo>
+                  <a:pt x="7553070" y="15156"/>
+                  <a:pt x="7684444" y="-32961"/>
+                  <a:pt x="7950502" y="0"/>
+                </a:cubicBezTo>
+                <a:cubicBezTo>
+                  <a:pt x="8216560" y="32961"/>
+                  <a:pt x="8493290" y="-10491"/>
+                  <a:pt x="8737412" y="0"/>
+                </a:cubicBezTo>
+                <a:cubicBezTo>
+                  <a:pt x="8981534" y="10491"/>
+                  <a:pt x="9191586" y="-13899"/>
+                  <a:pt x="9524322" y="0"/>
+                </a:cubicBezTo>
+                <a:cubicBezTo>
+                  <a:pt x="9857058" y="13899"/>
+                  <a:pt x="10297509" y="7485"/>
+                  <a:pt x="10853928" y="0"/>
+                </a:cubicBezTo>
+                <a:cubicBezTo>
+                  <a:pt x="10854574" y="4451"/>
+                  <a:pt x="10854418" y="9226"/>
+                  <a:pt x="10853928" y="18288"/>
+                </a:cubicBezTo>
+                <a:cubicBezTo>
+                  <a:pt x="10691638" y="28522"/>
+                  <a:pt x="10574319" y="29578"/>
+                  <a:pt x="10392636" y="18288"/>
+                </a:cubicBezTo>
+                <a:cubicBezTo>
+                  <a:pt x="10210953" y="6998"/>
+                  <a:pt x="9836277" y="-16742"/>
+                  <a:pt x="9497187" y="18288"/>
+                </a:cubicBezTo>
+                <a:cubicBezTo>
+                  <a:pt x="9158097" y="53318"/>
+                  <a:pt x="9119479" y="30714"/>
+                  <a:pt x="8818817" y="18288"/>
+                </a:cubicBezTo>
+                <a:cubicBezTo>
+                  <a:pt x="8518155" y="5863"/>
+                  <a:pt x="8640037" y="6483"/>
+                  <a:pt x="8466064" y="18288"/>
+                </a:cubicBezTo>
+                <a:cubicBezTo>
+                  <a:pt x="8292091" y="30093"/>
+                  <a:pt x="7997656" y="18914"/>
+                  <a:pt x="7787693" y="18288"/>
+                </a:cubicBezTo>
+                <a:cubicBezTo>
+                  <a:pt x="7577730" y="17662"/>
+                  <a:pt x="7412468" y="21416"/>
+                  <a:pt x="7217862" y="18288"/>
+                </a:cubicBezTo>
+                <a:cubicBezTo>
+                  <a:pt x="7023256" y="15160"/>
+                  <a:pt x="6898018" y="14824"/>
+                  <a:pt x="6648031" y="18288"/>
+                </a:cubicBezTo>
+                <a:cubicBezTo>
+                  <a:pt x="6398044" y="21752"/>
+                  <a:pt x="6254402" y="38625"/>
+                  <a:pt x="6078200" y="18288"/>
+                </a:cubicBezTo>
+                <a:cubicBezTo>
+                  <a:pt x="5901998" y="-2049"/>
+                  <a:pt x="5622886" y="3213"/>
+                  <a:pt x="5508368" y="18288"/>
+                </a:cubicBezTo>
+                <a:cubicBezTo>
+                  <a:pt x="5393850" y="33363"/>
+                  <a:pt x="5036260" y="26830"/>
+                  <a:pt x="4721459" y="18288"/>
+                </a:cubicBezTo>
+                <a:cubicBezTo>
+                  <a:pt x="4406658" y="9746"/>
+                  <a:pt x="4239221" y="41551"/>
+                  <a:pt x="4043088" y="18288"/>
+                </a:cubicBezTo>
+                <a:cubicBezTo>
+                  <a:pt x="3846955" y="-4975"/>
+                  <a:pt x="3818802" y="34658"/>
+                  <a:pt x="3690336" y="18288"/>
+                </a:cubicBezTo>
+                <a:cubicBezTo>
+                  <a:pt x="3561870" y="1918"/>
+                  <a:pt x="3265491" y="42194"/>
+                  <a:pt x="3120504" y="18288"/>
+                </a:cubicBezTo>
+                <a:cubicBezTo>
+                  <a:pt x="2975517" y="-5618"/>
+                  <a:pt x="2720254" y="36673"/>
+                  <a:pt x="2333595" y="18288"/>
+                </a:cubicBezTo>
+                <a:cubicBezTo>
+                  <a:pt x="1946936" y="-97"/>
+                  <a:pt x="2097241" y="5776"/>
+                  <a:pt x="1872303" y="18288"/>
+                </a:cubicBezTo>
+                <a:cubicBezTo>
+                  <a:pt x="1647365" y="30800"/>
+                  <a:pt x="1282708" y="45380"/>
+                  <a:pt x="976854" y="18288"/>
+                </a:cubicBezTo>
+                <a:cubicBezTo>
+                  <a:pt x="671000" y="-8804"/>
+                  <a:pt x="408401" y="-12775"/>
+                  <a:pt x="0" y="18288"/>
+                </a:cubicBezTo>
+                <a:cubicBezTo>
+                  <a:pt x="-213" y="9468"/>
+                  <a:pt x="187" y="4459"/>
+                  <a:pt x="0" y="0"/>
+                </a:cubicBezTo>
+                <a:close/>
+              </a:path>
+              <a:path w="10853928" h="18288" stroke="0" extrusionOk="0">
+                <a:moveTo>
+                  <a:pt x="0" y="0"/>
+                </a:moveTo>
+                <a:cubicBezTo>
+                  <a:pt x="267322" y="15284"/>
+                  <a:pt x="415388" y="-21048"/>
+                  <a:pt x="569831" y="0"/>
+                </a:cubicBezTo>
+                <a:cubicBezTo>
+                  <a:pt x="724274" y="21048"/>
+                  <a:pt x="769333" y="-2353"/>
+                  <a:pt x="922584" y="0"/>
+                </a:cubicBezTo>
+                <a:cubicBezTo>
+                  <a:pt x="1075835" y="2353"/>
+                  <a:pt x="1399490" y="-145"/>
+                  <a:pt x="1818033" y="0"/>
+                </a:cubicBezTo>
+                <a:cubicBezTo>
+                  <a:pt x="2236576" y="145"/>
+                  <a:pt x="2145330" y="5482"/>
+                  <a:pt x="2387864" y="0"/>
+                </a:cubicBezTo>
+                <a:cubicBezTo>
+                  <a:pt x="2630398" y="-5482"/>
+                  <a:pt x="2793207" y="18487"/>
+                  <a:pt x="2957695" y="0"/>
+                </a:cubicBezTo>
+                <a:cubicBezTo>
+                  <a:pt x="3122183" y="-18487"/>
+                  <a:pt x="3579141" y="19003"/>
+                  <a:pt x="3853144" y="0"/>
+                </a:cubicBezTo>
+                <a:cubicBezTo>
+                  <a:pt x="4127147" y="-19003"/>
+                  <a:pt x="4209857" y="12211"/>
+                  <a:pt x="4314436" y="0"/>
+                </a:cubicBezTo>
+                <a:cubicBezTo>
+                  <a:pt x="4419015" y="-12211"/>
+                  <a:pt x="4762459" y="-17220"/>
+                  <a:pt x="5209885" y="0"/>
+                </a:cubicBezTo>
+                <a:cubicBezTo>
+                  <a:pt x="5657311" y="17220"/>
+                  <a:pt x="5692663" y="-3290"/>
+                  <a:pt x="6105335" y="0"/>
+                </a:cubicBezTo>
+                <a:cubicBezTo>
+                  <a:pt x="6518007" y="3290"/>
+                  <a:pt x="6455516" y="-5124"/>
+                  <a:pt x="6783705" y="0"/>
+                </a:cubicBezTo>
+                <a:cubicBezTo>
+                  <a:pt x="7111894" y="5124"/>
+                  <a:pt x="7441941" y="-17829"/>
+                  <a:pt x="7679154" y="0"/>
+                </a:cubicBezTo>
+                <a:cubicBezTo>
+                  <a:pt x="7916367" y="17829"/>
+                  <a:pt x="8102967" y="-24363"/>
+                  <a:pt x="8248985" y="0"/>
+                </a:cubicBezTo>
+                <a:cubicBezTo>
+                  <a:pt x="8395003" y="24363"/>
+                  <a:pt x="8552393" y="25505"/>
+                  <a:pt x="8818817" y="0"/>
+                </a:cubicBezTo>
+                <a:cubicBezTo>
+                  <a:pt x="9085241" y="-25505"/>
+                  <a:pt x="9411308" y="38000"/>
+                  <a:pt x="9605726" y="0"/>
+                </a:cubicBezTo>
+                <a:cubicBezTo>
+                  <a:pt x="9800144" y="-38000"/>
+                  <a:pt x="10006468" y="-25741"/>
+                  <a:pt x="10175558" y="0"/>
+                </a:cubicBezTo>
+                <a:cubicBezTo>
+                  <a:pt x="10344648" y="25741"/>
+                  <a:pt x="10696282" y="695"/>
+                  <a:pt x="10853928" y="0"/>
+                </a:cubicBezTo>
+                <a:cubicBezTo>
+                  <a:pt x="10853521" y="8690"/>
+                  <a:pt x="10853774" y="14141"/>
+                  <a:pt x="10853928" y="18288"/>
+                </a:cubicBezTo>
+                <a:cubicBezTo>
+                  <a:pt x="10608124" y="24255"/>
+                  <a:pt x="10343415" y="22307"/>
+                  <a:pt x="10067018" y="18288"/>
+                </a:cubicBezTo>
+                <a:cubicBezTo>
+                  <a:pt x="9790621" y="14270"/>
+                  <a:pt x="9843266" y="3564"/>
+                  <a:pt x="9714266" y="18288"/>
+                </a:cubicBezTo>
+                <a:cubicBezTo>
+                  <a:pt x="9585266" y="33012"/>
+                  <a:pt x="9379484" y="1875"/>
+                  <a:pt x="9252974" y="18288"/>
+                </a:cubicBezTo>
+                <a:cubicBezTo>
+                  <a:pt x="9126464" y="34701"/>
+                  <a:pt x="8580678" y="-4904"/>
+                  <a:pt x="8357525" y="18288"/>
+                </a:cubicBezTo>
+                <a:cubicBezTo>
+                  <a:pt x="8134372" y="41480"/>
+                  <a:pt x="7903199" y="26458"/>
+                  <a:pt x="7679154" y="18288"/>
+                </a:cubicBezTo>
+                <a:cubicBezTo>
+                  <a:pt x="7455109" y="10118"/>
+                  <a:pt x="7435944" y="27109"/>
+                  <a:pt x="7217862" y="18288"/>
+                </a:cubicBezTo>
+                <a:cubicBezTo>
+                  <a:pt x="6999780" y="9467"/>
+                  <a:pt x="6680409" y="18985"/>
+                  <a:pt x="6539492" y="18288"/>
+                </a:cubicBezTo>
+                <a:cubicBezTo>
+                  <a:pt x="6398575" y="17592"/>
+                  <a:pt x="6312077" y="33018"/>
+                  <a:pt x="6186739" y="18288"/>
+                </a:cubicBezTo>
+                <a:cubicBezTo>
+                  <a:pt x="6061401" y="3558"/>
+                  <a:pt x="5947033" y="12075"/>
+                  <a:pt x="5833986" y="18288"/>
+                </a:cubicBezTo>
+                <a:cubicBezTo>
+                  <a:pt x="5720939" y="24501"/>
+                  <a:pt x="5482226" y="8586"/>
+                  <a:pt x="5155616" y="18288"/>
+                </a:cubicBezTo>
+                <a:cubicBezTo>
+                  <a:pt x="4829006" y="27991"/>
+                  <a:pt x="4841274" y="29316"/>
+                  <a:pt x="4694324" y="18288"/>
+                </a:cubicBezTo>
+                <a:cubicBezTo>
+                  <a:pt x="4547374" y="7260"/>
+                  <a:pt x="4077675" y="7013"/>
+                  <a:pt x="3907414" y="18288"/>
+                </a:cubicBezTo>
+                <a:cubicBezTo>
+                  <a:pt x="3737153" y="29564"/>
+                  <a:pt x="3538393" y="21630"/>
+                  <a:pt x="3446122" y="18288"/>
+                </a:cubicBezTo>
+                <a:cubicBezTo>
+                  <a:pt x="3353851" y="14946"/>
+                  <a:pt x="2990320" y="-8091"/>
+                  <a:pt x="2659212" y="18288"/>
+                </a:cubicBezTo>
+                <a:cubicBezTo>
+                  <a:pt x="2328104" y="44667"/>
+                  <a:pt x="2427653" y="9607"/>
+                  <a:pt x="2306460" y="18288"/>
+                </a:cubicBezTo>
+                <a:cubicBezTo>
+                  <a:pt x="2185267" y="26969"/>
+                  <a:pt x="1719763" y="3717"/>
+                  <a:pt x="1519550" y="18288"/>
+                </a:cubicBezTo>
+                <a:cubicBezTo>
+                  <a:pt x="1319337" y="32860"/>
+                  <a:pt x="1167371" y="17040"/>
+                  <a:pt x="1058258" y="18288"/>
+                </a:cubicBezTo>
+                <a:cubicBezTo>
+                  <a:pt x="949145" y="19536"/>
+                  <a:pt x="780234" y="31447"/>
+                  <a:pt x="705505" y="18288"/>
+                </a:cubicBezTo>
+                <a:cubicBezTo>
+                  <a:pt x="630776" y="5129"/>
+                  <a:pt x="215796" y="30056"/>
+                  <a:pt x="0" y="18288"/>
+                </a:cubicBezTo>
+                <a:cubicBezTo>
+                  <a:pt x="-53" y="11301"/>
+                  <a:pt x="-649" y="7756"/>
+                  <a:pt x="0" y="0"/>
+                </a:cubicBezTo>
+                <a:close/>
+              </a:path>
+            </a:pathLst>
+          </a:custGeom>
+          <a:solidFill>
+            <a:schemeClr val="accent2"/>
+          </a:solidFill>
+          <a:ln w="41275" cap="rnd">
+            <a:solidFill>
+              <a:schemeClr val="accent2"/>
+            </a:solidFill>
+            <a:round/>
+            <a:extLst>
+              <a:ext uri="{C807C97D-BFC1-408E-A445-0C87EB9F89A2}">
+                <ask:lineSketchStyleProps xmlns:ask="http://schemas.microsoft.com/office/drawing/2018/sketchyshapes" sd="1219033472">
+                  <a:prstGeom prst="rect">
+                    <a:avLst/>
+                  </a:prstGeom>
+                  <ask:type>
+                    <ask:lineSketchFreehand/>
+                  </ask:type>
+                </ask:lineSketchStyleProps>
+              </a:ext>
+            </a:extLst>
+          </a:ln>
+        </p:spPr>
+        <p:style>
+          <a:lnRef idx="2">
+            <a:schemeClr val="accent1">
+              <a:shade val="50000"/>
+            </a:schemeClr>
+          </a:lnRef>
+          <a:fillRef idx="1">
+            <a:schemeClr val="accent1"/>
+          </a:fillRef>
+          <a:effectRef idx="0">
+            <a:schemeClr val="accent1"/>
+          </a:effectRef>
+          <a:fontRef idx="minor">
+            <a:schemeClr val="lt1"/>
+          </a:fontRef>
+        </p:style>
+        <p:txBody>
+          <a:bodyPr rtlCol="0" anchor="ctr"/>
+          <a:lstStyle/>
+          <a:p>
+            <a:pPr algn="ctr"/>
             <a:endParaRPr lang="en-US"/>
           </a:p>
         </p:txBody>
@@ -8667,22 +10883,27 @@
             <p:ph idx="1"/>
           </p:nvPr>
         </p:nvSpPr>
-        <p:spPr/>
+        <p:spPr>
+          <a:xfrm>
+            <a:off x="838200" y="1929384"/>
+            <a:ext cx="10515600" cy="4251960"/>
+          </a:xfrm>
+        </p:spPr>
         <p:txBody>
-          <a:bodyPr vert="horz" lIns="91440" tIns="45720" rIns="91440" bIns="45720" rtlCol="0" anchor="t">
+          <a:bodyPr vert="horz" lIns="91440" tIns="45720" rIns="91440" bIns="45720" rtlCol="0">
             <a:normAutofit/>
           </a:bodyPr>
           <a:lstStyle/>
           <a:p>
             <a:r>
-              <a:rPr lang="en-US" b="1">
+              <a:rPr lang="en-US" sz="2200" b="1">
                 <a:ea typeface="Calibri"/>
                 <a:cs typeface="Calibri"/>
               </a:rPr>
               <a:t>Previous Work and Interest:</a:t>
             </a:r>
             <a:r>
-              <a:rPr lang="en-US">
+              <a:rPr lang="en-US" sz="2200">
                 <a:ea typeface="Calibri"/>
                 <a:cs typeface="Calibri"/>
               </a:rPr>
@@ -8691,14 +10912,14 @@
           </a:p>
           <a:p>
             <a:r>
-              <a:rPr lang="en-US" b="1">
+              <a:rPr lang="en-US" sz="2200" b="1">
                 <a:ea typeface="Calibri"/>
                 <a:cs typeface="Calibri"/>
               </a:rPr>
               <a:t>Goal:</a:t>
             </a:r>
             <a:r>
-              <a:rPr lang="en-US">
+              <a:rPr lang="en-US" sz="2200">
                 <a:ea typeface="Calibri"/>
                 <a:cs typeface="Calibri"/>
               </a:rPr>
@@ -8708,7 +10929,7 @@
           <a:p>
             <a:pPr lvl="1"/>
             <a:r>
-              <a:rPr lang="en-US">
+              <a:rPr lang="en-US" sz="2200">
                 <a:ea typeface="Calibri"/>
                 <a:cs typeface="Calibri"/>
               </a:rPr>
@@ -8718,7 +10939,7 @@
           <a:p>
             <a:pPr lvl="1"/>
             <a:r>
-              <a:rPr lang="en-US">
+              <a:rPr lang="en-US" sz="2200">
                 <a:ea typeface="Calibri"/>
                 <a:cs typeface="Calibri"/>
               </a:rPr>
@@ -10956,7 +13177,7 @@
           <a:lstStyle/>
           <a:p>
             <a:r>
-              <a:rPr lang="en-US" sz="1500">
+              <a:rPr lang="en-US" sz="1500" dirty="0">
                 <a:cs typeface="Calibri"/>
               </a:rPr>
               <a:t>BFS finds the shortest sequence of moves from the initial state to the goal state.</a:t>
@@ -10967,32 +13188,32 @@
               <a:buNone/>
             </a:pPr>
             <a:r>
-              <a:rPr lang="en-US" sz="1500" b="1">
+              <a:rPr lang="en-US" sz="1500" b="1" dirty="0">
                 <a:ea typeface="+mn-lt"/>
                 <a:cs typeface="+mn-lt"/>
               </a:rPr>
               <a:t>Initialization</a:t>
             </a:r>
             <a:r>
-              <a:rPr lang="en-US" sz="1500">
+              <a:rPr lang="en-US" sz="1500" dirty="0">
                 <a:ea typeface="+mn-lt"/>
                 <a:cs typeface="+mn-lt"/>
               </a:rPr>
               <a:t>:</a:t>
             </a:r>
-            <a:endParaRPr lang="en-US" sz="1500">
+            <a:endParaRPr lang="en-US" sz="1500" dirty="0">
               <a:cs typeface="Calibri"/>
             </a:endParaRPr>
           </a:p>
           <a:p>
             <a:r>
-              <a:rPr lang="en-US" sz="1500">
+              <a:rPr lang="en-US" sz="1500" dirty="0">
                 <a:ea typeface="+mn-lt"/>
                 <a:cs typeface="+mn-lt"/>
               </a:rPr>
               <a:t>Start with the initial puzzle state and a queue to store nodes to be explored.</a:t>
             </a:r>
-            <a:endParaRPr lang="en-US" sz="1500">
+            <a:endParaRPr lang="en-US" sz="1500" dirty="0">
               <a:cs typeface="Calibri"/>
             </a:endParaRPr>
           </a:p>
@@ -11001,26 +13222,26 @@
               <a:buNone/>
             </a:pPr>
             <a:r>
-              <a:rPr lang="en-US" sz="1500" b="1">
+              <a:rPr lang="en-US" sz="1500" b="1" dirty="0">
                 <a:ea typeface="+mn-lt"/>
                 <a:cs typeface="+mn-lt"/>
               </a:rPr>
               <a:t>Exploration</a:t>
             </a:r>
             <a:r>
-              <a:rPr lang="en-US" sz="1500">
+              <a:rPr lang="en-US" sz="1500" dirty="0">
                 <a:ea typeface="+mn-lt"/>
                 <a:cs typeface="+mn-lt"/>
               </a:rPr>
               <a:t>:</a:t>
             </a:r>
-            <a:endParaRPr lang="en-US" sz="1500">
+            <a:endParaRPr lang="en-US" sz="1500" dirty="0">
               <a:cs typeface="Calibri" panose="020F0502020204030204"/>
             </a:endParaRPr>
           </a:p>
           <a:p>
             <a:r>
-              <a:rPr lang="en-US" sz="1500">
+              <a:rPr lang="en-US" sz="1500" dirty="0">
                 <a:cs typeface="Calibri" panose="020F0502020204030204"/>
               </a:rPr>
               <a:t>While the queue is not empty:</a:t>
@@ -11029,16 +13250,16 @@
           <a:p>
             <a:pPr lvl="1"/>
             <a:r>
-              <a:rPr lang="en-US" sz="1500">
+              <a:rPr lang="en-US" sz="1500" dirty="0">
                 <a:cs typeface="Calibri" panose="020F0502020204030204"/>
               </a:rPr>
-              <a:t>Dequeue a node and store it in a list of visited nodes.</a:t>
+              <a:t>Dequeue a node and store it in a hashed set of visited nodes.</a:t>
             </a:r>
           </a:p>
           <a:p>
             <a:pPr lvl="1"/>
             <a:r>
-              <a:rPr lang="en-US" sz="1500">
+              <a:rPr lang="en-US" sz="1500" dirty="0">
                 <a:cs typeface="Calibri" panose="020F0502020204030204"/>
               </a:rPr>
               <a:t>Check if it's the goal state; if yes, you've found the solution.</a:t>
@@ -11047,7 +13268,7 @@
           <a:p>
             <a:pPr lvl="1"/>
             <a:r>
-              <a:rPr lang="en-US" sz="1500">
+              <a:rPr lang="en-US" sz="1500" dirty="0">
                 <a:cs typeface="Calibri" panose="020F0502020204030204"/>
               </a:rPr>
               <a:t>Generate child nodes by making valid moves from the current state.</a:t>
@@ -11056,7 +13277,7 @@
           <a:p>
             <a:pPr lvl="1"/>
             <a:r>
-              <a:rPr lang="en-US" sz="1500">
+              <a:rPr lang="en-US" sz="1500" dirty="0">
                 <a:cs typeface="Calibri" panose="020F0502020204030204"/>
               </a:rPr>
               <a:t>Reject any child nodes that have identical states to a previously visited node</a:t>
@@ -11065,7 +13286,7 @@
           <a:p>
             <a:pPr lvl="1"/>
             <a:r>
-              <a:rPr lang="en-US" sz="1500">
+              <a:rPr lang="en-US" sz="1500" dirty="0">
                 <a:cs typeface="Calibri" panose="020F0502020204030204"/>
               </a:rPr>
               <a:t>Enqueue child nodes for future exploration.</a:t>
@@ -11073,23 +13294,23 @@
           </a:p>
           <a:p>
             <a:r>
-              <a:rPr lang="en-US" sz="1500">
+              <a:rPr lang="en-US" sz="1500" dirty="0">
                 <a:ea typeface="+mn-lt"/>
                 <a:cs typeface="+mn-lt"/>
               </a:rPr>
               <a:t>BFS guarantees an optimal solution, as it explores all possible moves level by level.</a:t>
             </a:r>
-            <a:endParaRPr lang="en-US" sz="1500">
+            <a:endParaRPr lang="en-US" sz="1500" dirty="0">
               <a:cs typeface="Calibri"/>
             </a:endParaRPr>
           </a:p>
           <a:p>
-            <a:endParaRPr lang="en-US" sz="1500">
+            <a:endParaRPr lang="en-US" sz="1500" dirty="0">
               <a:cs typeface="Calibri"/>
             </a:endParaRPr>
           </a:p>
           <a:p>
-            <a:endParaRPr lang="en-US" sz="1500">
+            <a:endParaRPr lang="en-US" sz="1500" dirty="0">
               <a:cs typeface="Calibri"/>
             </a:endParaRPr>
           </a:p>
@@ -11984,12 +14205,12 @@
           <a:lstStyle/>
           <a:p>
             <a:r>
-              <a:rPr lang="en-US" sz="5400">
+              <a:rPr lang="en-US" sz="5400" dirty="0">
                 <a:cs typeface="Calibri Light"/>
               </a:rPr>
               <a:t>Multi-Threaded BFS </a:t>
             </a:r>
-            <a:endParaRPr lang="en-US" sz="5400"/>
+            <a:endParaRPr lang="en-US" sz="5400" dirty="0"/>
           </a:p>
         </p:txBody>
       </p:sp>
@@ -12367,59 +14588,59 @@
             <a:pPr marL="0" indent="0">
               <a:buNone/>
             </a:pPr>
-            <a:endParaRPr lang="en-US" sz="1200">
+            <a:endParaRPr lang="en-US" sz="1200" dirty="0">
               <a:cs typeface="Calibri"/>
             </a:endParaRPr>
           </a:p>
           <a:p>
             <a:r>
-              <a:rPr lang="en-US" sz="1200" b="1">
+              <a:rPr lang="en-US" sz="1600" b="1" dirty="0">
                 <a:ea typeface="+mn-lt"/>
                 <a:cs typeface="+mn-lt"/>
               </a:rPr>
               <a:t>Step 1: Initial Search</a:t>
             </a:r>
             <a:r>
-              <a:rPr lang="en-US" sz="1200">
+              <a:rPr lang="en-US" sz="1600" dirty="0">
                 <a:ea typeface="+mn-lt"/>
                 <a:cs typeface="+mn-lt"/>
               </a:rPr>
               <a:t>:</a:t>
             </a:r>
-            <a:endParaRPr lang="en-US" sz="1200">
+            <a:endParaRPr lang="en-US" sz="1600" dirty="0">
               <a:cs typeface="Calibri"/>
             </a:endParaRPr>
           </a:p>
           <a:p>
             <a:pPr lvl="1"/>
             <a:r>
-              <a:rPr lang="en-US" sz="1200">
+              <a:rPr lang="en-US" sz="1600" dirty="0">
                 <a:ea typeface="+mn-lt"/>
                 <a:cs typeface="+mn-lt"/>
               </a:rPr>
               <a:t>Start a single-threaded BFS search.</a:t>
             </a:r>
-            <a:endParaRPr lang="en-US" sz="1200">
+            <a:endParaRPr lang="en-US" sz="1600" dirty="0">
               <a:cs typeface="Calibri"/>
             </a:endParaRPr>
           </a:p>
           <a:p>
             <a:pPr lvl="1"/>
             <a:r>
-              <a:rPr lang="en-US" sz="1200">
+              <a:rPr lang="en-US" sz="1600" dirty="0">
                 <a:ea typeface="+mn-lt"/>
                 <a:cs typeface="+mn-lt"/>
               </a:rPr>
               <a:t>Explore nodes in a breadth-first manner.</a:t>
             </a:r>
-            <a:endParaRPr lang="en-US" sz="1200">
+            <a:endParaRPr lang="en-US" sz="1600" dirty="0">
               <a:cs typeface="Calibri"/>
             </a:endParaRPr>
           </a:p>
           <a:p>
             <a:pPr lvl="1"/>
             <a:r>
-              <a:rPr lang="en-US" sz="1200">
+              <a:rPr lang="en-US" sz="1600" dirty="0">
                 <a:ea typeface="+mn-lt"/>
                 <a:cs typeface="+mn-lt"/>
               </a:rPr>
@@ -12429,7 +14650,7 @@
           <a:p>
             <a:pPr lvl="1"/>
             <a:r>
-              <a:rPr lang="en-US" sz="1200">
+              <a:rPr lang="en-US" sz="1600" dirty="0">
                 <a:cs typeface="Calibri"/>
               </a:rPr>
               <a:t>If the number of nodes in the queue &gt;= the number of CPU threads, break and proceed.</a:t>
@@ -12437,85 +14658,85 @@
           </a:p>
           <a:p>
             <a:r>
-              <a:rPr lang="en-US" sz="1200" b="1">
+              <a:rPr lang="en-US" sz="1600" b="1" dirty="0">
                 <a:ea typeface="+mn-lt"/>
                 <a:cs typeface="+mn-lt"/>
               </a:rPr>
               <a:t>Step 2: Parallel Distribution</a:t>
             </a:r>
             <a:r>
-              <a:rPr lang="en-US" sz="1200">
+              <a:rPr lang="en-US" sz="1600" dirty="0">
                 <a:ea typeface="+mn-lt"/>
                 <a:cs typeface="+mn-lt"/>
               </a:rPr>
               <a:t>:</a:t>
             </a:r>
-            <a:endParaRPr lang="en-US" sz="1200">
+            <a:endParaRPr lang="en-US" sz="1600" dirty="0">
               <a:cs typeface="Calibri"/>
             </a:endParaRPr>
           </a:p>
           <a:p>
             <a:pPr lvl="1"/>
             <a:r>
-              <a:rPr lang="en-US" sz="1200">
+              <a:rPr lang="en-US" sz="1600" dirty="0">
                 <a:ea typeface="+mn-lt"/>
                 <a:cs typeface="+mn-lt"/>
               </a:rPr>
               <a:t>Distribute nodes into multiple queues for parallel processing. The number of queues equals the number of CPU threads.</a:t>
             </a:r>
-            <a:endParaRPr lang="en-US" sz="1200">
+            <a:endParaRPr lang="en-US" sz="1600" dirty="0">
               <a:cs typeface="Calibri"/>
             </a:endParaRPr>
           </a:p>
           <a:p>
             <a:pPr lvl="1"/>
             <a:r>
-              <a:rPr lang="en-US" sz="1200">
+              <a:rPr lang="en-US" sz="1600" dirty="0">
                 <a:ea typeface="+mn-lt"/>
                 <a:cs typeface="+mn-lt"/>
               </a:rPr>
               <a:t>Create multiple threads for asynchronous processing. Each thread handles a distinct queue.</a:t>
             </a:r>
-            <a:endParaRPr lang="en-US" sz="1200">
+            <a:endParaRPr lang="en-US" sz="1600" dirty="0">
               <a:cs typeface="Calibri"/>
             </a:endParaRPr>
           </a:p>
           <a:p>
             <a:pPr lvl="1"/>
             <a:r>
-              <a:rPr lang="en-US" sz="1200" u="sng">
+              <a:rPr lang="en-US" sz="1600" u="sng" dirty="0">
                 <a:ea typeface="+mn-lt"/>
                 <a:cs typeface="+mn-lt"/>
               </a:rPr>
               <a:t>Each thread operates independently on its assigned queue.</a:t>
             </a:r>
-            <a:endParaRPr lang="en-US" sz="1200" u="sng">
+            <a:endParaRPr lang="en-US" sz="1600" u="sng" dirty="0">
               <a:cs typeface="Calibri"/>
             </a:endParaRPr>
           </a:p>
           <a:p>
             <a:r>
-              <a:rPr lang="en-US" sz="1200" b="1">
+              <a:rPr lang="en-US" sz="1600" b="1" dirty="0">
                 <a:ea typeface="+mn-lt"/>
                 <a:cs typeface="+mn-lt"/>
               </a:rPr>
               <a:t>Step 3: Parallel Exploration</a:t>
             </a:r>
             <a:r>
-              <a:rPr lang="en-US" sz="1200">
+              <a:rPr lang="en-US" sz="1600" dirty="0">
                 <a:ea typeface="+mn-lt"/>
                 <a:cs typeface="+mn-lt"/>
               </a:rPr>
               <a:t>:</a:t>
             </a:r>
-            <a:endParaRPr lang="en-US" sz="1200">
+            <a:endParaRPr lang="en-US" sz="1600" dirty="0">
               <a:cs typeface="Calibri"/>
             </a:endParaRPr>
           </a:p>
           <a:p>
             <a:pPr lvl="1"/>
             <a:r>
-              <a:rPr lang="en-US" sz="1200">
+              <a:rPr lang="en-US" sz="1600" dirty="0">
                 <a:ea typeface="+mn-lt"/>
                 <a:cs typeface="+mn-lt"/>
               </a:rPr>
@@ -12525,43 +14746,30 @@
           <a:p>
             <a:pPr lvl="1"/>
             <a:r>
-              <a:rPr lang="en-US" sz="1200">
+              <a:rPr lang="en-US" sz="1600" dirty="0">
                 <a:cs typeface="Calibri" panose="020F0502020204030204"/>
               </a:rPr>
-              <a:t>Nodes are added to the list of nodes visited concurrently</a:t>
+              <a:t>Nodes are added to the hashed set of nodes visited concurrently</a:t>
             </a:r>
           </a:p>
           <a:p>
             <a:pPr lvl="1"/>
             <a:r>
-              <a:rPr lang="en-US" sz="1200">
+              <a:rPr lang="en-US" sz="1600" dirty="0">
                 <a:ea typeface="+mn-lt"/>
                 <a:cs typeface="+mn-lt"/>
               </a:rPr>
-              <a:t>Mutex locks access to shared data (list of nodes visited).</a:t>
-            </a:r>
-            <a:endParaRPr lang="en-US" sz="1200">
+              <a:t>If goal found in any thread, terminate search.</a:t>
+            </a:r>
+          </a:p>
+          <a:p>
+            <a:pPr lvl="1"/>
+            <a:endParaRPr lang="en-US" sz="1000" dirty="0">
               <a:cs typeface="Calibri"/>
             </a:endParaRPr>
           </a:p>
           <a:p>
-            <a:pPr lvl="1"/>
-            <a:r>
-              <a:rPr lang="en-US" sz="1200">
-                <a:ea typeface="+mn-lt"/>
-                <a:cs typeface="+mn-lt"/>
-              </a:rPr>
-              <a:t>If goal found in any thread, terminate search.</a:t>
-            </a:r>
-          </a:p>
-          <a:p>
-            <a:pPr lvl="1"/>
-            <a:endParaRPr lang="en-US" sz="1000">
-              <a:cs typeface="Calibri"/>
-            </a:endParaRPr>
-          </a:p>
-          <a:p>
-            <a:endParaRPr lang="en-US" sz="1000">
+            <a:endParaRPr lang="en-US" sz="1000" dirty="0">
               <a:cs typeface="Calibri"/>
             </a:endParaRPr>
           </a:p>

</xml_diff>

<commit_message>
Fixed avg branching factor
</commit_message>
<xml_diff>
--- a/docs/cs4306-course-project-presentation.pptx
+++ b/docs/cs4306-course-project-presentation.pptx
@@ -257,7 +257,7 @@
           <a:p>
             <a:fld id="{846CE7D5-CF57-46EF-B807-FDD0502418D4}" type="datetimeFigureOut">
               <a:rPr lang="en-US" smtClean="0"/>
-              <a:t>11/3/2023</a:t>
+              <a:t>11/9/2023</a:t>
             </a:fld>
             <a:endParaRPr lang="en-US"/>
           </a:p>
@@ -425,7 +425,7 @@
           <a:p>
             <a:fld id="{846CE7D5-CF57-46EF-B807-FDD0502418D4}" type="datetimeFigureOut">
               <a:rPr lang="en-US" smtClean="0"/>
-              <a:t>11/3/2023</a:t>
+              <a:t>11/9/2023</a:t>
             </a:fld>
             <a:endParaRPr lang="en-US"/>
           </a:p>
@@ -603,7 +603,7 @@
           <a:p>
             <a:fld id="{846CE7D5-CF57-46EF-B807-FDD0502418D4}" type="datetimeFigureOut">
               <a:rPr lang="en-US" smtClean="0"/>
-              <a:t>11/3/2023</a:t>
+              <a:t>11/9/2023</a:t>
             </a:fld>
             <a:endParaRPr lang="en-US"/>
           </a:p>
@@ -771,7 +771,7 @@
           <a:p>
             <a:fld id="{846CE7D5-CF57-46EF-B807-FDD0502418D4}" type="datetimeFigureOut">
               <a:rPr lang="en-US" smtClean="0"/>
-              <a:t>11/3/2023</a:t>
+              <a:t>11/9/2023</a:t>
             </a:fld>
             <a:endParaRPr lang="en-US"/>
           </a:p>
@@ -1016,7 +1016,7 @@
           <a:p>
             <a:fld id="{846CE7D5-CF57-46EF-B807-FDD0502418D4}" type="datetimeFigureOut">
               <a:rPr lang="en-US" smtClean="0"/>
-              <a:t>11/3/2023</a:t>
+              <a:t>11/9/2023</a:t>
             </a:fld>
             <a:endParaRPr lang="en-US"/>
           </a:p>
@@ -1245,7 +1245,7 @@
           <a:p>
             <a:fld id="{846CE7D5-CF57-46EF-B807-FDD0502418D4}" type="datetimeFigureOut">
               <a:rPr lang="en-US" smtClean="0"/>
-              <a:t>11/3/2023</a:t>
+              <a:t>11/9/2023</a:t>
             </a:fld>
             <a:endParaRPr lang="en-US"/>
           </a:p>
@@ -1609,7 +1609,7 @@
           <a:p>
             <a:fld id="{846CE7D5-CF57-46EF-B807-FDD0502418D4}" type="datetimeFigureOut">
               <a:rPr lang="en-US" smtClean="0"/>
-              <a:t>11/3/2023</a:t>
+              <a:t>11/9/2023</a:t>
             </a:fld>
             <a:endParaRPr lang="en-US"/>
           </a:p>
@@ -1726,7 +1726,7 @@
           <a:p>
             <a:fld id="{846CE7D5-CF57-46EF-B807-FDD0502418D4}" type="datetimeFigureOut">
               <a:rPr lang="en-US" smtClean="0"/>
-              <a:t>11/3/2023</a:t>
+              <a:t>11/9/2023</a:t>
             </a:fld>
             <a:endParaRPr lang="en-US"/>
           </a:p>
@@ -1821,7 +1821,7 @@
           <a:p>
             <a:fld id="{846CE7D5-CF57-46EF-B807-FDD0502418D4}" type="datetimeFigureOut">
               <a:rPr lang="en-US" smtClean="0"/>
-              <a:t>11/3/2023</a:t>
+              <a:t>11/9/2023</a:t>
             </a:fld>
             <a:endParaRPr lang="en-US"/>
           </a:p>
@@ -2096,7 +2096,7 @@
           <a:p>
             <a:fld id="{846CE7D5-CF57-46EF-B807-FDD0502418D4}" type="datetimeFigureOut">
               <a:rPr lang="en-US" smtClean="0"/>
-              <a:t>11/3/2023</a:t>
+              <a:t>11/9/2023</a:t>
             </a:fld>
             <a:endParaRPr lang="en-US"/>
           </a:p>
@@ -2351,7 +2351,7 @@
           <a:p>
             <a:fld id="{846CE7D5-CF57-46EF-B807-FDD0502418D4}" type="datetimeFigureOut">
               <a:rPr lang="en-US" smtClean="0"/>
-              <a:t>11/3/2023</a:t>
+              <a:t>11/9/2023</a:t>
             </a:fld>
             <a:endParaRPr lang="en-US"/>
           </a:p>
@@ -2562,7 +2562,7 @@
           <a:p>
             <a:fld id="{846CE7D5-CF57-46EF-B807-FDD0502418D4}" type="datetimeFigureOut">
               <a:rPr lang="en-US" smtClean="0"/>
-              <a:t>11/3/2023</a:t>
+              <a:t>11/9/2023</a:t>
             </a:fld>
             <a:endParaRPr lang="en-US"/>
           </a:p>
@@ -12940,19 +12940,19 @@
               <a:buNone/>
             </a:pPr>
             <a:r>
-              <a:rPr lang="en-US" sz="1700">
+              <a:rPr lang="en-US" sz="1700" dirty="0">
                 <a:cs typeface="Calibri"/>
               </a:rPr>
               <a:t>Time Complexity: O(</a:t>
             </a:r>
             <a:r>
-              <a:rPr lang="en-US" sz="1700" err="1">
+              <a:rPr lang="en-US" sz="1700" dirty="0" err="1">
                 <a:cs typeface="Calibri"/>
               </a:rPr>
               <a:t>b^d</a:t>
             </a:r>
             <a:r>
-              <a:rPr lang="en-US" sz="1700">
+              <a:rPr lang="en-US" sz="1700" dirty="0">
                 <a:cs typeface="Calibri"/>
               </a:rPr>
               <a:t>)</a:t>
@@ -12963,24 +12963,24 @@
               <a:buNone/>
             </a:pPr>
             <a:r>
-              <a:rPr lang="en-US" sz="1700">
+              <a:rPr lang="en-US" sz="1700" dirty="0">
                 <a:cs typeface="Calibri"/>
               </a:rPr>
               <a:t>Space Complexity: O(</a:t>
             </a:r>
             <a:r>
-              <a:rPr lang="en-US" sz="1700" err="1">
+              <a:rPr lang="en-US" sz="1700" dirty="0" err="1">
                 <a:cs typeface="Calibri"/>
               </a:rPr>
               <a:t>b^d</a:t>
             </a:r>
             <a:r>
-              <a:rPr lang="en-US" sz="1700">
+              <a:rPr lang="en-US" sz="1700" dirty="0">
                 <a:cs typeface="Calibri"/>
               </a:rPr>
               <a:t>)</a:t>
             </a:r>
-            <a:endParaRPr lang="en-US" sz="1700">
+            <a:endParaRPr lang="en-US" sz="1700" dirty="0">
               <a:ea typeface="Calibri"/>
               <a:cs typeface="Calibri"/>
             </a:endParaRPr>
@@ -12990,28 +12990,28 @@
               <a:buNone/>
             </a:pPr>
             <a:r>
-              <a:rPr lang="en-US" sz="1700" b="1">
+              <a:rPr lang="en-US" sz="1700" b="1" dirty="0">
                 <a:ea typeface="+mn-lt"/>
                 <a:cs typeface="+mn-lt"/>
               </a:rPr>
               <a:t> O(</a:t>
             </a:r>
             <a:r>
-              <a:rPr lang="en-US" sz="1700" b="1" err="1">
+              <a:rPr lang="en-US" sz="1700" b="1" dirty="0" err="1">
                 <a:ea typeface="+mn-lt"/>
                 <a:cs typeface="+mn-lt"/>
               </a:rPr>
               <a:t>b^d</a:t>
             </a:r>
             <a:r>
-              <a:rPr lang="en-US" sz="1700" b="1">
+              <a:rPr lang="en-US" sz="1700" b="1" dirty="0">
                 <a:ea typeface="+mn-lt"/>
                 <a:cs typeface="+mn-lt"/>
               </a:rPr>
               <a:t>) know as order of b raise to power d.</a:t>
             </a:r>
             <a:r>
-              <a:rPr lang="en-US" sz="1700">
+              <a:rPr lang="en-US" sz="1700" dirty="0">
                 <a:ea typeface="+mn-lt"/>
                 <a:cs typeface="+mn-lt"/>
               </a:rPr>
@@ -13024,11 +13024,18 @@
               <a:buChar char="•"/>
             </a:pPr>
             <a:r>
+              <a:rPr lang="en-US" sz="1700" dirty="0">
+                <a:ea typeface="+mn-lt"/>
+                <a:cs typeface="+mn-lt"/>
+              </a:rPr>
+              <a:t>"b" is the branching factor, which represents the number of possible moves (states) from any given state. (in this case 0-4, avg. </a:t>
+            </a:r>
+            <a:r>
               <a:rPr lang="en-US" sz="1700">
                 <a:ea typeface="+mn-lt"/>
                 <a:cs typeface="+mn-lt"/>
               </a:rPr>
-              <a:t>"b" is the branching factor, which represents the number of possible moves (states) from any given state. (in this case 0-4, avg. 2.67)</a:t>
+              <a:t>1.67)</a:t>
             </a:r>
           </a:p>
           <a:p>
@@ -13037,7 +13044,7 @@
               <a:buChar char="•"/>
             </a:pPr>
             <a:r>
-              <a:rPr lang="en-US" sz="1700">
+              <a:rPr lang="en-US" sz="1700" dirty="0">
                 <a:ea typeface="+mn-lt"/>
                 <a:cs typeface="+mn-lt"/>
               </a:rPr>
@@ -13048,7 +13055,7 @@
             <a:pPr marL="0" indent="0">
               <a:buNone/>
             </a:pPr>
-            <a:endParaRPr lang="en-US" sz="1700">
+            <a:endParaRPr lang="en-US" sz="1700" dirty="0">
               <a:ea typeface="+mn-lt"/>
               <a:cs typeface="+mn-lt"/>
             </a:endParaRPr>
@@ -13059,20 +13066,20 @@
               <a:buChar char="•"/>
             </a:pPr>
             <a:r>
-              <a:rPr lang="en-US" sz="1700" b="1">
+              <a:rPr lang="en-US" sz="1700" b="1" dirty="0">
                 <a:ea typeface="+mn-lt"/>
                 <a:cs typeface="+mn-lt"/>
               </a:rPr>
               <a:t>Exploring All Possibilities</a:t>
             </a:r>
             <a:r>
-              <a:rPr lang="en-US" sz="1700">
+              <a:rPr lang="en-US" sz="1700" dirty="0">
                 <a:ea typeface="+mn-lt"/>
                 <a:cs typeface="+mn-lt"/>
               </a:rPr>
               <a:t>:</a:t>
             </a:r>
-            <a:endParaRPr lang="en-US" sz="1700"/>
+            <a:endParaRPr lang="en-US" sz="1700" dirty="0"/>
           </a:p>
           <a:p>
             <a:pPr marL="971550" lvl="1" indent="-285750">
@@ -13080,13 +13087,13 @@
               <a:buChar char="•"/>
             </a:pPr>
             <a:r>
-              <a:rPr lang="en-US" sz="1700">
+              <a:rPr lang="en-US" sz="1700" dirty="0">
                 <a:ea typeface="+mn-lt"/>
                 <a:cs typeface="+mn-lt"/>
               </a:rPr>
               <a:t>BFS explores all possible solutions on each level.</a:t>
             </a:r>
-            <a:endParaRPr lang="en-US" sz="1700"/>
+            <a:endParaRPr lang="en-US" sz="1700" dirty="0"/>
           </a:p>
           <a:p>
             <a:pPr marL="971550" lvl="1" indent="-285750">
@@ -13094,13 +13101,13 @@
               <a:buChar char="•"/>
             </a:pPr>
             <a:r>
-              <a:rPr lang="en-US" sz="1700">
+              <a:rPr lang="en-US" sz="1700" dirty="0">
                 <a:ea typeface="+mn-lt"/>
                 <a:cs typeface="+mn-lt"/>
               </a:rPr>
               <a:t>It exhaustively searches one level before moving to the next.</a:t>
             </a:r>
-            <a:endParaRPr lang="en-US" sz="1700"/>
+            <a:endParaRPr lang="en-US" sz="1700" dirty="0"/>
           </a:p>
           <a:p>
             <a:pPr>
@@ -13108,20 +13115,20 @@
               <a:buChar char="•"/>
             </a:pPr>
             <a:r>
-              <a:rPr lang="en-US" sz="1700" b="1">
+              <a:rPr lang="en-US" sz="1700" b="1" dirty="0">
                 <a:ea typeface="+mn-lt"/>
                 <a:cs typeface="+mn-lt"/>
               </a:rPr>
               <a:t>Optimal Path</a:t>
             </a:r>
             <a:r>
-              <a:rPr lang="en-US" sz="1700">
+              <a:rPr lang="en-US" sz="1700" dirty="0">
                 <a:ea typeface="+mn-lt"/>
                 <a:cs typeface="+mn-lt"/>
               </a:rPr>
               <a:t>:</a:t>
             </a:r>
-            <a:endParaRPr lang="en-US" sz="1700"/>
+            <a:endParaRPr lang="en-US" sz="1700" dirty="0"/>
           </a:p>
           <a:p>
             <a:pPr marL="971550" lvl="1" indent="-285750">
@@ -13129,13 +13136,13 @@
               <a:buChar char="•"/>
             </a:pPr>
             <a:r>
-              <a:rPr lang="en-US" sz="1700">
+              <a:rPr lang="en-US" sz="1700" dirty="0">
                 <a:ea typeface="+mn-lt"/>
                 <a:cs typeface="+mn-lt"/>
               </a:rPr>
               <a:t>BFS guarantees finding the shortest path to the goal state.</a:t>
             </a:r>
-            <a:endParaRPr lang="en-US" sz="1700"/>
+            <a:endParaRPr lang="en-US" sz="1700" dirty="0"/>
           </a:p>
           <a:p>
             <a:pPr marL="971550" lvl="1" indent="-285750">
@@ -13143,19 +13150,19 @@
               <a:buChar char="•"/>
             </a:pPr>
             <a:r>
-              <a:rPr lang="en-US" sz="1700">
+              <a:rPr lang="en-US" sz="1700" dirty="0">
                 <a:ea typeface="+mn-lt"/>
                 <a:cs typeface="+mn-lt"/>
               </a:rPr>
               <a:t>It finds the optimal solution by systematically exploring all possible states.</a:t>
             </a:r>
-            <a:endParaRPr lang="en-US" sz="1700"/>
+            <a:endParaRPr lang="en-US" sz="1700" dirty="0"/>
           </a:p>
           <a:p>
             <a:pPr marL="0" indent="0">
               <a:buNone/>
             </a:pPr>
-            <a:endParaRPr lang="en-US" sz="1700">
+            <a:endParaRPr lang="en-US" sz="1700" dirty="0">
               <a:ea typeface="+mn-lt"/>
               <a:cs typeface="+mn-lt"/>
             </a:endParaRPr>

</xml_diff>